<commit_message>
Change name of axis
</commit_message>
<xml_diff>
--- a/Lab1/Illustrations.pptx
+++ b/Lab1/Illustrations.pptx
@@ -9,6 +9,7 @@
     <p:sldId id="257" r:id="rId3"/>
     <p:sldId id="258" r:id="rId4"/>
     <p:sldId id="259" r:id="rId5"/>
+    <p:sldId id="260" r:id="rId6"/>
   </p:sldIdLst>
   <p:sldSz cx="12192000" cy="6858000"/>
   <p:notesSz cx="6858000" cy="9144000"/>
@@ -107,6 +108,11 @@
       </a:defRPr>
     </a:lvl9pPr>
   </p:defaultTextStyle>
+  <p:extLst>
+    <p:ext uri="{EFAFB233-063F-42B5-8137-9DF3F51BA10A}">
+      <p15:sldGuideLst xmlns:p15="http://schemas.microsoft.com/office/powerpoint/2012/main"/>
+    </p:ext>
+  </p:extLst>
 </p:presentation>
 </file>
 
@@ -259,7 +265,7 @@
           <a:p>
             <a:fld id="{94197476-1918-9D47-81DD-30479D4B9C3C}" type="datetimeFigureOut">
               <a:rPr lang="uk-UA" smtClean="0"/>
-              <a:t>11.05.22</a:t>
+              <a:t>19.05.22</a:t>
             </a:fld>
             <a:endParaRPr lang="uk-UA"/>
           </a:p>
@@ -459,7 +465,7 @@
           <a:p>
             <a:fld id="{94197476-1918-9D47-81DD-30479D4B9C3C}" type="datetimeFigureOut">
               <a:rPr lang="uk-UA" smtClean="0"/>
-              <a:t>11.05.22</a:t>
+              <a:t>19.05.22</a:t>
             </a:fld>
             <a:endParaRPr lang="uk-UA"/>
           </a:p>
@@ -669,7 +675,7 @@
           <a:p>
             <a:fld id="{94197476-1918-9D47-81DD-30479D4B9C3C}" type="datetimeFigureOut">
               <a:rPr lang="uk-UA" smtClean="0"/>
-              <a:t>11.05.22</a:t>
+              <a:t>19.05.22</a:t>
             </a:fld>
             <a:endParaRPr lang="uk-UA"/>
           </a:p>
@@ -869,7 +875,7 @@
           <a:p>
             <a:fld id="{94197476-1918-9D47-81DD-30479D4B9C3C}" type="datetimeFigureOut">
               <a:rPr lang="uk-UA" smtClean="0"/>
-              <a:t>11.05.22</a:t>
+              <a:t>19.05.22</a:t>
             </a:fld>
             <a:endParaRPr lang="uk-UA"/>
           </a:p>
@@ -1145,7 +1151,7 @@
           <a:p>
             <a:fld id="{94197476-1918-9D47-81DD-30479D4B9C3C}" type="datetimeFigureOut">
               <a:rPr lang="uk-UA" smtClean="0"/>
-              <a:t>11.05.22</a:t>
+              <a:t>19.05.22</a:t>
             </a:fld>
             <a:endParaRPr lang="uk-UA"/>
           </a:p>
@@ -1413,7 +1419,7 @@
           <a:p>
             <a:fld id="{94197476-1918-9D47-81DD-30479D4B9C3C}" type="datetimeFigureOut">
               <a:rPr lang="uk-UA" smtClean="0"/>
-              <a:t>11.05.22</a:t>
+              <a:t>19.05.22</a:t>
             </a:fld>
             <a:endParaRPr lang="uk-UA"/>
           </a:p>
@@ -1828,7 +1834,7 @@
           <a:p>
             <a:fld id="{94197476-1918-9D47-81DD-30479D4B9C3C}" type="datetimeFigureOut">
               <a:rPr lang="uk-UA" smtClean="0"/>
-              <a:t>11.05.22</a:t>
+              <a:t>19.05.22</a:t>
             </a:fld>
             <a:endParaRPr lang="uk-UA"/>
           </a:p>
@@ -1970,7 +1976,7 @@
           <a:p>
             <a:fld id="{94197476-1918-9D47-81DD-30479D4B9C3C}" type="datetimeFigureOut">
               <a:rPr lang="uk-UA" smtClean="0"/>
-              <a:t>11.05.22</a:t>
+              <a:t>19.05.22</a:t>
             </a:fld>
             <a:endParaRPr lang="uk-UA"/>
           </a:p>
@@ -2083,7 +2089,7 @@
           <a:p>
             <a:fld id="{94197476-1918-9D47-81DD-30479D4B9C3C}" type="datetimeFigureOut">
               <a:rPr lang="uk-UA" smtClean="0"/>
-              <a:t>11.05.22</a:t>
+              <a:t>19.05.22</a:t>
             </a:fld>
             <a:endParaRPr lang="uk-UA"/>
           </a:p>
@@ -2396,7 +2402,7 @@
           <a:p>
             <a:fld id="{94197476-1918-9D47-81DD-30479D4B9C3C}" type="datetimeFigureOut">
               <a:rPr lang="uk-UA" smtClean="0"/>
-              <a:t>11.05.22</a:t>
+              <a:t>19.05.22</a:t>
             </a:fld>
             <a:endParaRPr lang="uk-UA"/>
           </a:p>
@@ -2685,7 +2691,7 @@
           <a:p>
             <a:fld id="{94197476-1918-9D47-81DD-30479D4B9C3C}" type="datetimeFigureOut">
               <a:rPr lang="uk-UA" smtClean="0"/>
-              <a:t>11.05.22</a:t>
+              <a:t>19.05.22</a:t>
             </a:fld>
             <a:endParaRPr lang="uk-UA"/>
           </a:p>
@@ -2928,7 +2934,7 @@
           <a:p>
             <a:fld id="{94197476-1918-9D47-81DD-30479D4B9C3C}" type="datetimeFigureOut">
               <a:rPr lang="uk-UA" smtClean="0"/>
-              <a:t>11.05.22</a:t>
+              <a:t>19.05.22</a:t>
             </a:fld>
             <a:endParaRPr lang="uk-UA"/>
           </a:p>
@@ -3551,8 +3557,8 @@
             </a:p>
           </p:txBody>
         </p:sp>
-        <mc:AlternateContent xmlns:mc="http://schemas.openxmlformats.org/markup-compatibility/2006">
-          <mc:Choice xmlns:a14="http://schemas.microsoft.com/office/drawing/2010/main" Requires="a14">
+        <mc:AlternateContent xmlns:mc="http://schemas.openxmlformats.org/markup-compatibility/2006" xmlns:a14="http://schemas.microsoft.com/office/drawing/2010/main">
+          <mc:Choice Requires="a14">
             <p:sp>
               <p:nvSpPr>
                 <p:cNvPr id="19" name="TextBox 18">
@@ -3581,6 +3587,7 @@
                 </a:bodyPr>
                 <a:lstStyle/>
                 <a:p>
+                  <a:pPr/>
                   <a14:m>
                     <m:oMathPara xmlns:m="http://schemas.openxmlformats.org/officeDocument/2006/math">
                       <m:oMathParaPr>
@@ -3601,7 +3608,7 @@
               </p:txBody>
             </p:sp>
           </mc:Choice>
-          <mc:Fallback>
+          <mc:Fallback xmlns="">
             <p:sp>
               <p:nvSpPr>
                 <p:cNvPr id="19" name="TextBox 18">
@@ -3646,8 +3653,8 @@
             </p:sp>
           </mc:Fallback>
         </mc:AlternateContent>
-        <mc:AlternateContent xmlns:mc="http://schemas.openxmlformats.org/markup-compatibility/2006">
-          <mc:Choice xmlns:a14="http://schemas.microsoft.com/office/drawing/2010/main" Requires="a14">
+        <mc:AlternateContent xmlns:mc="http://schemas.openxmlformats.org/markup-compatibility/2006" xmlns:a14="http://schemas.microsoft.com/office/drawing/2010/main">
+          <mc:Choice Requires="a14">
             <p:sp>
               <p:nvSpPr>
                 <p:cNvPr id="24" name="TextBox 23">
@@ -3676,6 +3683,7 @@
                 </a:bodyPr>
                 <a:lstStyle/>
                 <a:p>
+                  <a:pPr/>
                   <a14:m>
                     <m:oMathPara xmlns:m="http://schemas.openxmlformats.org/officeDocument/2006/math">
                       <m:oMathParaPr>
@@ -3696,7 +3704,7 @@
               </p:txBody>
             </p:sp>
           </mc:Choice>
-          <mc:Fallback>
+          <mc:Fallback xmlns="">
             <p:sp>
               <p:nvSpPr>
                 <p:cNvPr id="24" name="TextBox 23">
@@ -3741,8 +3749,8 @@
             </p:sp>
           </mc:Fallback>
         </mc:AlternateContent>
-        <mc:AlternateContent xmlns:mc="http://schemas.openxmlformats.org/markup-compatibility/2006">
-          <mc:Choice xmlns:a14="http://schemas.microsoft.com/office/drawing/2010/main" Requires="a14">
+        <mc:AlternateContent xmlns:mc="http://schemas.openxmlformats.org/markup-compatibility/2006" xmlns:a14="http://schemas.microsoft.com/office/drawing/2010/main">
+          <mc:Choice Requires="a14">
             <p:sp>
               <p:nvSpPr>
                 <p:cNvPr id="25" name="TextBox 24">
@@ -3771,6 +3779,7 @@
                 </a:bodyPr>
                 <a:lstStyle/>
                 <a:p>
+                  <a:pPr/>
                   <a14:m>
                     <m:oMathPara xmlns:m="http://schemas.openxmlformats.org/officeDocument/2006/math">
                       <m:oMathParaPr>
@@ -3791,7 +3800,7 @@
               </p:txBody>
             </p:sp>
           </mc:Choice>
-          <mc:Fallback>
+          <mc:Fallback xmlns="">
             <p:sp>
               <p:nvSpPr>
                 <p:cNvPr id="25" name="TextBox 24">
@@ -4148,8 +4157,8 @@
             </a:p>
           </p:txBody>
         </p:sp>
-        <mc:AlternateContent xmlns:mc="http://schemas.openxmlformats.org/markup-compatibility/2006">
-          <mc:Choice xmlns:a14="http://schemas.microsoft.com/office/drawing/2010/main" Requires="a14">
+        <mc:AlternateContent xmlns:mc="http://schemas.openxmlformats.org/markup-compatibility/2006" xmlns:a14="http://schemas.microsoft.com/office/drawing/2010/main">
+          <mc:Choice Requires="a14">
             <p:sp>
               <p:nvSpPr>
                 <p:cNvPr id="34" name="TextBox 33">
@@ -4178,6 +4187,7 @@
                 </a:bodyPr>
                 <a:lstStyle/>
                 <a:p>
+                  <a:pPr/>
                   <a14:m>
                     <m:oMathPara xmlns:m="http://schemas.openxmlformats.org/officeDocument/2006/math">
                       <m:oMathParaPr>
@@ -4198,7 +4208,7 @@
               </p:txBody>
             </p:sp>
           </mc:Choice>
-          <mc:Fallback>
+          <mc:Fallback xmlns="">
             <p:sp>
               <p:nvSpPr>
                 <p:cNvPr id="34" name="TextBox 33">
@@ -4243,8 +4253,8 @@
             </p:sp>
           </mc:Fallback>
         </mc:AlternateContent>
-        <mc:AlternateContent xmlns:mc="http://schemas.openxmlformats.org/markup-compatibility/2006">
-          <mc:Choice xmlns:a14="http://schemas.microsoft.com/office/drawing/2010/main" Requires="a14">
+        <mc:AlternateContent xmlns:mc="http://schemas.openxmlformats.org/markup-compatibility/2006" xmlns:a14="http://schemas.microsoft.com/office/drawing/2010/main">
+          <mc:Choice Requires="a14">
             <p:sp>
               <p:nvSpPr>
                 <p:cNvPr id="35" name="TextBox 34">
@@ -4273,6 +4283,7 @@
                 </a:bodyPr>
                 <a:lstStyle/>
                 <a:p>
+                  <a:pPr/>
                   <a14:m>
                     <m:oMathPara xmlns:m="http://schemas.openxmlformats.org/officeDocument/2006/math">
                       <m:oMathParaPr>
@@ -4299,7 +4310,7 @@
               </p:txBody>
             </p:sp>
           </mc:Choice>
-          <mc:Fallback>
+          <mc:Fallback xmlns="">
             <p:sp>
               <p:nvSpPr>
                 <p:cNvPr id="35" name="TextBox 34">
@@ -4344,8 +4355,8 @@
             </p:sp>
           </mc:Fallback>
         </mc:AlternateContent>
-        <mc:AlternateContent xmlns:mc="http://schemas.openxmlformats.org/markup-compatibility/2006">
-          <mc:Choice xmlns:a14="http://schemas.microsoft.com/office/drawing/2010/main" Requires="a14">
+        <mc:AlternateContent xmlns:mc="http://schemas.openxmlformats.org/markup-compatibility/2006" xmlns:a14="http://schemas.microsoft.com/office/drawing/2010/main">
+          <mc:Choice Requires="a14">
             <p:sp>
               <p:nvSpPr>
                 <p:cNvPr id="36" name="TextBox 35">
@@ -4374,6 +4385,7 @@
                 </a:bodyPr>
                 <a:lstStyle/>
                 <a:p>
+                  <a:pPr/>
                   <a14:m>
                     <m:oMathPara xmlns:m="http://schemas.openxmlformats.org/officeDocument/2006/math">
                       <m:oMathParaPr>
@@ -4400,7 +4412,7 @@
               </p:txBody>
             </p:sp>
           </mc:Choice>
-          <mc:Fallback>
+          <mc:Fallback xmlns="">
             <p:sp>
               <p:nvSpPr>
                 <p:cNvPr id="36" name="TextBox 35">
@@ -4445,8 +4457,8 @@
             </p:sp>
           </mc:Fallback>
         </mc:AlternateContent>
-        <mc:AlternateContent xmlns:mc="http://schemas.openxmlformats.org/markup-compatibility/2006">
-          <mc:Choice xmlns:a14="http://schemas.microsoft.com/office/drawing/2010/main" Requires="a14">
+        <mc:AlternateContent xmlns:mc="http://schemas.openxmlformats.org/markup-compatibility/2006" xmlns:a14="http://schemas.microsoft.com/office/drawing/2010/main">
+          <mc:Choice Requires="a14">
             <p:sp>
               <p:nvSpPr>
                 <p:cNvPr id="37" name="TextBox 36">
@@ -4475,6 +4487,7 @@
                 </a:bodyPr>
                 <a:lstStyle/>
                 <a:p>
+                  <a:pPr/>
                   <a14:m>
                     <m:oMathPara xmlns:m="http://schemas.openxmlformats.org/officeDocument/2006/math">
                       <m:oMathParaPr>
@@ -4501,7 +4514,7 @@
               </p:txBody>
             </p:sp>
           </mc:Choice>
-          <mc:Fallback>
+          <mc:Fallback xmlns="">
             <p:sp>
               <p:nvSpPr>
                 <p:cNvPr id="37" name="TextBox 36">
@@ -4546,8 +4559,8 @@
             </p:sp>
           </mc:Fallback>
         </mc:AlternateContent>
-        <mc:AlternateContent xmlns:mc="http://schemas.openxmlformats.org/markup-compatibility/2006">
-          <mc:Choice xmlns:a14="http://schemas.microsoft.com/office/drawing/2010/main" Requires="a14">
+        <mc:AlternateContent xmlns:mc="http://schemas.openxmlformats.org/markup-compatibility/2006" xmlns:a14="http://schemas.microsoft.com/office/drawing/2010/main">
+          <mc:Choice Requires="a14">
             <p:sp>
               <p:nvSpPr>
                 <p:cNvPr id="38" name="TextBox 37">
@@ -4576,6 +4589,7 @@
                 </a:bodyPr>
                 <a:lstStyle/>
                 <a:p>
+                  <a:pPr/>
                   <a14:m>
                     <m:oMathPara xmlns:m="http://schemas.openxmlformats.org/officeDocument/2006/math">
                       <m:oMathParaPr>
@@ -4602,7 +4616,7 @@
               </p:txBody>
             </p:sp>
           </mc:Choice>
-          <mc:Fallback>
+          <mc:Fallback xmlns="">
             <p:sp>
               <p:nvSpPr>
                 <p:cNvPr id="38" name="TextBox 37">
@@ -4647,8 +4661,8 @@
             </p:sp>
           </mc:Fallback>
         </mc:AlternateContent>
-        <mc:AlternateContent xmlns:mc="http://schemas.openxmlformats.org/markup-compatibility/2006">
-          <mc:Choice xmlns:a14="http://schemas.microsoft.com/office/drawing/2010/main" Requires="a14">
+        <mc:AlternateContent xmlns:mc="http://schemas.openxmlformats.org/markup-compatibility/2006" xmlns:a14="http://schemas.microsoft.com/office/drawing/2010/main">
+          <mc:Choice Requires="a14">
             <p:sp>
               <p:nvSpPr>
                 <p:cNvPr id="39" name="TextBox 38">
@@ -4677,6 +4691,7 @@
                 </a:bodyPr>
                 <a:lstStyle/>
                 <a:p>
+                  <a:pPr/>
                   <a14:m>
                     <m:oMathPara xmlns:m="http://schemas.openxmlformats.org/officeDocument/2006/math">
                       <m:oMathParaPr>
@@ -4703,7 +4718,7 @@
               </p:txBody>
             </p:sp>
           </mc:Choice>
-          <mc:Fallback>
+          <mc:Fallback xmlns="">
             <p:sp>
               <p:nvSpPr>
                 <p:cNvPr id="39" name="TextBox 38">
@@ -4748,8 +4763,8 @@
             </p:sp>
           </mc:Fallback>
         </mc:AlternateContent>
-        <mc:AlternateContent xmlns:mc="http://schemas.openxmlformats.org/markup-compatibility/2006">
-          <mc:Choice xmlns:a14="http://schemas.microsoft.com/office/drawing/2010/main" Requires="a14">
+        <mc:AlternateContent xmlns:mc="http://schemas.openxmlformats.org/markup-compatibility/2006" xmlns:a14="http://schemas.microsoft.com/office/drawing/2010/main">
+          <mc:Choice Requires="a14">
             <p:sp>
               <p:nvSpPr>
                 <p:cNvPr id="40" name="TextBox 39">
@@ -4778,6 +4793,7 @@
                 </a:bodyPr>
                 <a:lstStyle/>
                 <a:p>
+                  <a:pPr/>
                   <a14:m>
                     <m:oMathPara xmlns:m="http://schemas.openxmlformats.org/officeDocument/2006/math">
                       <m:oMathParaPr>
@@ -4804,7 +4820,7 @@
               </p:txBody>
             </p:sp>
           </mc:Choice>
-          <mc:Fallback>
+          <mc:Fallback xmlns="">
             <p:sp>
               <p:nvSpPr>
                 <p:cNvPr id="40" name="TextBox 39">
@@ -4849,8 +4865,8 @@
             </p:sp>
           </mc:Fallback>
         </mc:AlternateContent>
-        <mc:AlternateContent xmlns:mc="http://schemas.openxmlformats.org/markup-compatibility/2006">
-          <mc:Choice xmlns:a14="http://schemas.microsoft.com/office/drawing/2010/main" Requires="a14">
+        <mc:AlternateContent xmlns:mc="http://schemas.openxmlformats.org/markup-compatibility/2006" xmlns:a14="http://schemas.microsoft.com/office/drawing/2010/main">
+          <mc:Choice Requires="a14">
             <p:sp>
               <p:nvSpPr>
                 <p:cNvPr id="42" name="TextBox 41">
@@ -4879,6 +4895,7 @@
                 </a:bodyPr>
                 <a:lstStyle/>
                 <a:p>
+                  <a:pPr/>
                   <a14:m>
                     <m:oMathPara xmlns:m="http://schemas.openxmlformats.org/officeDocument/2006/math">
                       <m:oMathParaPr>
@@ -4905,7 +4922,7 @@
               </p:txBody>
             </p:sp>
           </mc:Choice>
-          <mc:Fallback>
+          <mc:Fallback xmlns="">
             <p:sp>
               <p:nvSpPr>
                 <p:cNvPr id="42" name="TextBox 41">
@@ -4950,8 +4967,8 @@
             </p:sp>
           </mc:Fallback>
         </mc:AlternateContent>
-        <mc:AlternateContent xmlns:mc="http://schemas.openxmlformats.org/markup-compatibility/2006">
-          <mc:Choice xmlns:a14="http://schemas.microsoft.com/office/drawing/2010/main" Requires="a14">
+        <mc:AlternateContent xmlns:mc="http://schemas.openxmlformats.org/markup-compatibility/2006" xmlns:a14="http://schemas.microsoft.com/office/drawing/2010/main">
+          <mc:Choice Requires="a14">
             <p:sp>
               <p:nvSpPr>
                 <p:cNvPr id="43" name="TextBox 42">
@@ -4980,6 +4997,7 @@
                 </a:bodyPr>
                 <a:lstStyle/>
                 <a:p>
+                  <a:pPr/>
                   <a14:m>
                     <m:oMathPara xmlns:m="http://schemas.openxmlformats.org/officeDocument/2006/math">
                       <m:oMathParaPr>
@@ -5006,7 +5024,7 @@
               </p:txBody>
             </p:sp>
           </mc:Choice>
-          <mc:Fallback>
+          <mc:Fallback xmlns="">
             <p:sp>
               <p:nvSpPr>
                 <p:cNvPr id="43" name="TextBox 42">
@@ -5051,8 +5069,8 @@
             </p:sp>
           </mc:Fallback>
         </mc:AlternateContent>
-        <mc:AlternateContent xmlns:mc="http://schemas.openxmlformats.org/markup-compatibility/2006">
-          <mc:Choice xmlns:a14="http://schemas.microsoft.com/office/drawing/2010/main" Requires="a14">
+        <mc:AlternateContent xmlns:mc="http://schemas.openxmlformats.org/markup-compatibility/2006" xmlns:a14="http://schemas.microsoft.com/office/drawing/2010/main">
+          <mc:Choice Requires="a14">
             <p:sp>
               <p:nvSpPr>
                 <p:cNvPr id="44" name="TextBox 43">
@@ -5081,6 +5099,7 @@
                 </a:bodyPr>
                 <a:lstStyle/>
                 <a:p>
+                  <a:pPr/>
                   <a14:m>
                     <m:oMathPara xmlns:m="http://schemas.openxmlformats.org/officeDocument/2006/math">
                       <m:oMathParaPr>
@@ -5107,7 +5126,7 @@
               </p:txBody>
             </p:sp>
           </mc:Choice>
-          <mc:Fallback>
+          <mc:Fallback xmlns="">
             <p:sp>
               <p:nvSpPr>
                 <p:cNvPr id="44" name="TextBox 43">
@@ -5152,8 +5171,8 @@
             </p:sp>
           </mc:Fallback>
         </mc:AlternateContent>
-        <mc:AlternateContent xmlns:mc="http://schemas.openxmlformats.org/markup-compatibility/2006">
-          <mc:Choice xmlns:a14="http://schemas.microsoft.com/office/drawing/2010/main" Requires="a14">
+        <mc:AlternateContent xmlns:mc="http://schemas.openxmlformats.org/markup-compatibility/2006" xmlns:a14="http://schemas.microsoft.com/office/drawing/2010/main">
+          <mc:Choice Requires="a14">
             <p:sp>
               <p:nvSpPr>
                 <p:cNvPr id="45" name="TextBox 44">
@@ -5182,6 +5201,7 @@
                 </a:bodyPr>
                 <a:lstStyle/>
                 <a:p>
+                  <a:pPr/>
                   <a14:m>
                     <m:oMathPara xmlns:m="http://schemas.openxmlformats.org/officeDocument/2006/math">
                       <m:oMathParaPr>
@@ -5208,7 +5228,7 @@
               </p:txBody>
             </p:sp>
           </mc:Choice>
-          <mc:Fallback>
+          <mc:Fallback xmlns="">
             <p:sp>
               <p:nvSpPr>
                 <p:cNvPr id="45" name="TextBox 44">
@@ -5253,8 +5273,8 @@
             </p:sp>
           </mc:Fallback>
         </mc:AlternateContent>
-        <mc:AlternateContent xmlns:mc="http://schemas.openxmlformats.org/markup-compatibility/2006">
-          <mc:Choice xmlns:a14="http://schemas.microsoft.com/office/drawing/2010/main" Requires="a14">
+        <mc:AlternateContent xmlns:mc="http://schemas.openxmlformats.org/markup-compatibility/2006" xmlns:a14="http://schemas.microsoft.com/office/drawing/2010/main">
+          <mc:Choice Requires="a14">
             <p:sp>
               <p:nvSpPr>
                 <p:cNvPr id="46" name="TextBox 45">
@@ -5283,6 +5303,7 @@
                 </a:bodyPr>
                 <a:lstStyle/>
                 <a:p>
+                  <a:pPr/>
                   <a14:m>
                     <m:oMathPara xmlns:m="http://schemas.openxmlformats.org/officeDocument/2006/math">
                       <m:oMathParaPr>
@@ -5309,7 +5330,7 @@
               </p:txBody>
             </p:sp>
           </mc:Choice>
-          <mc:Fallback>
+          <mc:Fallback xmlns="">
             <p:sp>
               <p:nvSpPr>
                 <p:cNvPr id="46" name="TextBox 45">
@@ -5354,8 +5375,8 @@
             </p:sp>
           </mc:Fallback>
         </mc:AlternateContent>
-        <mc:AlternateContent xmlns:mc="http://schemas.openxmlformats.org/markup-compatibility/2006">
-          <mc:Choice xmlns:a14="http://schemas.microsoft.com/office/drawing/2010/main" Requires="a14">
+        <mc:AlternateContent xmlns:mc="http://schemas.openxmlformats.org/markup-compatibility/2006" xmlns:a14="http://schemas.microsoft.com/office/drawing/2010/main">
+          <mc:Choice Requires="a14">
             <p:sp>
               <p:nvSpPr>
                 <p:cNvPr id="47" name="TextBox 46">
@@ -5384,6 +5405,7 @@
                 </a:bodyPr>
                 <a:lstStyle/>
                 <a:p>
+                  <a:pPr/>
                   <a14:m>
                     <m:oMathPara xmlns:m="http://schemas.openxmlformats.org/officeDocument/2006/math">
                       <m:oMathParaPr>
@@ -5410,7 +5432,7 @@
               </p:txBody>
             </p:sp>
           </mc:Choice>
-          <mc:Fallback>
+          <mc:Fallback xmlns="">
             <p:sp>
               <p:nvSpPr>
                 <p:cNvPr id="47" name="TextBox 46">
@@ -5456,6 +5478,217 @@
           </mc:Fallback>
         </mc:AlternateContent>
       </p:grpSp>
+      <mc:AlternateContent xmlns:mc="http://schemas.openxmlformats.org/markup-compatibility/2006">
+        <mc:Choice xmlns:a14="http://schemas.microsoft.com/office/drawing/2010/main" Requires="a14">
+          <p:sp>
+            <p:nvSpPr>
+              <p:cNvPr id="32" name="TextBox 31">
+                <a:extLst>
+                  <a:ext uri="{FF2B5EF4-FFF2-40B4-BE49-F238E27FC236}">
+                    <a16:creationId xmlns:a16="http://schemas.microsoft.com/office/drawing/2014/main" id="{8A17D514-0D58-834E-9390-9936A30CCF47}"/>
+                  </a:ext>
+                </a:extLst>
+              </p:cNvPr>
+              <p:cNvSpPr txBox="1"/>
+              <p:nvPr/>
+            </p:nvSpPr>
+            <p:spPr>
+              <a:xfrm>
+                <a:off x="7170579" y="3045387"/>
+                <a:ext cx="141705" cy="215444"/>
+              </a:xfrm>
+              <a:prstGeom prst="rect">
+                <a:avLst/>
+              </a:prstGeom>
+              <a:noFill/>
+            </p:spPr>
+            <p:txBody>
+              <a:bodyPr wrap="none" lIns="0" tIns="0" rIns="0" bIns="0" rtlCol="0">
+                <a:spAutoFit/>
+              </a:bodyPr>
+              <a:lstStyle/>
+              <a:p>
+                <a:pPr/>
+                <a14:m>
+                  <m:oMathPara xmlns:m="http://schemas.openxmlformats.org/officeDocument/2006/math">
+                    <m:oMathParaPr>
+                      <m:jc m:val="centerGroup"/>
+                    </m:oMathParaPr>
+                    <m:oMath xmlns:m="http://schemas.openxmlformats.org/officeDocument/2006/math">
+                      <m:r>
+                        <a:rPr lang="en-US" sz="1400" b="0" i="1" smtClean="0">
+                          <a:latin typeface="Cambria Math" panose="02040503050406030204" pitchFamily="18" charset="0"/>
+                        </a:rPr>
+                        <m:t>𝑥</m:t>
+                      </m:r>
+                    </m:oMath>
+                  </m:oMathPara>
+                </a14:m>
+                <a:endParaRPr lang="uk-UA" dirty="0"/>
+              </a:p>
+            </p:txBody>
+          </p:sp>
+        </mc:Choice>
+        <mc:Fallback>
+          <p:sp>
+            <p:nvSpPr>
+              <p:cNvPr id="32" name="TextBox 31">
+                <a:extLst>
+                  <a:ext uri="{FF2B5EF4-FFF2-40B4-BE49-F238E27FC236}">
+                    <a16:creationId xmlns:a16="http://schemas.microsoft.com/office/drawing/2014/main" id="{8A17D514-0D58-834E-9390-9936A30CCF47}"/>
+                  </a:ext>
+                </a:extLst>
+              </p:cNvPr>
+              <p:cNvSpPr txBox="1">
+                <a:spLocks noRot="1" noChangeAspect="1" noMove="1" noResize="1" noEditPoints="1" noAdjustHandles="1" noChangeArrowheads="1" noChangeShapeType="1" noTextEdit="1"/>
+              </p:cNvSpPr>
+              <p:nvPr/>
+            </p:nvSpPr>
+            <p:spPr>
+              <a:xfrm>
+                <a:off x="7170579" y="3045387"/>
+                <a:ext cx="141705" cy="215444"/>
+              </a:xfrm>
+              <a:prstGeom prst="rect">
+                <a:avLst/>
+              </a:prstGeom>
+              <a:blipFill>
+                <a:blip r:embed="rId18"/>
+                <a:stretch>
+                  <a:fillRect l="-16667" r="-16667"/>
+                </a:stretch>
+              </a:blipFill>
+            </p:spPr>
+            <p:txBody>
+              <a:bodyPr/>
+              <a:lstStyle/>
+              <a:p>
+                <a:r>
+                  <a:rPr lang="uk-UA">
+                    <a:noFill/>
+                  </a:rPr>
+                  <a:t> </a:t>
+                </a:r>
+              </a:p>
+            </p:txBody>
+          </p:sp>
+        </mc:Fallback>
+      </mc:AlternateContent>
+      <mc:AlternateContent xmlns:mc="http://schemas.openxmlformats.org/markup-compatibility/2006">
+        <mc:Choice xmlns:a14="http://schemas.microsoft.com/office/drawing/2010/main" Requires="a14">
+          <p:sp>
+            <p:nvSpPr>
+              <p:cNvPr id="33" name="TextBox 32">
+                <a:extLst>
+                  <a:ext uri="{FF2B5EF4-FFF2-40B4-BE49-F238E27FC236}">
+                    <a16:creationId xmlns:a16="http://schemas.microsoft.com/office/drawing/2014/main" id="{99608CC4-7A13-1840-9494-6505896AEE82}"/>
+                  </a:ext>
+                </a:extLst>
+              </p:cNvPr>
+              <p:cNvSpPr txBox="1"/>
+              <p:nvPr/>
+            </p:nvSpPr>
+            <p:spPr>
+              <a:xfrm>
+                <a:off x="1081414" y="0"/>
+                <a:ext cx="197875" cy="215444"/>
+              </a:xfrm>
+              <a:prstGeom prst="rect">
+                <a:avLst/>
+              </a:prstGeom>
+              <a:noFill/>
+            </p:spPr>
+            <p:txBody>
+              <a:bodyPr wrap="none" lIns="0" tIns="0" rIns="0" bIns="0" rtlCol="0">
+                <a:spAutoFit/>
+              </a:bodyPr>
+              <a:lstStyle/>
+              <a:p>
+                <a:pPr/>
+                <a14:m>
+                  <m:oMathPara xmlns:m="http://schemas.openxmlformats.org/officeDocument/2006/math">
+                    <m:oMathParaPr>
+                      <m:jc m:val="centerGroup"/>
+                    </m:oMathParaPr>
+                    <m:oMath xmlns:m="http://schemas.openxmlformats.org/officeDocument/2006/math">
+                      <m:sSub>
+                        <m:sSubPr>
+                          <m:ctrlPr>
+                            <a:rPr lang="en-US" sz="1400" b="0" i="1" smtClean="0">
+                              <a:latin typeface="Cambria Math" panose="02040503050406030204" pitchFamily="18" charset="0"/>
+                            </a:rPr>
+                          </m:ctrlPr>
+                        </m:sSubPr>
+                        <m:e>
+                          <m:r>
+                            <a:rPr lang="en-US" sz="1400" b="0" i="1" smtClean="0">
+                              <a:latin typeface="Cambria Math" panose="02040503050406030204" pitchFamily="18" charset="0"/>
+                            </a:rPr>
+                            <m:t>h</m:t>
+                          </m:r>
+                        </m:e>
+                        <m:sub>
+                          <m:r>
+                            <a:rPr lang="en-US" sz="1400" b="0" i="1" smtClean="0">
+                              <a:latin typeface="Cambria Math" panose="02040503050406030204" pitchFamily="18" charset="0"/>
+                            </a:rPr>
+                            <m:t>𝑖</m:t>
+                          </m:r>
+                        </m:sub>
+                      </m:sSub>
+                    </m:oMath>
+                  </m:oMathPara>
+                </a14:m>
+                <a:endParaRPr lang="uk-UA" dirty="0"/>
+              </a:p>
+            </p:txBody>
+          </p:sp>
+        </mc:Choice>
+        <mc:Fallback>
+          <p:sp>
+            <p:nvSpPr>
+              <p:cNvPr id="33" name="TextBox 32">
+                <a:extLst>
+                  <a:ext uri="{FF2B5EF4-FFF2-40B4-BE49-F238E27FC236}">
+                    <a16:creationId xmlns:a16="http://schemas.microsoft.com/office/drawing/2014/main" id="{99608CC4-7A13-1840-9494-6505896AEE82}"/>
+                  </a:ext>
+                </a:extLst>
+              </p:cNvPr>
+              <p:cNvSpPr txBox="1">
+                <a:spLocks noRot="1" noChangeAspect="1" noMove="1" noResize="1" noEditPoints="1" noAdjustHandles="1" noChangeArrowheads="1" noChangeShapeType="1" noTextEdit="1"/>
+              </p:cNvSpPr>
+              <p:nvPr/>
+            </p:nvSpPr>
+            <p:spPr>
+              <a:xfrm>
+                <a:off x="1081414" y="0"/>
+                <a:ext cx="197875" cy="215444"/>
+              </a:xfrm>
+              <a:prstGeom prst="rect">
+                <a:avLst/>
+              </a:prstGeom>
+              <a:blipFill>
+                <a:blip r:embed="rId19"/>
+                <a:stretch>
+                  <a:fillRect l="-17647" r="-5882" b="-17647"/>
+                </a:stretch>
+              </a:blipFill>
+            </p:spPr>
+            <p:txBody>
+              <a:bodyPr/>
+              <a:lstStyle/>
+              <a:p>
+                <a:r>
+                  <a:rPr lang="uk-UA">
+                    <a:noFill/>
+                  </a:rPr>
+                  <a:t> </a:t>
+                </a:r>
+              </a:p>
+            </p:txBody>
+          </p:sp>
+        </mc:Fallback>
+      </mc:AlternateContent>
     </p:spTree>
     <p:extLst>
       <p:ext uri="{BB962C8B-B14F-4D97-AF65-F5344CB8AC3E}">
@@ -5568,8 +5801,8 @@
           </a:fontRef>
         </p:style>
       </p:cxnSp>
-      <mc:AlternateContent xmlns:mc="http://schemas.openxmlformats.org/markup-compatibility/2006">
-        <mc:Choice xmlns:a14="http://schemas.microsoft.com/office/drawing/2010/main" Requires="a14">
+      <mc:AlternateContent xmlns:mc="http://schemas.openxmlformats.org/markup-compatibility/2006" xmlns:a14="http://schemas.microsoft.com/office/drawing/2010/main">
+        <mc:Choice Requires="a14">
           <p:sp>
             <p:nvSpPr>
               <p:cNvPr id="9" name="TextBox 8">
@@ -5598,6 +5831,7 @@
               </a:bodyPr>
               <a:lstStyle/>
               <a:p>
+                <a:pPr/>
                 <a14:m>
                   <m:oMathPara xmlns:m="http://schemas.openxmlformats.org/officeDocument/2006/math">
                     <m:oMathParaPr>
@@ -5618,7 +5852,7 @@
             </p:txBody>
           </p:sp>
         </mc:Choice>
-        <mc:Fallback>
+        <mc:Fallback xmlns="">
           <p:sp>
             <p:nvSpPr>
               <p:cNvPr id="9" name="TextBox 8">
@@ -5663,8 +5897,8 @@
           </p:sp>
         </mc:Fallback>
       </mc:AlternateContent>
-      <mc:AlternateContent xmlns:mc="http://schemas.openxmlformats.org/markup-compatibility/2006">
-        <mc:Choice xmlns:a14="http://schemas.microsoft.com/office/drawing/2010/main" Requires="a14">
+      <mc:AlternateContent xmlns:mc="http://schemas.openxmlformats.org/markup-compatibility/2006" xmlns:a14="http://schemas.microsoft.com/office/drawing/2010/main">
+        <mc:Choice Requires="a14">
           <p:sp>
             <p:nvSpPr>
               <p:cNvPr id="10" name="TextBox 9">
@@ -5693,6 +5927,7 @@
               </a:bodyPr>
               <a:lstStyle/>
               <a:p>
+                <a:pPr/>
                 <a14:m>
                   <m:oMathPara xmlns:m="http://schemas.openxmlformats.org/officeDocument/2006/math">
                     <m:oMathParaPr>
@@ -5713,7 +5948,7 @@
             </p:txBody>
           </p:sp>
         </mc:Choice>
-        <mc:Fallback>
+        <mc:Fallback xmlns="">
           <p:sp>
             <p:nvSpPr>
               <p:cNvPr id="10" name="TextBox 9">
@@ -5758,8 +5993,8 @@
           </p:sp>
         </mc:Fallback>
       </mc:AlternateContent>
-      <mc:AlternateContent xmlns:mc="http://schemas.openxmlformats.org/markup-compatibility/2006">
-        <mc:Choice xmlns:a14="http://schemas.microsoft.com/office/drawing/2010/main" Requires="a14">
+      <mc:AlternateContent xmlns:mc="http://schemas.openxmlformats.org/markup-compatibility/2006" xmlns:a14="http://schemas.microsoft.com/office/drawing/2010/main">
+        <mc:Choice Requires="a14">
           <p:sp>
             <p:nvSpPr>
               <p:cNvPr id="11" name="TextBox 10">
@@ -5788,6 +6023,7 @@
               </a:bodyPr>
               <a:lstStyle/>
               <a:p>
+                <a:pPr/>
                 <a14:m>
                   <m:oMathPara xmlns:m="http://schemas.openxmlformats.org/officeDocument/2006/math">
                     <m:oMathParaPr>
@@ -5808,7 +6044,7 @@
             </p:txBody>
           </p:sp>
         </mc:Choice>
-        <mc:Fallback>
+        <mc:Fallback xmlns="">
           <p:sp>
             <p:nvSpPr>
               <p:cNvPr id="11" name="TextBox 10">
@@ -5853,8 +6089,8 @@
           </p:sp>
         </mc:Fallback>
       </mc:AlternateContent>
-      <mc:AlternateContent xmlns:mc="http://schemas.openxmlformats.org/markup-compatibility/2006">
-        <mc:Choice xmlns:a14="http://schemas.microsoft.com/office/drawing/2010/main" Requires="a14">
+      <mc:AlternateContent xmlns:mc="http://schemas.openxmlformats.org/markup-compatibility/2006" xmlns:a14="http://schemas.microsoft.com/office/drawing/2010/main">
+        <mc:Choice Requires="a14">
           <p:sp>
             <p:nvSpPr>
               <p:cNvPr id="18" name="TextBox 17">
@@ -5883,6 +6119,7 @@
               </a:bodyPr>
               <a:lstStyle/>
               <a:p>
+                <a:pPr/>
                 <a14:m>
                   <m:oMathPara xmlns:m="http://schemas.openxmlformats.org/officeDocument/2006/math">
                     <m:oMathParaPr>
@@ -5903,7 +6140,7 @@
             </p:txBody>
           </p:sp>
         </mc:Choice>
-        <mc:Fallback>
+        <mc:Fallback xmlns="">
           <p:sp>
             <p:nvSpPr>
               <p:cNvPr id="18" name="TextBox 17">
@@ -5948,8 +6185,8 @@
           </p:sp>
         </mc:Fallback>
       </mc:AlternateContent>
-      <mc:AlternateContent xmlns:mc="http://schemas.openxmlformats.org/markup-compatibility/2006">
-        <mc:Choice xmlns:a14="http://schemas.microsoft.com/office/drawing/2010/main" Requires="a14">
+      <mc:AlternateContent xmlns:mc="http://schemas.openxmlformats.org/markup-compatibility/2006" xmlns:a14="http://schemas.microsoft.com/office/drawing/2010/main">
+        <mc:Choice Requires="a14">
           <p:sp>
             <p:nvSpPr>
               <p:cNvPr id="19" name="TextBox 18">
@@ -5978,6 +6215,7 @@
               </a:bodyPr>
               <a:lstStyle/>
               <a:p>
+                <a:pPr/>
                 <a14:m>
                   <m:oMathPara xmlns:m="http://schemas.openxmlformats.org/officeDocument/2006/math">
                     <m:oMathParaPr>
@@ -6004,7 +6242,7 @@
             </p:txBody>
           </p:sp>
         </mc:Choice>
-        <mc:Fallback>
+        <mc:Fallback xmlns="">
           <p:sp>
             <p:nvSpPr>
               <p:cNvPr id="19" name="TextBox 18">
@@ -6049,8 +6287,8 @@
           </p:sp>
         </mc:Fallback>
       </mc:AlternateContent>
-      <mc:AlternateContent xmlns:mc="http://schemas.openxmlformats.org/markup-compatibility/2006">
-        <mc:Choice xmlns:a14="http://schemas.microsoft.com/office/drawing/2010/main" Requires="a14">
+      <mc:AlternateContent xmlns:mc="http://schemas.openxmlformats.org/markup-compatibility/2006" xmlns:a14="http://schemas.microsoft.com/office/drawing/2010/main">
+        <mc:Choice Requires="a14">
           <p:sp>
             <p:nvSpPr>
               <p:cNvPr id="20" name="TextBox 19">
@@ -6079,6 +6317,7 @@
               </a:bodyPr>
               <a:lstStyle/>
               <a:p>
+                <a:pPr/>
                 <a14:m>
                   <m:oMathPara xmlns:m="http://schemas.openxmlformats.org/officeDocument/2006/math">
                     <m:oMathParaPr>
@@ -6105,7 +6344,7 @@
             </p:txBody>
           </p:sp>
         </mc:Choice>
-        <mc:Fallback>
+        <mc:Fallback xmlns="">
           <p:sp>
             <p:nvSpPr>
               <p:cNvPr id="20" name="TextBox 19">
@@ -6150,8 +6389,8 @@
           </p:sp>
         </mc:Fallback>
       </mc:AlternateContent>
-      <mc:AlternateContent xmlns:mc="http://schemas.openxmlformats.org/markup-compatibility/2006">
-        <mc:Choice xmlns:a14="http://schemas.microsoft.com/office/drawing/2010/main" Requires="a14">
+      <mc:AlternateContent xmlns:mc="http://schemas.openxmlformats.org/markup-compatibility/2006" xmlns:a14="http://schemas.microsoft.com/office/drawing/2010/main">
+        <mc:Choice Requires="a14">
           <p:sp>
             <p:nvSpPr>
               <p:cNvPr id="21" name="TextBox 20">
@@ -6180,6 +6419,7 @@
               </a:bodyPr>
               <a:lstStyle/>
               <a:p>
+                <a:pPr/>
                 <a14:m>
                   <m:oMathPara xmlns:m="http://schemas.openxmlformats.org/officeDocument/2006/math">
                     <m:oMathParaPr>
@@ -6206,7 +6446,7 @@
             </p:txBody>
           </p:sp>
         </mc:Choice>
-        <mc:Fallback>
+        <mc:Fallback xmlns="">
           <p:sp>
             <p:nvSpPr>
               <p:cNvPr id="21" name="TextBox 20">
@@ -6251,8 +6491,8 @@
           </p:sp>
         </mc:Fallback>
       </mc:AlternateContent>
-      <mc:AlternateContent xmlns:mc="http://schemas.openxmlformats.org/markup-compatibility/2006">
-        <mc:Choice xmlns:a14="http://schemas.microsoft.com/office/drawing/2010/main" Requires="a14">
+      <mc:AlternateContent xmlns:mc="http://schemas.openxmlformats.org/markup-compatibility/2006" xmlns:a14="http://schemas.microsoft.com/office/drawing/2010/main">
+        <mc:Choice Requires="a14">
           <p:sp>
             <p:nvSpPr>
               <p:cNvPr id="22" name="TextBox 21">
@@ -6281,6 +6521,7 @@
               </a:bodyPr>
               <a:lstStyle/>
               <a:p>
+                <a:pPr/>
                 <a14:m>
                   <m:oMathPara xmlns:m="http://schemas.openxmlformats.org/officeDocument/2006/math">
                     <m:oMathParaPr>
@@ -6307,7 +6548,7 @@
             </p:txBody>
           </p:sp>
         </mc:Choice>
-        <mc:Fallback>
+        <mc:Fallback xmlns="">
           <p:sp>
             <p:nvSpPr>
               <p:cNvPr id="22" name="TextBox 21">
@@ -7238,8 +7479,8 @@
           </a:fontRef>
         </p:style>
       </p:cxnSp>
-      <mc:AlternateContent xmlns:mc="http://schemas.openxmlformats.org/markup-compatibility/2006">
-        <mc:Choice xmlns:a14="http://schemas.microsoft.com/office/drawing/2010/main" Requires="a14">
+      <mc:AlternateContent xmlns:mc="http://schemas.openxmlformats.org/markup-compatibility/2006" xmlns:a14="http://schemas.microsoft.com/office/drawing/2010/main">
+        <mc:Choice Requires="a14">
           <p:sp>
             <p:nvSpPr>
               <p:cNvPr id="85" name="TextBox 84">
@@ -7268,6 +7509,7 @@
               </a:bodyPr>
               <a:lstStyle/>
               <a:p>
+                <a:pPr/>
                 <a14:m>
                   <m:oMathPara xmlns:m="http://schemas.openxmlformats.org/officeDocument/2006/math">
                     <m:oMathParaPr>
@@ -7288,7 +7530,7 @@
             </p:txBody>
           </p:sp>
         </mc:Choice>
-        <mc:Fallback>
+        <mc:Fallback xmlns="">
           <p:sp>
             <p:nvSpPr>
               <p:cNvPr id="85" name="TextBox 84">
@@ -7333,8 +7575,8 @@
           </p:sp>
         </mc:Fallback>
       </mc:AlternateContent>
-      <mc:AlternateContent xmlns:mc="http://schemas.openxmlformats.org/markup-compatibility/2006">
-        <mc:Choice xmlns:a14="http://schemas.microsoft.com/office/drawing/2010/main" Requires="a14">
+      <mc:AlternateContent xmlns:mc="http://schemas.openxmlformats.org/markup-compatibility/2006" xmlns:a14="http://schemas.microsoft.com/office/drawing/2010/main">
+        <mc:Choice Requires="a14">
           <p:sp>
             <p:nvSpPr>
               <p:cNvPr id="87" name="TextBox 86">
@@ -7363,6 +7605,7 @@
               </a:bodyPr>
               <a:lstStyle/>
               <a:p>
+                <a:pPr/>
                 <a14:m>
                   <m:oMathPara xmlns:m="http://schemas.openxmlformats.org/officeDocument/2006/math">
                     <m:oMathParaPr>
@@ -7383,7 +7626,7 @@
             </p:txBody>
           </p:sp>
         </mc:Choice>
-        <mc:Fallback>
+        <mc:Fallback xmlns="">
           <p:sp>
             <p:nvSpPr>
               <p:cNvPr id="87" name="TextBox 86">
@@ -7428,8 +7671,8 @@
           </p:sp>
         </mc:Fallback>
       </mc:AlternateContent>
-      <mc:AlternateContent xmlns:mc="http://schemas.openxmlformats.org/markup-compatibility/2006">
-        <mc:Choice xmlns:a14="http://schemas.microsoft.com/office/drawing/2010/main" Requires="a14">
+      <mc:AlternateContent xmlns:mc="http://schemas.openxmlformats.org/markup-compatibility/2006" xmlns:a14="http://schemas.microsoft.com/office/drawing/2010/main">
+        <mc:Choice Requires="a14">
           <p:sp>
             <p:nvSpPr>
               <p:cNvPr id="88" name="TextBox 87">
@@ -7458,6 +7701,7 @@
               </a:bodyPr>
               <a:lstStyle/>
               <a:p>
+                <a:pPr/>
                 <a14:m>
                   <m:oMathPara xmlns:m="http://schemas.openxmlformats.org/officeDocument/2006/math">
                     <m:oMathParaPr>
@@ -7478,7 +7722,7 @@
             </p:txBody>
           </p:sp>
         </mc:Choice>
-        <mc:Fallback>
+        <mc:Fallback xmlns="">
           <p:sp>
             <p:nvSpPr>
               <p:cNvPr id="88" name="TextBox 87">
@@ -7523,8 +7767,8 @@
           </p:sp>
         </mc:Fallback>
       </mc:AlternateContent>
-      <mc:AlternateContent xmlns:mc="http://schemas.openxmlformats.org/markup-compatibility/2006">
-        <mc:Choice xmlns:a14="http://schemas.microsoft.com/office/drawing/2010/main" Requires="a14">
+      <mc:AlternateContent xmlns:mc="http://schemas.openxmlformats.org/markup-compatibility/2006" xmlns:a14="http://schemas.microsoft.com/office/drawing/2010/main">
+        <mc:Choice Requires="a14">
           <p:sp>
             <p:nvSpPr>
               <p:cNvPr id="89" name="TextBox 88">
@@ -7553,6 +7797,7 @@
               </a:bodyPr>
               <a:lstStyle/>
               <a:p>
+                <a:pPr/>
                 <a14:m>
                   <m:oMathPara xmlns:m="http://schemas.openxmlformats.org/officeDocument/2006/math">
                     <m:oMathParaPr>
@@ -7573,7 +7818,7 @@
             </p:txBody>
           </p:sp>
         </mc:Choice>
-        <mc:Fallback>
+        <mc:Fallback xmlns="">
           <p:sp>
             <p:nvSpPr>
               <p:cNvPr id="89" name="TextBox 88">
@@ -7618,8 +7863,8 @@
           </p:sp>
         </mc:Fallback>
       </mc:AlternateContent>
-      <mc:AlternateContent xmlns:mc="http://schemas.openxmlformats.org/markup-compatibility/2006">
-        <mc:Choice xmlns:a14="http://schemas.microsoft.com/office/drawing/2010/main" Requires="a14">
+      <mc:AlternateContent xmlns:mc="http://schemas.openxmlformats.org/markup-compatibility/2006" xmlns:a14="http://schemas.microsoft.com/office/drawing/2010/main">
+        <mc:Choice Requires="a14">
           <p:sp>
             <p:nvSpPr>
               <p:cNvPr id="90" name="TextBox 89">
@@ -7648,6 +7893,7 @@
               </a:bodyPr>
               <a:lstStyle/>
               <a:p>
+                <a:pPr/>
                 <a14:m>
                   <m:oMathPara xmlns:m="http://schemas.openxmlformats.org/officeDocument/2006/math">
                     <m:oMathParaPr>
@@ -7668,7 +7914,7 @@
             </p:txBody>
           </p:sp>
         </mc:Choice>
-        <mc:Fallback>
+        <mc:Fallback xmlns="">
           <p:sp>
             <p:nvSpPr>
               <p:cNvPr id="90" name="TextBox 89">
@@ -7730,7 +7976,7 @@
             <p:spPr>
               <a:xfrm>
                 <a:off x="841358" y="183032"/>
-                <a:ext cx="475130" cy="215444"/>
+                <a:ext cx="620363" cy="215444"/>
               </a:xfrm>
               <a:prstGeom prst="rect">
                 <a:avLst/>
@@ -7743,6 +7989,7 @@
               </a:bodyPr>
               <a:lstStyle/>
               <a:p>
+                <a:pPr/>
                 <a14:m>
                   <m:oMathPara xmlns:m="http://schemas.openxmlformats.org/officeDocument/2006/math">
                     <m:oMathParaPr>
@@ -7782,24 +8029,42 @@
                           </m:r>
                         </m:sup>
                       </m:sSubSup>
-                      <m:r>
-                        <a:rPr lang="en-US" sz="1400" b="0" i="1" smtClean="0">
-                          <a:latin typeface="Cambria Math" panose="02040503050406030204" pitchFamily="18" charset="0"/>
-                        </a:rPr>
-                        <m:t>(</m:t>
-                      </m:r>
-                      <m:r>
-                        <a:rPr lang="en-US" sz="1400" b="0" i="1" smtClean="0">
-                          <a:latin typeface="Cambria Math" panose="02040503050406030204" pitchFamily="18" charset="0"/>
-                        </a:rPr>
-                        <m:t>𝑥</m:t>
-                      </m:r>
-                      <m:r>
-                        <a:rPr lang="en-US" sz="1400" b="0" i="1" smtClean="0">
-                          <a:latin typeface="Cambria Math" panose="02040503050406030204" pitchFamily="18" charset="0"/>
-                        </a:rPr>
-                        <m:t>)</m:t>
-                      </m:r>
+                      <m:sSub>
+                        <m:sSubPr>
+                          <m:ctrlPr>
+                            <a:rPr lang="uk-UA" sz="1400" b="0" i="1" smtClean="0">
+                              <a:latin typeface="Cambria Math" panose="02040503050406030204" pitchFamily="18" charset="0"/>
+                            </a:rPr>
+                          </m:ctrlPr>
+                        </m:sSubPr>
+                        <m:e>
+                          <m:d>
+                            <m:dPr>
+                              <m:ctrlPr>
+                                <a:rPr lang="en-US" sz="1400" b="0" i="1" smtClean="0">
+                                  <a:latin typeface="Cambria Math" panose="02040503050406030204" pitchFamily="18" charset="0"/>
+                                </a:rPr>
+                              </m:ctrlPr>
+                            </m:dPr>
+                            <m:e>
+                              <m:r>
+                                <a:rPr lang="en-US" sz="1400" b="0" i="1" smtClean="0">
+                                  <a:latin typeface="Cambria Math" panose="02040503050406030204" pitchFamily="18" charset="0"/>
+                                </a:rPr>
+                                <m:t>𝑥</m:t>
+                              </m:r>
+                            </m:e>
+                          </m:d>
+                        </m:e>
+                        <m:sub>
+                          <m:r>
+                            <a:rPr lang="uk-UA" sz="1400" b="0" i="1" smtClean="0">
+                              <a:latin typeface="Cambria Math" panose="02040503050406030204" pitchFamily="18" charset="0"/>
+                            </a:rPr>
+                            <m:t>зн</m:t>
+                          </m:r>
+                        </m:sub>
+                      </m:sSub>
                     </m:oMath>
                   </m:oMathPara>
                 </a14:m>
@@ -7826,7 +8091,7 @@
             <p:spPr>
               <a:xfrm>
                 <a:off x="841358" y="183032"/>
-                <a:ext cx="475130" cy="215444"/>
+                <a:ext cx="620363" cy="215444"/>
               </a:xfrm>
               <a:prstGeom prst="rect">
                 <a:avLst/>
@@ -7834,7 +8099,7 @@
               <a:blipFill>
                 <a:blip r:embed="rId15"/>
                 <a:stretch>
-                  <a:fillRect l="-7895" t="-5556" r="-13158" b="-27778"/>
+                  <a:fillRect l="-6000" b="-11111"/>
                 </a:stretch>
               </a:blipFill>
             </p:spPr>
@@ -7853,8 +8118,8 @@
           </p:sp>
         </mc:Fallback>
       </mc:AlternateContent>
-      <mc:AlternateContent xmlns:mc="http://schemas.openxmlformats.org/markup-compatibility/2006">
-        <mc:Choice xmlns:a14="http://schemas.microsoft.com/office/drawing/2010/main" Requires="a14">
+      <mc:AlternateContent xmlns:mc="http://schemas.openxmlformats.org/markup-compatibility/2006" xmlns:a14="http://schemas.microsoft.com/office/drawing/2010/main">
+        <mc:Choice Requires="a14">
           <p:sp>
             <p:nvSpPr>
               <p:cNvPr id="94" name="TextBox 93">
@@ -7883,6 +8148,7 @@
               </a:bodyPr>
               <a:lstStyle/>
               <a:p>
+                <a:pPr/>
                 <a14:m>
                   <m:oMathPara xmlns:m="http://schemas.openxmlformats.org/officeDocument/2006/math">
                     <m:oMathParaPr>
@@ -7903,7 +8169,7 @@
             </p:txBody>
           </p:sp>
         </mc:Choice>
-        <mc:Fallback>
+        <mc:Fallback xmlns="">
           <p:sp>
             <p:nvSpPr>
               <p:cNvPr id="94" name="TextBox 93">
@@ -8060,8 +8326,8 @@
           </a:fontRef>
         </p:style>
       </p:cxnSp>
-      <mc:AlternateContent xmlns:mc="http://schemas.openxmlformats.org/markup-compatibility/2006">
-        <mc:Choice xmlns:a14="http://schemas.microsoft.com/office/drawing/2010/main" Requires="a14">
+      <mc:AlternateContent xmlns:mc="http://schemas.openxmlformats.org/markup-compatibility/2006" xmlns:a14="http://schemas.microsoft.com/office/drawing/2010/main">
+        <mc:Choice Requires="a14">
           <p:sp>
             <p:nvSpPr>
               <p:cNvPr id="6" name="TextBox 5">
@@ -8090,6 +8356,7 @@
               </a:bodyPr>
               <a:lstStyle/>
               <a:p>
+                <a:pPr/>
                 <a14:m>
                   <m:oMathPara xmlns:m="http://schemas.openxmlformats.org/officeDocument/2006/math">
                     <m:oMathParaPr>
@@ -8110,7 +8377,7 @@
             </p:txBody>
           </p:sp>
         </mc:Choice>
-        <mc:Fallback>
+        <mc:Fallback xmlns="">
           <p:sp>
             <p:nvSpPr>
               <p:cNvPr id="6" name="TextBox 5">
@@ -8155,8 +8422,8 @@
           </p:sp>
         </mc:Fallback>
       </mc:AlternateContent>
-      <mc:AlternateContent xmlns:mc="http://schemas.openxmlformats.org/markup-compatibility/2006">
-        <mc:Choice xmlns:a14="http://schemas.microsoft.com/office/drawing/2010/main" Requires="a14">
+      <mc:AlternateContent xmlns:mc="http://schemas.openxmlformats.org/markup-compatibility/2006" xmlns:a14="http://schemas.microsoft.com/office/drawing/2010/main">
+        <mc:Choice Requires="a14">
           <p:sp>
             <p:nvSpPr>
               <p:cNvPr id="7" name="TextBox 6">
@@ -8185,6 +8452,7 @@
               </a:bodyPr>
               <a:lstStyle/>
               <a:p>
+                <a:pPr/>
                 <a14:m>
                   <m:oMathPara xmlns:m="http://schemas.openxmlformats.org/officeDocument/2006/math">
                     <m:oMathParaPr>
@@ -8205,7 +8473,7 @@
             </p:txBody>
           </p:sp>
         </mc:Choice>
-        <mc:Fallback>
+        <mc:Fallback xmlns="">
           <p:sp>
             <p:nvSpPr>
               <p:cNvPr id="7" name="TextBox 6">
@@ -8250,8 +8518,8 @@
           </p:sp>
         </mc:Fallback>
       </mc:AlternateContent>
-      <mc:AlternateContent xmlns:mc="http://schemas.openxmlformats.org/markup-compatibility/2006">
-        <mc:Choice xmlns:a14="http://schemas.microsoft.com/office/drawing/2010/main" Requires="a14">
+      <mc:AlternateContent xmlns:mc="http://schemas.openxmlformats.org/markup-compatibility/2006" xmlns:a14="http://schemas.microsoft.com/office/drawing/2010/main">
+        <mc:Choice Requires="a14">
           <p:sp>
             <p:nvSpPr>
               <p:cNvPr id="8" name="TextBox 7">
@@ -8280,6 +8548,7 @@
               </a:bodyPr>
               <a:lstStyle/>
               <a:p>
+                <a:pPr/>
                 <a14:m>
                   <m:oMathPara xmlns:m="http://schemas.openxmlformats.org/officeDocument/2006/math">
                     <m:oMathParaPr>
@@ -8300,7 +8569,7 @@
             </p:txBody>
           </p:sp>
         </mc:Choice>
-        <mc:Fallback>
+        <mc:Fallback xmlns="">
           <p:sp>
             <p:nvSpPr>
               <p:cNvPr id="8" name="TextBox 7">
@@ -8345,8 +8614,8 @@
           </p:sp>
         </mc:Fallback>
       </mc:AlternateContent>
-      <mc:AlternateContent xmlns:mc="http://schemas.openxmlformats.org/markup-compatibility/2006">
-        <mc:Choice xmlns:a14="http://schemas.microsoft.com/office/drawing/2010/main" Requires="a14">
+      <mc:AlternateContent xmlns:mc="http://schemas.openxmlformats.org/markup-compatibility/2006" xmlns:a14="http://schemas.microsoft.com/office/drawing/2010/main">
+        <mc:Choice Requires="a14">
           <p:sp>
             <p:nvSpPr>
               <p:cNvPr id="9" name="TextBox 8">
@@ -8375,6 +8644,7 @@
               </a:bodyPr>
               <a:lstStyle/>
               <a:p>
+                <a:pPr/>
                 <a14:m>
                   <m:oMathPara xmlns:m="http://schemas.openxmlformats.org/officeDocument/2006/math">
                     <m:oMathParaPr>
@@ -8395,7 +8665,7 @@
             </p:txBody>
           </p:sp>
         </mc:Choice>
-        <mc:Fallback>
+        <mc:Fallback xmlns="">
           <p:sp>
             <p:nvSpPr>
               <p:cNvPr id="9" name="TextBox 8">
@@ -8440,8 +8710,8 @@
           </p:sp>
         </mc:Fallback>
       </mc:AlternateContent>
-      <mc:AlternateContent xmlns:mc="http://schemas.openxmlformats.org/markup-compatibility/2006">
-        <mc:Choice xmlns:a14="http://schemas.microsoft.com/office/drawing/2010/main" Requires="a14">
+      <mc:AlternateContent xmlns:mc="http://schemas.openxmlformats.org/markup-compatibility/2006" xmlns:a14="http://schemas.microsoft.com/office/drawing/2010/main">
+        <mc:Choice Requires="a14">
           <p:sp>
             <p:nvSpPr>
               <p:cNvPr id="10" name="TextBox 9">
@@ -8470,6 +8740,7 @@
               </a:bodyPr>
               <a:lstStyle/>
               <a:p>
+                <a:pPr/>
                 <a14:m>
                   <m:oMathPara xmlns:m="http://schemas.openxmlformats.org/officeDocument/2006/math">
                     <m:oMathParaPr>
@@ -8496,7 +8767,7 @@
             </p:txBody>
           </p:sp>
         </mc:Choice>
-        <mc:Fallback>
+        <mc:Fallback xmlns="">
           <p:sp>
             <p:nvSpPr>
               <p:cNvPr id="10" name="TextBox 9">
@@ -8541,8 +8812,8 @@
           </p:sp>
         </mc:Fallback>
       </mc:AlternateContent>
-      <mc:AlternateContent xmlns:mc="http://schemas.openxmlformats.org/markup-compatibility/2006">
-        <mc:Choice xmlns:a14="http://schemas.microsoft.com/office/drawing/2010/main" Requires="a14">
+      <mc:AlternateContent xmlns:mc="http://schemas.openxmlformats.org/markup-compatibility/2006" xmlns:a14="http://schemas.microsoft.com/office/drawing/2010/main">
+        <mc:Choice Requires="a14">
           <p:sp>
             <p:nvSpPr>
               <p:cNvPr id="11" name="TextBox 10">
@@ -8571,6 +8842,7 @@
               </a:bodyPr>
               <a:lstStyle/>
               <a:p>
+                <a:pPr/>
                 <a14:m>
                   <m:oMathPara xmlns:m="http://schemas.openxmlformats.org/officeDocument/2006/math">
                     <m:oMathParaPr>
@@ -8597,7 +8869,7 @@
             </p:txBody>
           </p:sp>
         </mc:Choice>
-        <mc:Fallback>
+        <mc:Fallback xmlns="">
           <p:sp>
             <p:nvSpPr>
               <p:cNvPr id="11" name="TextBox 10">
@@ -8642,8 +8914,8 @@
           </p:sp>
         </mc:Fallback>
       </mc:AlternateContent>
-      <mc:AlternateContent xmlns:mc="http://schemas.openxmlformats.org/markup-compatibility/2006">
-        <mc:Choice xmlns:a14="http://schemas.microsoft.com/office/drawing/2010/main" Requires="a14">
+      <mc:AlternateContent xmlns:mc="http://schemas.openxmlformats.org/markup-compatibility/2006" xmlns:a14="http://schemas.microsoft.com/office/drawing/2010/main">
+        <mc:Choice Requires="a14">
           <p:sp>
             <p:nvSpPr>
               <p:cNvPr id="12" name="TextBox 11">
@@ -8672,6 +8944,7 @@
               </a:bodyPr>
               <a:lstStyle/>
               <a:p>
+                <a:pPr/>
                 <a14:m>
                   <m:oMathPara xmlns:m="http://schemas.openxmlformats.org/officeDocument/2006/math">
                     <m:oMathParaPr>
@@ -8698,7 +8971,7 @@
             </p:txBody>
           </p:sp>
         </mc:Choice>
-        <mc:Fallback>
+        <mc:Fallback xmlns="">
           <p:sp>
             <p:nvSpPr>
               <p:cNvPr id="12" name="TextBox 11">
@@ -8743,8 +9016,8 @@
           </p:sp>
         </mc:Fallback>
       </mc:AlternateContent>
-      <mc:AlternateContent xmlns:mc="http://schemas.openxmlformats.org/markup-compatibility/2006">
-        <mc:Choice xmlns:a14="http://schemas.microsoft.com/office/drawing/2010/main" Requires="a14">
+      <mc:AlternateContent xmlns:mc="http://schemas.openxmlformats.org/markup-compatibility/2006" xmlns:a14="http://schemas.microsoft.com/office/drawing/2010/main">
+        <mc:Choice Requires="a14">
           <p:sp>
             <p:nvSpPr>
               <p:cNvPr id="13" name="TextBox 12">
@@ -8773,6 +9046,7 @@
               </a:bodyPr>
               <a:lstStyle/>
               <a:p>
+                <a:pPr/>
                 <a14:m>
                   <m:oMathPara xmlns:m="http://schemas.openxmlformats.org/officeDocument/2006/math">
                     <m:oMathParaPr>
@@ -8799,7 +9073,7 @@
             </p:txBody>
           </p:sp>
         </mc:Choice>
-        <mc:Fallback>
+        <mc:Fallback xmlns="">
           <p:sp>
             <p:nvSpPr>
               <p:cNvPr id="13" name="TextBox 12">
@@ -9453,8 +9727,8 @@
           </a:fontRef>
         </p:style>
       </p:cxnSp>
-      <mc:AlternateContent xmlns:mc="http://schemas.openxmlformats.org/markup-compatibility/2006">
-        <mc:Choice xmlns:a14="http://schemas.microsoft.com/office/drawing/2010/main" Requires="a14">
+      <mc:AlternateContent xmlns:mc="http://schemas.openxmlformats.org/markup-compatibility/2006" xmlns:a14="http://schemas.microsoft.com/office/drawing/2010/main">
+        <mc:Choice Requires="a14">
           <p:sp>
             <p:nvSpPr>
               <p:cNvPr id="36" name="TextBox 35">
@@ -9483,6 +9757,7 @@
               </a:bodyPr>
               <a:lstStyle/>
               <a:p>
+                <a:pPr/>
                 <a14:m>
                   <m:oMathPara xmlns:m="http://schemas.openxmlformats.org/officeDocument/2006/math">
                     <m:oMathParaPr>
@@ -9503,7 +9778,7 @@
             </p:txBody>
           </p:sp>
         </mc:Choice>
-        <mc:Fallback>
+        <mc:Fallback xmlns="">
           <p:sp>
             <p:nvSpPr>
               <p:cNvPr id="36" name="TextBox 35">
@@ -9548,8 +9823,8 @@
           </p:sp>
         </mc:Fallback>
       </mc:AlternateContent>
-      <mc:AlternateContent xmlns:mc="http://schemas.openxmlformats.org/markup-compatibility/2006">
-        <mc:Choice xmlns:a14="http://schemas.microsoft.com/office/drawing/2010/main" Requires="a14">
+      <mc:AlternateContent xmlns:mc="http://schemas.openxmlformats.org/markup-compatibility/2006" xmlns:a14="http://schemas.microsoft.com/office/drawing/2010/main">
+        <mc:Choice Requires="a14">
           <p:sp>
             <p:nvSpPr>
               <p:cNvPr id="37" name="TextBox 36">
@@ -9578,6 +9853,7 @@
               </a:bodyPr>
               <a:lstStyle/>
               <a:p>
+                <a:pPr/>
                 <a14:m>
                   <m:oMathPara xmlns:m="http://schemas.openxmlformats.org/officeDocument/2006/math">
                     <m:oMathParaPr>
@@ -9598,7 +9874,7 @@
             </p:txBody>
           </p:sp>
         </mc:Choice>
-        <mc:Fallback>
+        <mc:Fallback xmlns="">
           <p:sp>
             <p:nvSpPr>
               <p:cNvPr id="37" name="TextBox 36">
@@ -9643,8 +9919,8 @@
           </p:sp>
         </mc:Fallback>
       </mc:AlternateContent>
-      <mc:AlternateContent xmlns:mc="http://schemas.openxmlformats.org/markup-compatibility/2006">
-        <mc:Choice xmlns:a14="http://schemas.microsoft.com/office/drawing/2010/main" Requires="a14">
+      <mc:AlternateContent xmlns:mc="http://schemas.openxmlformats.org/markup-compatibility/2006" xmlns:a14="http://schemas.microsoft.com/office/drawing/2010/main">
+        <mc:Choice Requires="a14">
           <p:sp>
             <p:nvSpPr>
               <p:cNvPr id="38" name="TextBox 37">
@@ -9673,6 +9949,7 @@
               </a:bodyPr>
               <a:lstStyle/>
               <a:p>
+                <a:pPr/>
                 <a14:m>
                   <m:oMathPara xmlns:m="http://schemas.openxmlformats.org/officeDocument/2006/math">
                     <m:oMathParaPr>
@@ -9693,7 +9970,7 @@
             </p:txBody>
           </p:sp>
         </mc:Choice>
-        <mc:Fallback>
+        <mc:Fallback xmlns="">
           <p:sp>
             <p:nvSpPr>
               <p:cNvPr id="38" name="TextBox 37">
@@ -9738,8 +10015,8 @@
           </p:sp>
         </mc:Fallback>
       </mc:AlternateContent>
-      <mc:AlternateContent xmlns:mc="http://schemas.openxmlformats.org/markup-compatibility/2006">
-        <mc:Choice xmlns:a14="http://schemas.microsoft.com/office/drawing/2010/main" Requires="a14">
+      <mc:AlternateContent xmlns:mc="http://schemas.openxmlformats.org/markup-compatibility/2006" xmlns:a14="http://schemas.microsoft.com/office/drawing/2010/main">
+        <mc:Choice Requires="a14">
           <p:sp>
             <p:nvSpPr>
               <p:cNvPr id="39" name="TextBox 38">
@@ -9768,6 +10045,7 @@
               </a:bodyPr>
               <a:lstStyle/>
               <a:p>
+                <a:pPr/>
                 <a14:m>
                   <m:oMathPara xmlns:m="http://schemas.openxmlformats.org/officeDocument/2006/math">
                     <m:oMathParaPr>
@@ -9788,7 +10066,7 @@
             </p:txBody>
           </p:sp>
         </mc:Choice>
-        <mc:Fallback>
+        <mc:Fallback xmlns="">
           <p:sp>
             <p:nvSpPr>
               <p:cNvPr id="39" name="TextBox 38">
@@ -9833,8 +10111,8 @@
           </p:sp>
         </mc:Fallback>
       </mc:AlternateContent>
-      <mc:AlternateContent xmlns:mc="http://schemas.openxmlformats.org/markup-compatibility/2006">
-        <mc:Choice xmlns:a14="http://schemas.microsoft.com/office/drawing/2010/main" Requires="a14">
+      <mc:AlternateContent xmlns:mc="http://schemas.openxmlformats.org/markup-compatibility/2006" xmlns:a14="http://schemas.microsoft.com/office/drawing/2010/main">
+        <mc:Choice Requires="a14">
           <p:sp>
             <p:nvSpPr>
               <p:cNvPr id="40" name="TextBox 39">
@@ -9863,6 +10141,7 @@
               </a:bodyPr>
               <a:lstStyle/>
               <a:p>
+                <a:pPr/>
                 <a14:m>
                   <m:oMathPara xmlns:m="http://schemas.openxmlformats.org/officeDocument/2006/math">
                     <m:oMathParaPr>
@@ -9883,7 +10162,7 @@
             </p:txBody>
           </p:sp>
         </mc:Choice>
-        <mc:Fallback>
+        <mc:Fallback xmlns="">
           <p:sp>
             <p:nvSpPr>
               <p:cNvPr id="40" name="TextBox 39">
@@ -9928,8 +10207,8 @@
           </p:sp>
         </mc:Fallback>
       </mc:AlternateContent>
-      <mc:AlternateContent xmlns:mc="http://schemas.openxmlformats.org/markup-compatibility/2006">
-        <mc:Choice xmlns:a14="http://schemas.microsoft.com/office/drawing/2010/main" Requires="a14">
+      <mc:AlternateContent xmlns:mc="http://schemas.openxmlformats.org/markup-compatibility/2006" xmlns:a14="http://schemas.microsoft.com/office/drawing/2010/main">
+        <mc:Choice Requires="a14">
           <p:sp>
             <p:nvSpPr>
               <p:cNvPr id="41" name="TextBox 40">
@@ -9958,6 +10237,7 @@
               </a:bodyPr>
               <a:lstStyle/>
               <a:p>
+                <a:pPr/>
                 <a14:m>
                   <m:oMathPara xmlns:m="http://schemas.openxmlformats.org/officeDocument/2006/math">
                     <m:oMathParaPr>
@@ -10023,7 +10303,7 @@
             </p:txBody>
           </p:sp>
         </mc:Choice>
-        <mc:Fallback>
+        <mc:Fallback xmlns="">
           <p:sp>
             <p:nvSpPr>
               <p:cNvPr id="41" name="TextBox 40">
@@ -10068,8 +10348,8 @@
           </p:sp>
         </mc:Fallback>
       </mc:AlternateContent>
-      <mc:AlternateContent xmlns:mc="http://schemas.openxmlformats.org/markup-compatibility/2006">
-        <mc:Choice xmlns:a14="http://schemas.microsoft.com/office/drawing/2010/main" Requires="a14">
+      <mc:AlternateContent xmlns:mc="http://schemas.openxmlformats.org/markup-compatibility/2006" xmlns:a14="http://schemas.microsoft.com/office/drawing/2010/main">
+        <mc:Choice Requires="a14">
           <p:sp>
             <p:nvSpPr>
               <p:cNvPr id="42" name="TextBox 41">
@@ -10098,6 +10378,7 @@
               </a:bodyPr>
               <a:lstStyle/>
               <a:p>
+                <a:pPr/>
                 <a14:m>
                   <m:oMathPara xmlns:m="http://schemas.openxmlformats.org/officeDocument/2006/math">
                     <m:oMathParaPr>
@@ -10118,7 +10399,7 @@
             </p:txBody>
           </p:sp>
         </mc:Choice>
-        <mc:Fallback>
+        <mc:Fallback xmlns="">
           <p:sp>
             <p:nvSpPr>
               <p:cNvPr id="42" name="TextBox 41">
@@ -10576,8 +10857,8 @@
           </a:fontRef>
         </p:style>
       </p:cxnSp>
-      <mc:AlternateContent xmlns:mc="http://schemas.openxmlformats.org/markup-compatibility/2006">
-        <mc:Choice xmlns:a14="http://schemas.microsoft.com/office/drawing/2010/main" Requires="a14">
+      <mc:AlternateContent xmlns:mc="http://schemas.openxmlformats.org/markup-compatibility/2006" xmlns:a14="http://schemas.microsoft.com/office/drawing/2010/main">
+        <mc:Choice Requires="a14">
           <p:sp>
             <p:nvSpPr>
               <p:cNvPr id="6" name="TextBox 5">
@@ -10606,6 +10887,7 @@
               </a:bodyPr>
               <a:lstStyle/>
               <a:p>
+                <a:pPr/>
                 <a14:m>
                   <m:oMathPara xmlns:m="http://schemas.openxmlformats.org/officeDocument/2006/math">
                     <m:oMathParaPr>
@@ -10626,7 +10908,7 @@
             </p:txBody>
           </p:sp>
         </mc:Choice>
-        <mc:Fallback>
+        <mc:Fallback xmlns="">
           <p:sp>
             <p:nvSpPr>
               <p:cNvPr id="6" name="TextBox 5">
@@ -10671,8 +10953,8 @@
           </p:sp>
         </mc:Fallback>
       </mc:AlternateContent>
-      <mc:AlternateContent xmlns:mc="http://schemas.openxmlformats.org/markup-compatibility/2006">
-        <mc:Choice xmlns:a14="http://schemas.microsoft.com/office/drawing/2010/main" Requires="a14">
+      <mc:AlternateContent xmlns:mc="http://schemas.openxmlformats.org/markup-compatibility/2006" xmlns:a14="http://schemas.microsoft.com/office/drawing/2010/main">
+        <mc:Choice Requires="a14">
           <p:sp>
             <p:nvSpPr>
               <p:cNvPr id="7" name="TextBox 6">
@@ -10701,6 +10983,7 @@
               </a:bodyPr>
               <a:lstStyle/>
               <a:p>
+                <a:pPr/>
                 <a14:m>
                   <m:oMathPara xmlns:m="http://schemas.openxmlformats.org/officeDocument/2006/math">
                     <m:oMathParaPr>
@@ -10721,7 +11004,7 @@
             </p:txBody>
           </p:sp>
         </mc:Choice>
-        <mc:Fallback>
+        <mc:Fallback xmlns="">
           <p:sp>
             <p:nvSpPr>
               <p:cNvPr id="7" name="TextBox 6">
@@ -10766,8 +11049,8 @@
           </p:sp>
         </mc:Fallback>
       </mc:AlternateContent>
-      <mc:AlternateContent xmlns:mc="http://schemas.openxmlformats.org/markup-compatibility/2006">
-        <mc:Choice xmlns:a14="http://schemas.microsoft.com/office/drawing/2010/main" Requires="a14">
+      <mc:AlternateContent xmlns:mc="http://schemas.openxmlformats.org/markup-compatibility/2006" xmlns:a14="http://schemas.microsoft.com/office/drawing/2010/main">
+        <mc:Choice Requires="a14">
           <p:sp>
             <p:nvSpPr>
               <p:cNvPr id="8" name="TextBox 7">
@@ -10796,6 +11079,7 @@
               </a:bodyPr>
               <a:lstStyle/>
               <a:p>
+                <a:pPr/>
                 <a14:m>
                   <m:oMathPara xmlns:m="http://schemas.openxmlformats.org/officeDocument/2006/math">
                     <m:oMathParaPr>
@@ -10816,7 +11100,7 @@
             </p:txBody>
           </p:sp>
         </mc:Choice>
-        <mc:Fallback>
+        <mc:Fallback xmlns="">
           <p:sp>
             <p:nvSpPr>
               <p:cNvPr id="8" name="TextBox 7">
@@ -10861,8 +11145,8 @@
           </p:sp>
         </mc:Fallback>
       </mc:AlternateContent>
-      <mc:AlternateContent xmlns:mc="http://schemas.openxmlformats.org/markup-compatibility/2006">
-        <mc:Choice xmlns:a14="http://schemas.microsoft.com/office/drawing/2010/main" Requires="a14">
+      <mc:AlternateContent xmlns:mc="http://schemas.openxmlformats.org/markup-compatibility/2006" xmlns:a14="http://schemas.microsoft.com/office/drawing/2010/main">
+        <mc:Choice Requires="a14">
           <p:sp>
             <p:nvSpPr>
               <p:cNvPr id="9" name="TextBox 8">
@@ -10891,6 +11175,7 @@
               </a:bodyPr>
               <a:lstStyle/>
               <a:p>
+                <a:pPr/>
                 <a14:m>
                   <m:oMathPara xmlns:m="http://schemas.openxmlformats.org/officeDocument/2006/math">
                     <m:oMathParaPr>
@@ -10911,7 +11196,7 @@
             </p:txBody>
           </p:sp>
         </mc:Choice>
-        <mc:Fallback>
+        <mc:Fallback xmlns="">
           <p:sp>
             <p:nvSpPr>
               <p:cNvPr id="9" name="TextBox 8">
@@ -10956,8 +11241,8 @@
           </p:sp>
         </mc:Fallback>
       </mc:AlternateContent>
-      <mc:AlternateContent xmlns:mc="http://schemas.openxmlformats.org/markup-compatibility/2006">
-        <mc:Choice xmlns:a14="http://schemas.microsoft.com/office/drawing/2010/main" Requires="a14">
+      <mc:AlternateContent xmlns:mc="http://schemas.openxmlformats.org/markup-compatibility/2006" xmlns:a14="http://schemas.microsoft.com/office/drawing/2010/main">
+        <mc:Choice Requires="a14">
           <p:sp>
             <p:nvSpPr>
               <p:cNvPr id="10" name="TextBox 9">
@@ -10986,6 +11271,7 @@
               </a:bodyPr>
               <a:lstStyle/>
               <a:p>
+                <a:pPr/>
                 <a14:m>
                   <m:oMathPara xmlns:m="http://schemas.openxmlformats.org/officeDocument/2006/math">
                     <m:oMathParaPr>
@@ -11012,7 +11298,7 @@
             </p:txBody>
           </p:sp>
         </mc:Choice>
-        <mc:Fallback>
+        <mc:Fallback xmlns="">
           <p:sp>
             <p:nvSpPr>
               <p:cNvPr id="10" name="TextBox 9">
@@ -11057,8 +11343,8 @@
           </p:sp>
         </mc:Fallback>
       </mc:AlternateContent>
-      <mc:AlternateContent xmlns:mc="http://schemas.openxmlformats.org/markup-compatibility/2006">
-        <mc:Choice xmlns:a14="http://schemas.microsoft.com/office/drawing/2010/main" Requires="a14">
+      <mc:AlternateContent xmlns:mc="http://schemas.openxmlformats.org/markup-compatibility/2006" xmlns:a14="http://schemas.microsoft.com/office/drawing/2010/main">
+        <mc:Choice Requires="a14">
           <p:sp>
             <p:nvSpPr>
               <p:cNvPr id="11" name="TextBox 10">
@@ -11087,6 +11373,7 @@
               </a:bodyPr>
               <a:lstStyle/>
               <a:p>
+                <a:pPr/>
                 <a14:m>
                   <m:oMathPara xmlns:m="http://schemas.openxmlformats.org/officeDocument/2006/math">
                     <m:oMathParaPr>
@@ -11113,7 +11400,7 @@
             </p:txBody>
           </p:sp>
         </mc:Choice>
-        <mc:Fallback>
+        <mc:Fallback xmlns="">
           <p:sp>
             <p:nvSpPr>
               <p:cNvPr id="11" name="TextBox 10">
@@ -11158,8 +11445,8 @@
           </p:sp>
         </mc:Fallback>
       </mc:AlternateContent>
-      <mc:AlternateContent xmlns:mc="http://schemas.openxmlformats.org/markup-compatibility/2006">
-        <mc:Choice xmlns:a14="http://schemas.microsoft.com/office/drawing/2010/main" Requires="a14">
+      <mc:AlternateContent xmlns:mc="http://schemas.openxmlformats.org/markup-compatibility/2006" xmlns:a14="http://schemas.microsoft.com/office/drawing/2010/main">
+        <mc:Choice Requires="a14">
           <p:sp>
             <p:nvSpPr>
               <p:cNvPr id="12" name="TextBox 11">
@@ -11188,6 +11475,7 @@
               </a:bodyPr>
               <a:lstStyle/>
               <a:p>
+                <a:pPr/>
                 <a14:m>
                   <m:oMathPara xmlns:m="http://schemas.openxmlformats.org/officeDocument/2006/math">
                     <m:oMathParaPr>
@@ -11214,7 +11502,7 @@
             </p:txBody>
           </p:sp>
         </mc:Choice>
-        <mc:Fallback>
+        <mc:Fallback xmlns="">
           <p:sp>
             <p:nvSpPr>
               <p:cNvPr id="12" name="TextBox 11">
@@ -11259,8 +11547,8 @@
           </p:sp>
         </mc:Fallback>
       </mc:AlternateContent>
-      <mc:AlternateContent xmlns:mc="http://schemas.openxmlformats.org/markup-compatibility/2006">
-        <mc:Choice xmlns:a14="http://schemas.microsoft.com/office/drawing/2010/main" Requires="a14">
+      <mc:AlternateContent xmlns:mc="http://schemas.openxmlformats.org/markup-compatibility/2006" xmlns:a14="http://schemas.microsoft.com/office/drawing/2010/main">
+        <mc:Choice Requires="a14">
           <p:sp>
             <p:nvSpPr>
               <p:cNvPr id="13" name="TextBox 12">
@@ -11289,6 +11577,7 @@
               </a:bodyPr>
               <a:lstStyle/>
               <a:p>
+                <a:pPr/>
                 <a14:m>
                   <m:oMathPara xmlns:m="http://schemas.openxmlformats.org/officeDocument/2006/math">
                     <m:oMathParaPr>
@@ -11315,7 +11604,7 @@
             </p:txBody>
           </p:sp>
         </mc:Choice>
-        <mc:Fallback>
+        <mc:Fallback xmlns="">
           <p:sp>
             <p:nvSpPr>
               <p:cNvPr id="13" name="TextBox 12">
@@ -11401,8 +11690,8 @@
           </a:fontRef>
         </p:style>
       </p:cxnSp>
-      <mc:AlternateContent xmlns:mc="http://schemas.openxmlformats.org/markup-compatibility/2006">
-        <mc:Choice xmlns:a14="http://schemas.microsoft.com/office/drawing/2010/main" Requires="a14">
+      <mc:AlternateContent xmlns:mc="http://schemas.openxmlformats.org/markup-compatibility/2006" xmlns:a14="http://schemas.microsoft.com/office/drawing/2010/main">
+        <mc:Choice Requires="a14">
           <p:sp>
             <p:nvSpPr>
               <p:cNvPr id="36" name="TextBox 35">
@@ -11431,6 +11720,7 @@
               </a:bodyPr>
               <a:lstStyle/>
               <a:p>
+                <a:pPr/>
                 <a14:m>
                   <m:oMathPara xmlns:m="http://schemas.openxmlformats.org/officeDocument/2006/math">
                     <m:oMathParaPr>
@@ -11451,7 +11741,7 @@
             </p:txBody>
           </p:sp>
         </mc:Choice>
-        <mc:Fallback>
+        <mc:Fallback xmlns="">
           <p:sp>
             <p:nvSpPr>
               <p:cNvPr id="36" name="TextBox 35">
@@ -11496,8 +11786,8 @@
           </p:sp>
         </mc:Fallback>
       </mc:AlternateContent>
-      <mc:AlternateContent xmlns:mc="http://schemas.openxmlformats.org/markup-compatibility/2006">
-        <mc:Choice xmlns:a14="http://schemas.microsoft.com/office/drawing/2010/main" Requires="a14">
+      <mc:AlternateContent xmlns:mc="http://schemas.openxmlformats.org/markup-compatibility/2006" xmlns:a14="http://schemas.microsoft.com/office/drawing/2010/main">
+        <mc:Choice Requires="a14">
           <p:sp>
             <p:nvSpPr>
               <p:cNvPr id="37" name="TextBox 36">
@@ -11526,6 +11816,7 @@
               </a:bodyPr>
               <a:lstStyle/>
               <a:p>
+                <a:pPr/>
                 <a14:m>
                   <m:oMathPara xmlns:m="http://schemas.openxmlformats.org/officeDocument/2006/math">
                     <m:oMathParaPr>
@@ -11546,7 +11837,7 @@
             </p:txBody>
           </p:sp>
         </mc:Choice>
-        <mc:Fallback>
+        <mc:Fallback xmlns="">
           <p:sp>
             <p:nvSpPr>
               <p:cNvPr id="37" name="TextBox 36">
@@ -11591,8 +11882,8 @@
           </p:sp>
         </mc:Fallback>
       </mc:AlternateContent>
-      <mc:AlternateContent xmlns:mc="http://schemas.openxmlformats.org/markup-compatibility/2006">
-        <mc:Choice xmlns:a14="http://schemas.microsoft.com/office/drawing/2010/main" Requires="a14">
+      <mc:AlternateContent xmlns:mc="http://schemas.openxmlformats.org/markup-compatibility/2006" xmlns:a14="http://schemas.microsoft.com/office/drawing/2010/main">
+        <mc:Choice Requires="a14">
           <p:sp>
             <p:nvSpPr>
               <p:cNvPr id="38" name="TextBox 37">
@@ -11621,6 +11912,7 @@
               </a:bodyPr>
               <a:lstStyle/>
               <a:p>
+                <a:pPr/>
                 <a14:m>
                   <m:oMathPara xmlns:m="http://schemas.openxmlformats.org/officeDocument/2006/math">
                     <m:oMathParaPr>
@@ -11641,7 +11933,7 @@
             </p:txBody>
           </p:sp>
         </mc:Choice>
-        <mc:Fallback>
+        <mc:Fallback xmlns="">
           <p:sp>
             <p:nvSpPr>
               <p:cNvPr id="38" name="TextBox 37">
@@ -11686,8 +11978,8 @@
           </p:sp>
         </mc:Fallback>
       </mc:AlternateContent>
-      <mc:AlternateContent xmlns:mc="http://schemas.openxmlformats.org/markup-compatibility/2006">
-        <mc:Choice xmlns:a14="http://schemas.microsoft.com/office/drawing/2010/main" Requires="a14">
+      <mc:AlternateContent xmlns:mc="http://schemas.openxmlformats.org/markup-compatibility/2006" xmlns:a14="http://schemas.microsoft.com/office/drawing/2010/main">
+        <mc:Choice Requires="a14">
           <p:sp>
             <p:nvSpPr>
               <p:cNvPr id="39" name="TextBox 38">
@@ -11716,6 +12008,7 @@
               </a:bodyPr>
               <a:lstStyle/>
               <a:p>
+                <a:pPr/>
                 <a14:m>
                   <m:oMathPara xmlns:m="http://schemas.openxmlformats.org/officeDocument/2006/math">
                     <m:oMathParaPr>
@@ -11736,7 +12029,7 @@
             </p:txBody>
           </p:sp>
         </mc:Choice>
-        <mc:Fallback>
+        <mc:Fallback xmlns="">
           <p:sp>
             <p:nvSpPr>
               <p:cNvPr id="39" name="TextBox 38">
@@ -11781,8 +12074,8 @@
           </p:sp>
         </mc:Fallback>
       </mc:AlternateContent>
-      <mc:AlternateContent xmlns:mc="http://schemas.openxmlformats.org/markup-compatibility/2006">
-        <mc:Choice xmlns:a14="http://schemas.microsoft.com/office/drawing/2010/main" Requires="a14">
+      <mc:AlternateContent xmlns:mc="http://schemas.openxmlformats.org/markup-compatibility/2006" xmlns:a14="http://schemas.microsoft.com/office/drawing/2010/main">
+        <mc:Choice Requires="a14">
           <p:sp>
             <p:nvSpPr>
               <p:cNvPr id="40" name="TextBox 39">
@@ -11811,6 +12104,7 @@
               </a:bodyPr>
               <a:lstStyle/>
               <a:p>
+                <a:pPr/>
                 <a14:m>
                   <m:oMathPara xmlns:m="http://schemas.openxmlformats.org/officeDocument/2006/math">
                     <m:oMathParaPr>
@@ -11831,7 +12125,7 @@
             </p:txBody>
           </p:sp>
         </mc:Choice>
-        <mc:Fallback>
+        <mc:Fallback xmlns="">
           <p:sp>
             <p:nvSpPr>
               <p:cNvPr id="40" name="TextBox 39">
@@ -11876,8 +12170,8 @@
           </p:sp>
         </mc:Fallback>
       </mc:AlternateContent>
-      <mc:AlternateContent xmlns:mc="http://schemas.openxmlformats.org/markup-compatibility/2006">
-        <mc:Choice xmlns:a14="http://schemas.microsoft.com/office/drawing/2010/main" Requires="a14">
+      <mc:AlternateContent xmlns:mc="http://schemas.openxmlformats.org/markup-compatibility/2006" xmlns:a14="http://schemas.microsoft.com/office/drawing/2010/main">
+        <mc:Choice Requires="a14">
           <p:sp>
             <p:nvSpPr>
               <p:cNvPr id="42" name="TextBox 41">
@@ -11906,6 +12200,7 @@
               </a:bodyPr>
               <a:lstStyle/>
               <a:p>
+                <a:pPr/>
                 <a14:m>
                   <m:oMathPara xmlns:m="http://schemas.openxmlformats.org/officeDocument/2006/math">
                     <m:oMathParaPr>
@@ -11926,7 +12221,7 @@
             </p:txBody>
           </p:sp>
         </mc:Choice>
-        <mc:Fallback>
+        <mc:Fallback xmlns="">
           <p:sp>
             <p:nvSpPr>
               <p:cNvPr id="42" name="TextBox 41">
@@ -12408,8 +12703,8 @@
           </a:fontRef>
         </p:style>
       </p:cxnSp>
-      <mc:AlternateContent xmlns:mc="http://schemas.openxmlformats.org/markup-compatibility/2006">
-        <mc:Choice xmlns:a14="http://schemas.microsoft.com/office/drawing/2010/main" Requires="a14">
+      <mc:AlternateContent xmlns:mc="http://schemas.openxmlformats.org/markup-compatibility/2006" xmlns:a14="http://schemas.microsoft.com/office/drawing/2010/main">
+        <mc:Choice Requires="a14">
           <p:sp>
             <p:nvSpPr>
               <p:cNvPr id="70" name="TextBox 69">
@@ -12438,6 +12733,7 @@
               </a:bodyPr>
               <a:lstStyle/>
               <a:p>
+                <a:pPr/>
                 <a14:m>
                   <m:oMathPara xmlns:m="http://schemas.openxmlformats.org/officeDocument/2006/math">
                     <m:oMathParaPr>
@@ -12458,7 +12754,7 @@
             </p:txBody>
           </p:sp>
         </mc:Choice>
-        <mc:Fallback>
+        <mc:Fallback xmlns="">
           <p:sp>
             <p:nvSpPr>
               <p:cNvPr id="70" name="TextBox 69">
@@ -12549,8 +12845,8 @@
           </a:p>
         </p:txBody>
       </p:sp>
-      <mc:AlternateContent xmlns:mc="http://schemas.openxmlformats.org/markup-compatibility/2006">
-        <mc:Choice xmlns:a14="http://schemas.microsoft.com/office/drawing/2010/main" Requires="a14">
+      <mc:AlternateContent xmlns:mc="http://schemas.openxmlformats.org/markup-compatibility/2006" xmlns:a14="http://schemas.microsoft.com/office/drawing/2010/main">
+        <mc:Choice Requires="a14">
           <p:sp>
             <p:nvSpPr>
               <p:cNvPr id="73" name="TextBox 72">
@@ -12579,6 +12875,7 @@
               </a:bodyPr>
               <a:lstStyle/>
               <a:p>
+                <a:pPr/>
                 <a14:m>
                   <m:oMathPara xmlns:m="http://schemas.openxmlformats.org/officeDocument/2006/math">
                     <m:oMathParaPr>
@@ -12598,13 +12895,7 @@
                             <a:rPr lang="en-US" sz="1000" b="0" i="1" smtClean="0">
                               <a:latin typeface="Cambria Math" panose="02040503050406030204" pitchFamily="18" charset="0"/>
                             </a:rPr>
-                            <m:t>4,865;</m:t>
-                          </m:r>
-                          <m:r>
-                            <a:rPr lang="en-US" sz="1000" b="0" i="1" smtClean="0">
-                              <a:latin typeface="Cambria Math" panose="02040503050406030204" pitchFamily="18" charset="0"/>
-                            </a:rPr>
-                            <m:t>0,5</m:t>
+                            <m:t>4,865;0,5</m:t>
                           </m:r>
                         </m:e>
                       </m:d>
@@ -12616,7 +12907,7 @@
             </p:txBody>
           </p:sp>
         </mc:Choice>
-        <mc:Fallback>
+        <mc:Fallback xmlns="">
           <p:sp>
             <p:nvSpPr>
               <p:cNvPr id="73" name="TextBox 72">
@@ -12665,6 +12956,1686 @@
     <p:extLst>
       <p:ext uri="{BB962C8B-B14F-4D97-AF65-F5344CB8AC3E}">
         <p14:creationId xmlns:p14="http://schemas.microsoft.com/office/powerpoint/2010/main" val="2639042076"/>
+      </p:ext>
+    </p:extLst>
+  </p:cSld>
+  <p:clrMapOvr>
+    <a:masterClrMapping/>
+  </p:clrMapOvr>
+</p:sld>
+</file>
+
+<file path=ppt/slides/slide5.xml><?xml version="1.0" encoding="utf-8"?>
+<p:sld xmlns:a="http://schemas.openxmlformats.org/drawingml/2006/main" xmlns:r="http://schemas.openxmlformats.org/officeDocument/2006/relationships" xmlns:p="http://schemas.openxmlformats.org/presentationml/2006/main">
+  <p:cSld>
+    <p:spTree>
+      <p:nvGrpSpPr>
+        <p:cNvPr id="1" name=""/>
+        <p:cNvGrpSpPr/>
+        <p:nvPr/>
+      </p:nvGrpSpPr>
+      <p:grpSpPr>
+        <a:xfrm>
+          <a:off x="0" y="0"/>
+          <a:ext cx="0" cy="0"/>
+          <a:chOff x="0" y="0"/>
+          <a:chExt cx="0" cy="0"/>
+        </a:xfrm>
+      </p:grpSpPr>
+      <p:cxnSp>
+        <p:nvCxnSpPr>
+          <p:cNvPr id="5" name="Straight Arrow Connector 4">
+            <a:extLst>
+              <a:ext uri="{FF2B5EF4-FFF2-40B4-BE49-F238E27FC236}">
+                <a16:creationId xmlns:a16="http://schemas.microsoft.com/office/drawing/2014/main" id="{7BDC03A6-5C7E-D242-902F-6271E25E6002}"/>
+              </a:ext>
+            </a:extLst>
+          </p:cNvPr>
+          <p:cNvCxnSpPr>
+            <a:cxnSpLocks/>
+          </p:cNvCxnSpPr>
+          <p:nvPr/>
+        </p:nvCxnSpPr>
+        <p:spPr>
+          <a:xfrm flipV="1">
+            <a:off x="1080655" y="1214582"/>
+            <a:ext cx="0" cy="3071102"/>
+          </a:xfrm>
+          <a:prstGeom prst="straightConnector1">
+            <a:avLst/>
+          </a:prstGeom>
+          <a:ln w="19050">
+            <a:tailEnd type="triangle"/>
+          </a:ln>
+        </p:spPr>
+        <p:style>
+          <a:lnRef idx="1">
+            <a:schemeClr val="dk1"/>
+          </a:lnRef>
+          <a:fillRef idx="0">
+            <a:schemeClr val="dk1"/>
+          </a:fillRef>
+          <a:effectRef idx="0">
+            <a:schemeClr val="dk1"/>
+          </a:effectRef>
+          <a:fontRef idx="minor">
+            <a:schemeClr val="tx1"/>
+          </a:fontRef>
+        </p:style>
+      </p:cxnSp>
+      <p:cxnSp>
+        <p:nvCxnSpPr>
+          <p:cNvPr id="6" name="Straight Arrow Connector 5">
+            <a:extLst>
+              <a:ext uri="{FF2B5EF4-FFF2-40B4-BE49-F238E27FC236}">
+                <a16:creationId xmlns:a16="http://schemas.microsoft.com/office/drawing/2014/main" id="{D3CA4406-1FEF-D34D-8A69-0D9E3E7368E0}"/>
+              </a:ext>
+            </a:extLst>
+          </p:cNvPr>
+          <p:cNvCxnSpPr>
+            <a:cxnSpLocks/>
+          </p:cNvCxnSpPr>
+          <p:nvPr/>
+        </p:nvCxnSpPr>
+        <p:spPr>
+          <a:xfrm>
+            <a:off x="1080655" y="4285684"/>
+            <a:ext cx="3317609" cy="0"/>
+          </a:xfrm>
+          <a:prstGeom prst="straightConnector1">
+            <a:avLst/>
+          </a:prstGeom>
+          <a:ln w="19050">
+            <a:tailEnd type="triangle"/>
+          </a:ln>
+        </p:spPr>
+        <p:style>
+          <a:lnRef idx="1">
+            <a:schemeClr val="dk1"/>
+          </a:lnRef>
+          <a:fillRef idx="0">
+            <a:schemeClr val="dk1"/>
+          </a:fillRef>
+          <a:effectRef idx="0">
+            <a:schemeClr val="dk1"/>
+          </a:effectRef>
+          <a:fontRef idx="minor">
+            <a:schemeClr val="tx1"/>
+          </a:fontRef>
+        </p:style>
+      </p:cxnSp>
+      <p:sp>
+        <p:nvSpPr>
+          <p:cNvPr id="7" name="Rectangle 6">
+            <a:extLst>
+              <a:ext uri="{FF2B5EF4-FFF2-40B4-BE49-F238E27FC236}">
+                <a16:creationId xmlns:a16="http://schemas.microsoft.com/office/drawing/2014/main" id="{77AD74C6-A707-944A-AD9E-8F79899F7182}"/>
+              </a:ext>
+            </a:extLst>
+          </p:cNvPr>
+          <p:cNvSpPr/>
+          <p:nvPr/>
+        </p:nvSpPr>
+        <p:spPr>
+          <a:xfrm>
+            <a:off x="2010510" y="1620890"/>
+            <a:ext cx="583200" cy="2667600"/>
+          </a:xfrm>
+          <a:prstGeom prst="rect">
+            <a:avLst/>
+          </a:prstGeom>
+          <a:noFill/>
+          <a:ln w="19050">
+            <a:solidFill>
+              <a:schemeClr val="tx1"/>
+            </a:solidFill>
+          </a:ln>
+        </p:spPr>
+        <p:style>
+          <a:lnRef idx="2">
+            <a:schemeClr val="accent1">
+              <a:shade val="50000"/>
+            </a:schemeClr>
+          </a:lnRef>
+          <a:fillRef idx="1">
+            <a:schemeClr val="accent1"/>
+          </a:fillRef>
+          <a:effectRef idx="0">
+            <a:schemeClr val="accent1"/>
+          </a:effectRef>
+          <a:fontRef idx="minor">
+            <a:schemeClr val="lt1"/>
+          </a:fontRef>
+        </p:style>
+        <p:txBody>
+          <a:bodyPr rtlCol="0" anchor="ctr"/>
+          <a:lstStyle/>
+          <a:p>
+            <a:pPr algn="ctr"/>
+            <a:endParaRPr lang="uk-UA"/>
+          </a:p>
+        </p:txBody>
+      </p:sp>
+      <p:sp>
+        <p:nvSpPr>
+          <p:cNvPr id="8" name="Rectangle 7">
+            <a:extLst>
+              <a:ext uri="{FF2B5EF4-FFF2-40B4-BE49-F238E27FC236}">
+                <a16:creationId xmlns:a16="http://schemas.microsoft.com/office/drawing/2014/main" id="{27790401-B8E3-724D-BBB9-E908B5C027EB}"/>
+              </a:ext>
+            </a:extLst>
+          </p:cNvPr>
+          <p:cNvSpPr/>
+          <p:nvPr/>
+        </p:nvSpPr>
+        <p:spPr>
+          <a:xfrm>
+            <a:off x="2589054" y="2687782"/>
+            <a:ext cx="583200" cy="1597903"/>
+          </a:xfrm>
+          <a:prstGeom prst="rect">
+            <a:avLst/>
+          </a:prstGeom>
+          <a:noFill/>
+          <a:ln w="19050">
+            <a:solidFill>
+              <a:schemeClr val="tx1"/>
+            </a:solidFill>
+          </a:ln>
+        </p:spPr>
+        <p:style>
+          <a:lnRef idx="2">
+            <a:schemeClr val="accent1">
+              <a:shade val="50000"/>
+            </a:schemeClr>
+          </a:lnRef>
+          <a:fillRef idx="1">
+            <a:schemeClr val="accent1"/>
+          </a:fillRef>
+          <a:effectRef idx="0">
+            <a:schemeClr val="accent1"/>
+          </a:effectRef>
+          <a:fontRef idx="minor">
+            <a:schemeClr val="lt1"/>
+          </a:fontRef>
+        </p:style>
+        <p:txBody>
+          <a:bodyPr rtlCol="0" anchor="ctr"/>
+          <a:lstStyle/>
+          <a:p>
+            <a:pPr algn="ctr"/>
+            <a:endParaRPr lang="uk-UA"/>
+          </a:p>
+        </p:txBody>
+      </p:sp>
+      <mc:AlternateContent xmlns:mc="http://schemas.openxmlformats.org/markup-compatibility/2006">
+        <mc:Choice xmlns:a14="http://schemas.microsoft.com/office/drawing/2010/main" Requires="a14">
+          <p:sp>
+            <p:nvSpPr>
+              <p:cNvPr id="9" name="TextBox 8">
+                <a:extLst>
+                  <a:ext uri="{FF2B5EF4-FFF2-40B4-BE49-F238E27FC236}">
+                    <a16:creationId xmlns:a16="http://schemas.microsoft.com/office/drawing/2014/main" id="{AC74E8D5-3D49-B84E-802A-704ACDC4247B}"/>
+                  </a:ext>
+                </a:extLst>
+              </p:cNvPr>
+              <p:cNvSpPr txBox="1"/>
+              <p:nvPr/>
+            </p:nvSpPr>
+            <p:spPr>
+              <a:xfrm>
+                <a:off x="1818301" y="4285684"/>
+                <a:ext cx="375103" cy="215444"/>
+              </a:xfrm>
+              <a:prstGeom prst="rect">
+                <a:avLst/>
+              </a:prstGeom>
+              <a:noFill/>
+            </p:spPr>
+            <p:txBody>
+              <a:bodyPr wrap="none" lIns="0" tIns="0" rIns="0" bIns="0" rtlCol="0">
+                <a:spAutoFit/>
+              </a:bodyPr>
+              <a:lstStyle/>
+              <a:p>
+                <a:pPr/>
+                <a14:m>
+                  <m:oMathPara xmlns:m="http://schemas.openxmlformats.org/officeDocument/2006/math">
+                    <m:oMathParaPr>
+                      <m:jc m:val="centerGroup"/>
+                    </m:oMathParaPr>
+                    <m:oMath xmlns:m="http://schemas.openxmlformats.org/officeDocument/2006/math">
+                      <m:r>
+                        <a:rPr lang="en-US" sz="1400" b="0" i="1" smtClean="0">
+                          <a:latin typeface="Cambria Math" panose="02040503050406030204" pitchFamily="18" charset="0"/>
+                        </a:rPr>
+                        <m:t>2,57</m:t>
+                      </m:r>
+                    </m:oMath>
+                  </m:oMathPara>
+                </a14:m>
+                <a:endParaRPr lang="uk-UA" dirty="0"/>
+              </a:p>
+            </p:txBody>
+          </p:sp>
+        </mc:Choice>
+        <mc:Fallback>
+          <p:sp>
+            <p:nvSpPr>
+              <p:cNvPr id="9" name="TextBox 8">
+                <a:extLst>
+                  <a:ext uri="{FF2B5EF4-FFF2-40B4-BE49-F238E27FC236}">
+                    <a16:creationId xmlns:a16="http://schemas.microsoft.com/office/drawing/2014/main" id="{AC74E8D5-3D49-B84E-802A-704ACDC4247B}"/>
+                  </a:ext>
+                </a:extLst>
+              </p:cNvPr>
+              <p:cNvSpPr txBox="1">
+                <a:spLocks noRot="1" noChangeAspect="1" noMove="1" noResize="1" noEditPoints="1" noAdjustHandles="1" noChangeArrowheads="1" noChangeShapeType="1" noTextEdit="1"/>
+              </p:cNvSpPr>
+              <p:nvPr/>
+            </p:nvSpPr>
+            <p:spPr>
+              <a:xfrm>
+                <a:off x="1818301" y="4285684"/>
+                <a:ext cx="375103" cy="215444"/>
+              </a:xfrm>
+              <a:prstGeom prst="rect">
+                <a:avLst/>
+              </a:prstGeom>
+              <a:blipFill>
+                <a:blip r:embed="rId2"/>
+                <a:stretch>
+                  <a:fillRect l="-10000" r="-13333" b="-5556"/>
+                </a:stretch>
+              </a:blipFill>
+            </p:spPr>
+            <p:txBody>
+              <a:bodyPr/>
+              <a:lstStyle/>
+              <a:p>
+                <a:r>
+                  <a:rPr lang="uk-UA">
+                    <a:noFill/>
+                  </a:rPr>
+                  <a:t> </a:t>
+                </a:r>
+              </a:p>
+            </p:txBody>
+          </p:sp>
+        </mc:Fallback>
+      </mc:AlternateContent>
+      <mc:AlternateContent xmlns:mc="http://schemas.openxmlformats.org/markup-compatibility/2006">
+        <mc:Choice xmlns:a14="http://schemas.microsoft.com/office/drawing/2010/main" Requires="a14">
+          <p:sp>
+            <p:nvSpPr>
+              <p:cNvPr id="10" name="TextBox 9">
+                <a:extLst>
+                  <a:ext uri="{FF2B5EF4-FFF2-40B4-BE49-F238E27FC236}">
+                    <a16:creationId xmlns:a16="http://schemas.microsoft.com/office/drawing/2014/main" id="{AADD7967-82F2-5C42-9B2A-DC4B7A505794}"/>
+                  </a:ext>
+                </a:extLst>
+              </p:cNvPr>
+              <p:cNvSpPr txBox="1"/>
+              <p:nvPr/>
+            </p:nvSpPr>
+            <p:spPr>
+              <a:xfrm>
+                <a:off x="2396845" y="4312403"/>
+                <a:ext cx="375103" cy="215444"/>
+              </a:xfrm>
+              <a:prstGeom prst="rect">
+                <a:avLst/>
+              </a:prstGeom>
+              <a:noFill/>
+            </p:spPr>
+            <p:txBody>
+              <a:bodyPr wrap="none" lIns="0" tIns="0" rIns="0" bIns="0" rtlCol="0">
+                <a:spAutoFit/>
+              </a:bodyPr>
+              <a:lstStyle/>
+              <a:p>
+                <a:pPr/>
+                <a14:m>
+                  <m:oMathPara xmlns:m="http://schemas.openxmlformats.org/officeDocument/2006/math">
+                    <m:oMathParaPr>
+                      <m:jc m:val="centerGroup"/>
+                    </m:oMathParaPr>
+                    <m:oMath xmlns:m="http://schemas.openxmlformats.org/officeDocument/2006/math">
+                      <m:r>
+                        <a:rPr lang="en-US" sz="1400" b="0" i="1" smtClean="0">
+                          <a:latin typeface="Cambria Math" panose="02040503050406030204" pitchFamily="18" charset="0"/>
+                        </a:rPr>
+                        <m:t>4,19</m:t>
+                      </m:r>
+                    </m:oMath>
+                  </m:oMathPara>
+                </a14:m>
+                <a:endParaRPr lang="uk-UA" dirty="0"/>
+              </a:p>
+            </p:txBody>
+          </p:sp>
+        </mc:Choice>
+        <mc:Fallback>
+          <p:sp>
+            <p:nvSpPr>
+              <p:cNvPr id="10" name="TextBox 9">
+                <a:extLst>
+                  <a:ext uri="{FF2B5EF4-FFF2-40B4-BE49-F238E27FC236}">
+                    <a16:creationId xmlns:a16="http://schemas.microsoft.com/office/drawing/2014/main" id="{AADD7967-82F2-5C42-9B2A-DC4B7A505794}"/>
+                  </a:ext>
+                </a:extLst>
+              </p:cNvPr>
+              <p:cNvSpPr txBox="1">
+                <a:spLocks noRot="1" noChangeAspect="1" noMove="1" noResize="1" noEditPoints="1" noAdjustHandles="1" noChangeArrowheads="1" noChangeShapeType="1" noTextEdit="1"/>
+              </p:cNvSpPr>
+              <p:nvPr/>
+            </p:nvSpPr>
+            <p:spPr>
+              <a:xfrm>
+                <a:off x="2396845" y="4312403"/>
+                <a:ext cx="375103" cy="215444"/>
+              </a:xfrm>
+              <a:prstGeom prst="rect">
+                <a:avLst/>
+              </a:prstGeom>
+              <a:blipFill>
+                <a:blip r:embed="rId3"/>
+                <a:stretch>
+                  <a:fillRect l="-9677" r="-9677" b="-5556"/>
+                </a:stretch>
+              </a:blipFill>
+            </p:spPr>
+            <p:txBody>
+              <a:bodyPr/>
+              <a:lstStyle/>
+              <a:p>
+                <a:r>
+                  <a:rPr lang="uk-UA">
+                    <a:noFill/>
+                  </a:rPr>
+                  <a:t> </a:t>
+                </a:r>
+              </a:p>
+            </p:txBody>
+          </p:sp>
+        </mc:Fallback>
+      </mc:AlternateContent>
+      <mc:AlternateContent xmlns:mc="http://schemas.openxmlformats.org/markup-compatibility/2006">
+        <mc:Choice xmlns:a14="http://schemas.microsoft.com/office/drawing/2010/main" Requires="a14">
+          <p:sp>
+            <p:nvSpPr>
+              <p:cNvPr id="11" name="TextBox 10">
+                <a:extLst>
+                  <a:ext uri="{FF2B5EF4-FFF2-40B4-BE49-F238E27FC236}">
+                    <a16:creationId xmlns:a16="http://schemas.microsoft.com/office/drawing/2014/main" id="{B41A4664-5E26-954F-87E1-EC23BF958B02}"/>
+                  </a:ext>
+                </a:extLst>
+              </p:cNvPr>
+              <p:cNvSpPr txBox="1"/>
+              <p:nvPr/>
+            </p:nvSpPr>
+            <p:spPr>
+              <a:xfrm>
+                <a:off x="2984703" y="4285684"/>
+                <a:ext cx="375103" cy="215444"/>
+              </a:xfrm>
+              <a:prstGeom prst="rect">
+                <a:avLst/>
+              </a:prstGeom>
+              <a:noFill/>
+            </p:spPr>
+            <p:txBody>
+              <a:bodyPr wrap="none" lIns="0" tIns="0" rIns="0" bIns="0" rtlCol="0">
+                <a:spAutoFit/>
+              </a:bodyPr>
+              <a:lstStyle/>
+              <a:p>
+                <a:pPr/>
+                <a14:m>
+                  <m:oMathPara xmlns:m="http://schemas.openxmlformats.org/officeDocument/2006/math">
+                    <m:oMathParaPr>
+                      <m:jc m:val="centerGroup"/>
+                    </m:oMathParaPr>
+                    <m:oMath xmlns:m="http://schemas.openxmlformats.org/officeDocument/2006/math">
+                      <m:r>
+                        <a:rPr lang="en-US" sz="1400" b="0" i="1" smtClean="0">
+                          <a:latin typeface="Cambria Math" panose="02040503050406030204" pitchFamily="18" charset="0"/>
+                        </a:rPr>
+                        <m:t>5,81</m:t>
+                      </m:r>
+                    </m:oMath>
+                  </m:oMathPara>
+                </a14:m>
+                <a:endParaRPr lang="uk-UA" dirty="0"/>
+              </a:p>
+            </p:txBody>
+          </p:sp>
+        </mc:Choice>
+        <mc:Fallback>
+          <p:sp>
+            <p:nvSpPr>
+              <p:cNvPr id="11" name="TextBox 10">
+                <a:extLst>
+                  <a:ext uri="{FF2B5EF4-FFF2-40B4-BE49-F238E27FC236}">
+                    <a16:creationId xmlns:a16="http://schemas.microsoft.com/office/drawing/2014/main" id="{B41A4664-5E26-954F-87E1-EC23BF958B02}"/>
+                  </a:ext>
+                </a:extLst>
+              </p:cNvPr>
+              <p:cNvSpPr txBox="1">
+                <a:spLocks noRot="1" noChangeAspect="1" noMove="1" noResize="1" noEditPoints="1" noAdjustHandles="1" noChangeArrowheads="1" noChangeShapeType="1" noTextEdit="1"/>
+              </p:cNvSpPr>
+              <p:nvPr/>
+            </p:nvSpPr>
+            <p:spPr>
+              <a:xfrm>
+                <a:off x="2984703" y="4285684"/>
+                <a:ext cx="375103" cy="215444"/>
+              </a:xfrm>
+              <a:prstGeom prst="rect">
+                <a:avLst/>
+              </a:prstGeom>
+              <a:blipFill>
+                <a:blip r:embed="rId4"/>
+                <a:stretch>
+                  <a:fillRect l="-13333" r="-10000" b="-5556"/>
+                </a:stretch>
+              </a:blipFill>
+            </p:spPr>
+            <p:txBody>
+              <a:bodyPr/>
+              <a:lstStyle/>
+              <a:p>
+                <a:r>
+                  <a:rPr lang="uk-UA">
+                    <a:noFill/>
+                  </a:rPr>
+                  <a:t> </a:t>
+                </a:r>
+              </a:p>
+            </p:txBody>
+          </p:sp>
+        </mc:Fallback>
+      </mc:AlternateContent>
+      <mc:AlternateContent xmlns:mc="http://schemas.openxmlformats.org/markup-compatibility/2006">
+        <mc:Choice xmlns:a14="http://schemas.microsoft.com/office/drawing/2010/main" Requires="a14">
+          <p:sp>
+            <p:nvSpPr>
+              <p:cNvPr id="24" name="TextBox 23">
+                <a:extLst>
+                  <a:ext uri="{FF2B5EF4-FFF2-40B4-BE49-F238E27FC236}">
+                    <a16:creationId xmlns:a16="http://schemas.microsoft.com/office/drawing/2014/main" id="{9B0FE3E3-D1C1-8349-987A-26FE95611BC0}"/>
+                  </a:ext>
+                </a:extLst>
+              </p:cNvPr>
+              <p:cNvSpPr txBox="1"/>
+              <p:nvPr/>
+            </p:nvSpPr>
+            <p:spPr>
+              <a:xfrm>
+                <a:off x="723185" y="1540098"/>
+                <a:ext cx="357470" cy="161583"/>
+              </a:xfrm>
+              <a:prstGeom prst="rect">
+                <a:avLst/>
+              </a:prstGeom>
+              <a:noFill/>
+            </p:spPr>
+            <p:txBody>
+              <a:bodyPr wrap="none" lIns="0" tIns="0" rIns="0" bIns="0" rtlCol="0">
+                <a:spAutoFit/>
+              </a:bodyPr>
+              <a:lstStyle/>
+              <a:p>
+                <a:pPr/>
+                <a14:m>
+                  <m:oMathPara xmlns:m="http://schemas.openxmlformats.org/officeDocument/2006/math">
+                    <m:oMathParaPr>
+                      <m:jc m:val="centerGroup"/>
+                    </m:oMathParaPr>
+                    <m:oMath xmlns:m="http://schemas.openxmlformats.org/officeDocument/2006/math">
+                      <m:r>
+                        <a:rPr lang="en-US" sz="1050" i="1" smtClean="0">
+                          <a:latin typeface="Cambria Math" panose="02040503050406030204" pitchFamily="18" charset="0"/>
+                        </a:rPr>
+                        <m:t>0</m:t>
+                      </m:r>
+                      <m:r>
+                        <a:rPr lang="en-US" sz="1050" b="0" i="1" smtClean="0">
+                          <a:latin typeface="Cambria Math" panose="02040503050406030204" pitchFamily="18" charset="0"/>
+                        </a:rPr>
+                        <m:t>,247</m:t>
+                      </m:r>
+                    </m:oMath>
+                  </m:oMathPara>
+                </a14:m>
+                <a:endParaRPr lang="uk-UA" sz="1200" dirty="0"/>
+              </a:p>
+            </p:txBody>
+          </p:sp>
+        </mc:Choice>
+        <mc:Fallback>
+          <p:sp>
+            <p:nvSpPr>
+              <p:cNvPr id="24" name="TextBox 23">
+                <a:extLst>
+                  <a:ext uri="{FF2B5EF4-FFF2-40B4-BE49-F238E27FC236}">
+                    <a16:creationId xmlns:a16="http://schemas.microsoft.com/office/drawing/2014/main" id="{9B0FE3E3-D1C1-8349-987A-26FE95611BC0}"/>
+                  </a:ext>
+                </a:extLst>
+              </p:cNvPr>
+              <p:cNvSpPr txBox="1">
+                <a:spLocks noRot="1" noChangeAspect="1" noMove="1" noResize="1" noEditPoints="1" noAdjustHandles="1" noChangeArrowheads="1" noChangeShapeType="1" noTextEdit="1"/>
+              </p:cNvSpPr>
+              <p:nvPr/>
+            </p:nvSpPr>
+            <p:spPr>
+              <a:xfrm>
+                <a:off x="723185" y="1540098"/>
+                <a:ext cx="357470" cy="161583"/>
+              </a:xfrm>
+              <a:prstGeom prst="rect">
+                <a:avLst/>
+              </a:prstGeom>
+              <a:blipFill>
+                <a:blip r:embed="rId5"/>
+                <a:stretch>
+                  <a:fillRect l="-10714" r="-10714" b="-7692"/>
+                </a:stretch>
+              </a:blipFill>
+            </p:spPr>
+            <p:txBody>
+              <a:bodyPr/>
+              <a:lstStyle/>
+              <a:p>
+                <a:r>
+                  <a:rPr lang="uk-UA">
+                    <a:noFill/>
+                  </a:rPr>
+                  <a:t> </a:t>
+                </a:r>
+              </a:p>
+            </p:txBody>
+          </p:sp>
+        </mc:Fallback>
+      </mc:AlternateContent>
+      <mc:AlternateContent xmlns:mc="http://schemas.openxmlformats.org/markup-compatibility/2006">
+        <mc:Choice xmlns:a14="http://schemas.microsoft.com/office/drawing/2010/main" Requires="a14">
+          <p:sp>
+            <p:nvSpPr>
+              <p:cNvPr id="25" name="TextBox 24">
+                <a:extLst>
+                  <a:ext uri="{FF2B5EF4-FFF2-40B4-BE49-F238E27FC236}">
+                    <a16:creationId xmlns:a16="http://schemas.microsoft.com/office/drawing/2014/main" id="{147579EE-2E9C-DA48-80D4-B8393FA7A84C}"/>
+                  </a:ext>
+                </a:extLst>
+              </p:cNvPr>
+              <p:cNvSpPr txBox="1"/>
+              <p:nvPr/>
+            </p:nvSpPr>
+            <p:spPr>
+              <a:xfrm>
+                <a:off x="714368" y="2607218"/>
+                <a:ext cx="357470" cy="161583"/>
+              </a:xfrm>
+              <a:prstGeom prst="rect">
+                <a:avLst/>
+              </a:prstGeom>
+              <a:noFill/>
+            </p:spPr>
+            <p:txBody>
+              <a:bodyPr wrap="none" lIns="0" tIns="0" rIns="0" bIns="0" rtlCol="0">
+                <a:spAutoFit/>
+              </a:bodyPr>
+              <a:lstStyle/>
+              <a:p>
+                <a:pPr/>
+                <a14:m>
+                  <m:oMathPara xmlns:m="http://schemas.openxmlformats.org/officeDocument/2006/math">
+                    <m:oMathParaPr>
+                      <m:jc m:val="centerGroup"/>
+                    </m:oMathParaPr>
+                    <m:oMath xmlns:m="http://schemas.openxmlformats.org/officeDocument/2006/math">
+                      <m:r>
+                        <a:rPr lang="en-US" sz="1050" i="1" smtClean="0">
+                          <a:latin typeface="Cambria Math" panose="02040503050406030204" pitchFamily="18" charset="0"/>
+                        </a:rPr>
+                        <m:t>0</m:t>
+                      </m:r>
+                      <m:r>
+                        <a:rPr lang="en-US" sz="1050" b="0" i="1" smtClean="0">
+                          <a:latin typeface="Cambria Math" panose="02040503050406030204" pitchFamily="18" charset="0"/>
+                        </a:rPr>
+                        <m:t>,148</m:t>
+                      </m:r>
+                    </m:oMath>
+                  </m:oMathPara>
+                </a14:m>
+                <a:endParaRPr lang="uk-UA" sz="1200" dirty="0"/>
+              </a:p>
+            </p:txBody>
+          </p:sp>
+        </mc:Choice>
+        <mc:Fallback>
+          <p:sp>
+            <p:nvSpPr>
+              <p:cNvPr id="25" name="TextBox 24">
+                <a:extLst>
+                  <a:ext uri="{FF2B5EF4-FFF2-40B4-BE49-F238E27FC236}">
+                    <a16:creationId xmlns:a16="http://schemas.microsoft.com/office/drawing/2014/main" id="{147579EE-2E9C-DA48-80D4-B8393FA7A84C}"/>
+                  </a:ext>
+                </a:extLst>
+              </p:cNvPr>
+              <p:cNvSpPr txBox="1">
+                <a:spLocks noRot="1" noChangeAspect="1" noMove="1" noResize="1" noEditPoints="1" noAdjustHandles="1" noChangeArrowheads="1" noChangeShapeType="1" noTextEdit="1"/>
+              </p:cNvSpPr>
+              <p:nvPr/>
+            </p:nvSpPr>
+            <p:spPr>
+              <a:xfrm>
+                <a:off x="714368" y="2607218"/>
+                <a:ext cx="357470" cy="161583"/>
+              </a:xfrm>
+              <a:prstGeom prst="rect">
+                <a:avLst/>
+              </a:prstGeom>
+              <a:blipFill>
+                <a:blip r:embed="rId6"/>
+                <a:stretch>
+                  <a:fillRect l="-10345" r="-6897" b="-7692"/>
+                </a:stretch>
+              </a:blipFill>
+            </p:spPr>
+            <p:txBody>
+              <a:bodyPr/>
+              <a:lstStyle/>
+              <a:p>
+                <a:r>
+                  <a:rPr lang="uk-UA">
+                    <a:noFill/>
+                  </a:rPr>
+                  <a:t> </a:t>
+                </a:r>
+              </a:p>
+            </p:txBody>
+          </p:sp>
+        </mc:Fallback>
+      </mc:AlternateContent>
+      <mc:AlternateContent xmlns:mc="http://schemas.openxmlformats.org/markup-compatibility/2006">
+        <mc:Choice xmlns:a14="http://schemas.microsoft.com/office/drawing/2010/main" Requires="a14">
+          <p:sp>
+            <p:nvSpPr>
+              <p:cNvPr id="26" name="TextBox 25">
+                <a:extLst>
+                  <a:ext uri="{FF2B5EF4-FFF2-40B4-BE49-F238E27FC236}">
+                    <a16:creationId xmlns:a16="http://schemas.microsoft.com/office/drawing/2014/main" id="{3B9A1B5B-C9B2-254F-92DD-6BFC4EA88B50}"/>
+                  </a:ext>
+                </a:extLst>
+              </p:cNvPr>
+              <p:cNvSpPr txBox="1"/>
+              <p:nvPr/>
+            </p:nvSpPr>
+            <p:spPr>
+              <a:xfrm>
+                <a:off x="714368" y="3134044"/>
+                <a:ext cx="357470" cy="161583"/>
+              </a:xfrm>
+              <a:prstGeom prst="rect">
+                <a:avLst/>
+              </a:prstGeom>
+              <a:noFill/>
+            </p:spPr>
+            <p:txBody>
+              <a:bodyPr wrap="none" lIns="0" tIns="0" rIns="0" bIns="0" rtlCol="0">
+                <a:spAutoFit/>
+              </a:bodyPr>
+              <a:lstStyle/>
+              <a:p>
+                <a:pPr/>
+                <a14:m>
+                  <m:oMathPara xmlns:m="http://schemas.openxmlformats.org/officeDocument/2006/math">
+                    <m:oMathParaPr>
+                      <m:jc m:val="centerGroup"/>
+                    </m:oMathParaPr>
+                    <m:oMath xmlns:m="http://schemas.openxmlformats.org/officeDocument/2006/math">
+                      <m:r>
+                        <a:rPr lang="en-US" sz="1050" i="1" smtClean="0">
+                          <a:latin typeface="Cambria Math" panose="02040503050406030204" pitchFamily="18" charset="0"/>
+                        </a:rPr>
+                        <m:t>0</m:t>
+                      </m:r>
+                      <m:r>
+                        <a:rPr lang="en-US" sz="1050" b="0" i="1" smtClean="0">
+                          <a:latin typeface="Cambria Math" panose="02040503050406030204" pitchFamily="18" charset="0"/>
+                        </a:rPr>
+                        <m:t>,099</m:t>
+                      </m:r>
+                    </m:oMath>
+                  </m:oMathPara>
+                </a14:m>
+                <a:endParaRPr lang="uk-UA" sz="1200" dirty="0"/>
+              </a:p>
+            </p:txBody>
+          </p:sp>
+        </mc:Choice>
+        <mc:Fallback>
+          <p:sp>
+            <p:nvSpPr>
+              <p:cNvPr id="26" name="TextBox 25">
+                <a:extLst>
+                  <a:ext uri="{FF2B5EF4-FFF2-40B4-BE49-F238E27FC236}">
+                    <a16:creationId xmlns:a16="http://schemas.microsoft.com/office/drawing/2014/main" id="{3B9A1B5B-C9B2-254F-92DD-6BFC4EA88B50}"/>
+                  </a:ext>
+                </a:extLst>
+              </p:cNvPr>
+              <p:cNvSpPr txBox="1">
+                <a:spLocks noRot="1" noChangeAspect="1" noMove="1" noResize="1" noEditPoints="1" noAdjustHandles="1" noChangeArrowheads="1" noChangeShapeType="1" noTextEdit="1"/>
+              </p:cNvSpPr>
+              <p:nvPr/>
+            </p:nvSpPr>
+            <p:spPr>
+              <a:xfrm>
+                <a:off x="714368" y="3134044"/>
+                <a:ext cx="357470" cy="161583"/>
+              </a:xfrm>
+              <a:prstGeom prst="rect">
+                <a:avLst/>
+              </a:prstGeom>
+              <a:blipFill>
+                <a:blip r:embed="rId7"/>
+                <a:stretch>
+                  <a:fillRect l="-10345" r="-6897" b="-7143"/>
+                </a:stretch>
+              </a:blipFill>
+            </p:spPr>
+            <p:txBody>
+              <a:bodyPr/>
+              <a:lstStyle/>
+              <a:p>
+                <a:r>
+                  <a:rPr lang="uk-UA">
+                    <a:noFill/>
+                  </a:rPr>
+                  <a:t> </a:t>
+                </a:r>
+              </a:p>
+            </p:txBody>
+          </p:sp>
+        </mc:Fallback>
+      </mc:AlternateContent>
+      <mc:AlternateContent xmlns:mc="http://schemas.openxmlformats.org/markup-compatibility/2006">
+        <mc:Choice xmlns:a14="http://schemas.microsoft.com/office/drawing/2010/main" Requires="a14">
+          <p:sp>
+            <p:nvSpPr>
+              <p:cNvPr id="27" name="TextBox 26">
+                <a:extLst>
+                  <a:ext uri="{FF2B5EF4-FFF2-40B4-BE49-F238E27FC236}">
+                    <a16:creationId xmlns:a16="http://schemas.microsoft.com/office/drawing/2014/main" id="{D5858A3A-EDFB-784E-8744-E3DD86133D5B}"/>
+                  </a:ext>
+                </a:extLst>
+              </p:cNvPr>
+              <p:cNvSpPr txBox="1"/>
+              <p:nvPr/>
+            </p:nvSpPr>
+            <p:spPr>
+              <a:xfrm>
+                <a:off x="723185" y="3669467"/>
+                <a:ext cx="357470" cy="161583"/>
+              </a:xfrm>
+              <a:prstGeom prst="rect">
+                <a:avLst/>
+              </a:prstGeom>
+              <a:noFill/>
+            </p:spPr>
+            <p:txBody>
+              <a:bodyPr wrap="none" lIns="0" tIns="0" rIns="0" bIns="0" rtlCol="0">
+                <a:spAutoFit/>
+              </a:bodyPr>
+              <a:lstStyle/>
+              <a:p>
+                <a:pPr/>
+                <a14:m>
+                  <m:oMathPara xmlns:m="http://schemas.openxmlformats.org/officeDocument/2006/math">
+                    <m:oMathParaPr>
+                      <m:jc m:val="centerGroup"/>
+                    </m:oMathParaPr>
+                    <m:oMath xmlns:m="http://schemas.openxmlformats.org/officeDocument/2006/math">
+                      <m:r>
+                        <a:rPr lang="en-US" sz="1050" i="1" smtClean="0">
+                          <a:latin typeface="Cambria Math" panose="02040503050406030204" pitchFamily="18" charset="0"/>
+                        </a:rPr>
+                        <m:t>0</m:t>
+                      </m:r>
+                      <m:r>
+                        <a:rPr lang="en-US" sz="1050" b="0" i="1" smtClean="0">
+                          <a:latin typeface="Cambria Math" panose="02040503050406030204" pitchFamily="18" charset="0"/>
+                        </a:rPr>
+                        <m:t>,049</m:t>
+                      </m:r>
+                    </m:oMath>
+                  </m:oMathPara>
+                </a14:m>
+                <a:endParaRPr lang="uk-UA" sz="1200" dirty="0"/>
+              </a:p>
+            </p:txBody>
+          </p:sp>
+        </mc:Choice>
+        <mc:Fallback>
+          <p:sp>
+            <p:nvSpPr>
+              <p:cNvPr id="27" name="TextBox 26">
+                <a:extLst>
+                  <a:ext uri="{FF2B5EF4-FFF2-40B4-BE49-F238E27FC236}">
+                    <a16:creationId xmlns:a16="http://schemas.microsoft.com/office/drawing/2014/main" id="{D5858A3A-EDFB-784E-8744-E3DD86133D5B}"/>
+                  </a:ext>
+                </a:extLst>
+              </p:cNvPr>
+              <p:cNvSpPr txBox="1">
+                <a:spLocks noRot="1" noChangeAspect="1" noMove="1" noResize="1" noEditPoints="1" noAdjustHandles="1" noChangeArrowheads="1" noChangeShapeType="1" noTextEdit="1"/>
+              </p:cNvSpPr>
+              <p:nvPr/>
+            </p:nvSpPr>
+            <p:spPr>
+              <a:xfrm>
+                <a:off x="723185" y="3669467"/>
+                <a:ext cx="357470" cy="161583"/>
+              </a:xfrm>
+              <a:prstGeom prst="rect">
+                <a:avLst/>
+              </a:prstGeom>
+              <a:blipFill>
+                <a:blip r:embed="rId8"/>
+                <a:stretch>
+                  <a:fillRect l="-10714" r="-10714" b="-7143"/>
+                </a:stretch>
+              </a:blipFill>
+            </p:spPr>
+            <p:txBody>
+              <a:bodyPr/>
+              <a:lstStyle/>
+              <a:p>
+                <a:r>
+                  <a:rPr lang="uk-UA">
+                    <a:noFill/>
+                  </a:rPr>
+                  <a:t> </a:t>
+                </a:r>
+              </a:p>
+            </p:txBody>
+          </p:sp>
+        </mc:Fallback>
+      </mc:AlternateContent>
+      <mc:AlternateContent xmlns:mc="http://schemas.openxmlformats.org/markup-compatibility/2006">
+        <mc:Choice xmlns:a14="http://schemas.microsoft.com/office/drawing/2010/main" Requires="a14">
+          <p:sp>
+            <p:nvSpPr>
+              <p:cNvPr id="28" name="TextBox 27">
+                <a:extLst>
+                  <a:ext uri="{FF2B5EF4-FFF2-40B4-BE49-F238E27FC236}">
+                    <a16:creationId xmlns:a16="http://schemas.microsoft.com/office/drawing/2014/main" id="{D34FD74C-CCEF-E64B-AFDE-E285FC72F6F3}"/>
+                  </a:ext>
+                </a:extLst>
+              </p:cNvPr>
+              <p:cNvSpPr txBox="1"/>
+              <p:nvPr/>
+            </p:nvSpPr>
+            <p:spPr>
+              <a:xfrm>
+                <a:off x="714368" y="3875698"/>
+                <a:ext cx="357470" cy="161583"/>
+              </a:xfrm>
+              <a:prstGeom prst="rect">
+                <a:avLst/>
+              </a:prstGeom>
+              <a:noFill/>
+            </p:spPr>
+            <p:txBody>
+              <a:bodyPr wrap="none" lIns="0" tIns="0" rIns="0" bIns="0" rtlCol="0">
+                <a:spAutoFit/>
+              </a:bodyPr>
+              <a:lstStyle/>
+              <a:p>
+                <a:pPr/>
+                <a14:m>
+                  <m:oMathPara xmlns:m="http://schemas.openxmlformats.org/officeDocument/2006/math">
+                    <m:oMathParaPr>
+                      <m:jc m:val="centerGroup"/>
+                    </m:oMathParaPr>
+                    <m:oMath xmlns:m="http://schemas.openxmlformats.org/officeDocument/2006/math">
+                      <m:r>
+                        <a:rPr lang="en-US" sz="1050" i="1" smtClean="0">
+                          <a:latin typeface="Cambria Math" panose="02040503050406030204" pitchFamily="18" charset="0"/>
+                        </a:rPr>
+                        <m:t>0</m:t>
+                      </m:r>
+                      <m:r>
+                        <a:rPr lang="en-US" sz="1050" b="0" i="1" smtClean="0">
+                          <a:latin typeface="Cambria Math" panose="02040503050406030204" pitchFamily="18" charset="0"/>
+                        </a:rPr>
+                        <m:t>,031</m:t>
+                      </m:r>
+                    </m:oMath>
+                  </m:oMathPara>
+                </a14:m>
+                <a:endParaRPr lang="uk-UA" sz="1200" dirty="0"/>
+              </a:p>
+            </p:txBody>
+          </p:sp>
+        </mc:Choice>
+        <mc:Fallback>
+          <p:sp>
+            <p:nvSpPr>
+              <p:cNvPr id="28" name="TextBox 27">
+                <a:extLst>
+                  <a:ext uri="{FF2B5EF4-FFF2-40B4-BE49-F238E27FC236}">
+                    <a16:creationId xmlns:a16="http://schemas.microsoft.com/office/drawing/2014/main" id="{D34FD74C-CCEF-E64B-AFDE-E285FC72F6F3}"/>
+                  </a:ext>
+                </a:extLst>
+              </p:cNvPr>
+              <p:cNvSpPr txBox="1">
+                <a:spLocks noRot="1" noChangeAspect="1" noMove="1" noResize="1" noEditPoints="1" noAdjustHandles="1" noChangeArrowheads="1" noChangeShapeType="1" noTextEdit="1"/>
+              </p:cNvSpPr>
+              <p:nvPr/>
+            </p:nvSpPr>
+            <p:spPr>
+              <a:xfrm>
+                <a:off x="714368" y="3875698"/>
+                <a:ext cx="357470" cy="161583"/>
+              </a:xfrm>
+              <a:prstGeom prst="rect">
+                <a:avLst/>
+              </a:prstGeom>
+              <a:blipFill>
+                <a:blip r:embed="rId9"/>
+                <a:stretch>
+                  <a:fillRect l="-10345" r="-6897" b="-7692"/>
+                </a:stretch>
+              </a:blipFill>
+            </p:spPr>
+            <p:txBody>
+              <a:bodyPr/>
+              <a:lstStyle/>
+              <a:p>
+                <a:r>
+                  <a:rPr lang="uk-UA">
+                    <a:noFill/>
+                  </a:rPr>
+                  <a:t> </a:t>
+                </a:r>
+              </a:p>
+            </p:txBody>
+          </p:sp>
+        </mc:Fallback>
+      </mc:AlternateContent>
+      <mc:AlternateContent xmlns:mc="http://schemas.openxmlformats.org/markup-compatibility/2006">
+        <mc:Choice xmlns:a14="http://schemas.microsoft.com/office/drawing/2010/main" Requires="a14">
+          <p:sp>
+            <p:nvSpPr>
+              <p:cNvPr id="29" name="TextBox 28">
+                <a:extLst>
+                  <a:ext uri="{FF2B5EF4-FFF2-40B4-BE49-F238E27FC236}">
+                    <a16:creationId xmlns:a16="http://schemas.microsoft.com/office/drawing/2014/main" id="{6DF904C5-E6E2-A841-8D1D-D73C642CE587}"/>
+                  </a:ext>
+                </a:extLst>
+              </p:cNvPr>
+              <p:cNvSpPr txBox="1"/>
+              <p:nvPr/>
+            </p:nvSpPr>
+            <p:spPr>
+              <a:xfrm>
+                <a:off x="714368" y="4001137"/>
+                <a:ext cx="357470" cy="161583"/>
+              </a:xfrm>
+              <a:prstGeom prst="rect">
+                <a:avLst/>
+              </a:prstGeom>
+              <a:noFill/>
+            </p:spPr>
+            <p:txBody>
+              <a:bodyPr wrap="none" lIns="0" tIns="0" rIns="0" bIns="0" rtlCol="0">
+                <a:spAutoFit/>
+              </a:bodyPr>
+              <a:lstStyle/>
+              <a:p>
+                <a:pPr/>
+                <a14:m>
+                  <m:oMathPara xmlns:m="http://schemas.openxmlformats.org/officeDocument/2006/math">
+                    <m:oMathParaPr>
+                      <m:jc m:val="centerGroup"/>
+                    </m:oMathParaPr>
+                    <m:oMath xmlns:m="http://schemas.openxmlformats.org/officeDocument/2006/math">
+                      <m:r>
+                        <a:rPr lang="en-US" sz="1050" i="1" smtClean="0">
+                          <a:latin typeface="Cambria Math" panose="02040503050406030204" pitchFamily="18" charset="0"/>
+                        </a:rPr>
+                        <m:t>0</m:t>
+                      </m:r>
+                      <m:r>
+                        <a:rPr lang="en-US" sz="1050" b="0" i="1" smtClean="0">
+                          <a:latin typeface="Cambria Math" panose="02040503050406030204" pitchFamily="18" charset="0"/>
+                        </a:rPr>
+                        <m:t>,019</m:t>
+                      </m:r>
+                    </m:oMath>
+                  </m:oMathPara>
+                </a14:m>
+                <a:endParaRPr lang="uk-UA" sz="1200" dirty="0"/>
+              </a:p>
+            </p:txBody>
+          </p:sp>
+        </mc:Choice>
+        <mc:Fallback>
+          <p:sp>
+            <p:nvSpPr>
+              <p:cNvPr id="29" name="TextBox 28">
+                <a:extLst>
+                  <a:ext uri="{FF2B5EF4-FFF2-40B4-BE49-F238E27FC236}">
+                    <a16:creationId xmlns:a16="http://schemas.microsoft.com/office/drawing/2014/main" id="{6DF904C5-E6E2-A841-8D1D-D73C642CE587}"/>
+                  </a:ext>
+                </a:extLst>
+              </p:cNvPr>
+              <p:cNvSpPr txBox="1">
+                <a:spLocks noRot="1" noChangeAspect="1" noMove="1" noResize="1" noEditPoints="1" noAdjustHandles="1" noChangeArrowheads="1" noChangeShapeType="1" noTextEdit="1"/>
+              </p:cNvSpPr>
+              <p:nvPr/>
+            </p:nvSpPr>
+            <p:spPr>
+              <a:xfrm>
+                <a:off x="714368" y="4001137"/>
+                <a:ext cx="357470" cy="161583"/>
+              </a:xfrm>
+              <a:prstGeom prst="rect">
+                <a:avLst/>
+              </a:prstGeom>
+              <a:blipFill>
+                <a:blip r:embed="rId10"/>
+                <a:stretch>
+                  <a:fillRect l="-10345" r="-6897" b="-7143"/>
+                </a:stretch>
+              </a:blipFill>
+            </p:spPr>
+            <p:txBody>
+              <a:bodyPr/>
+              <a:lstStyle/>
+              <a:p>
+                <a:r>
+                  <a:rPr lang="uk-UA">
+                    <a:noFill/>
+                  </a:rPr>
+                  <a:t> </a:t>
+                </a:r>
+              </a:p>
+            </p:txBody>
+          </p:sp>
+        </mc:Fallback>
+      </mc:AlternateContent>
+      <mc:AlternateContent xmlns:mc="http://schemas.openxmlformats.org/markup-compatibility/2006">
+        <mc:Choice xmlns:a14="http://schemas.microsoft.com/office/drawing/2010/main" Requires="a14">
+          <p:sp>
+            <p:nvSpPr>
+              <p:cNvPr id="30" name="TextBox 29">
+                <a:extLst>
+                  <a:ext uri="{FF2B5EF4-FFF2-40B4-BE49-F238E27FC236}">
+                    <a16:creationId xmlns:a16="http://schemas.microsoft.com/office/drawing/2014/main" id="{12D7B232-A0E8-584C-92C3-E9C9DA425F4B}"/>
+                  </a:ext>
+                </a:extLst>
+              </p:cNvPr>
+              <p:cNvSpPr txBox="1"/>
+              <p:nvPr/>
+            </p:nvSpPr>
+            <p:spPr>
+              <a:xfrm>
+                <a:off x="712596" y="4128378"/>
+                <a:ext cx="357470" cy="161583"/>
+              </a:xfrm>
+              <a:prstGeom prst="rect">
+                <a:avLst/>
+              </a:prstGeom>
+              <a:noFill/>
+            </p:spPr>
+            <p:txBody>
+              <a:bodyPr wrap="none" lIns="0" tIns="0" rIns="0" bIns="0" rtlCol="0">
+                <a:spAutoFit/>
+              </a:bodyPr>
+              <a:lstStyle/>
+              <a:p>
+                <a:pPr/>
+                <a14:m>
+                  <m:oMathPara xmlns:m="http://schemas.openxmlformats.org/officeDocument/2006/math">
+                    <m:oMathParaPr>
+                      <m:jc m:val="centerGroup"/>
+                    </m:oMathParaPr>
+                    <m:oMath xmlns:m="http://schemas.openxmlformats.org/officeDocument/2006/math">
+                      <m:r>
+                        <a:rPr lang="en-US" sz="1050" i="1" smtClean="0">
+                          <a:latin typeface="Cambria Math" panose="02040503050406030204" pitchFamily="18" charset="0"/>
+                        </a:rPr>
+                        <m:t>0</m:t>
+                      </m:r>
+                      <m:r>
+                        <a:rPr lang="en-US" sz="1050" b="0" i="1" smtClean="0">
+                          <a:latin typeface="Cambria Math" panose="02040503050406030204" pitchFamily="18" charset="0"/>
+                        </a:rPr>
+                        <m:t>,006</m:t>
+                      </m:r>
+                    </m:oMath>
+                  </m:oMathPara>
+                </a14:m>
+                <a:endParaRPr lang="uk-UA" sz="1200" dirty="0"/>
+              </a:p>
+            </p:txBody>
+          </p:sp>
+        </mc:Choice>
+        <mc:Fallback>
+          <p:sp>
+            <p:nvSpPr>
+              <p:cNvPr id="30" name="TextBox 29">
+                <a:extLst>
+                  <a:ext uri="{FF2B5EF4-FFF2-40B4-BE49-F238E27FC236}">
+                    <a16:creationId xmlns:a16="http://schemas.microsoft.com/office/drawing/2014/main" id="{12D7B232-A0E8-584C-92C3-E9C9DA425F4B}"/>
+                  </a:ext>
+                </a:extLst>
+              </p:cNvPr>
+              <p:cNvSpPr txBox="1">
+                <a:spLocks noRot="1" noChangeAspect="1" noMove="1" noResize="1" noEditPoints="1" noAdjustHandles="1" noChangeArrowheads="1" noChangeShapeType="1" noTextEdit="1"/>
+              </p:cNvSpPr>
+              <p:nvPr/>
+            </p:nvSpPr>
+            <p:spPr>
+              <a:xfrm>
+                <a:off x="712596" y="4128378"/>
+                <a:ext cx="357470" cy="161583"/>
+              </a:xfrm>
+              <a:prstGeom prst="rect">
+                <a:avLst/>
+              </a:prstGeom>
+              <a:blipFill>
+                <a:blip r:embed="rId11"/>
+                <a:stretch>
+                  <a:fillRect l="-10345" r="-6897" b="-7143"/>
+                </a:stretch>
+              </a:blipFill>
+            </p:spPr>
+            <p:txBody>
+              <a:bodyPr/>
+              <a:lstStyle/>
+              <a:p>
+                <a:r>
+                  <a:rPr lang="uk-UA">
+                    <a:noFill/>
+                  </a:rPr>
+                  <a:t> </a:t>
+                </a:r>
+              </a:p>
+            </p:txBody>
+          </p:sp>
+        </mc:Fallback>
+      </mc:AlternateContent>
+      <p:cxnSp>
+        <p:nvCxnSpPr>
+          <p:cNvPr id="32" name="Straight Connector 31">
+            <a:extLst>
+              <a:ext uri="{FF2B5EF4-FFF2-40B4-BE49-F238E27FC236}">
+                <a16:creationId xmlns:a16="http://schemas.microsoft.com/office/drawing/2014/main" id="{15913883-00B5-654C-AF17-0B3D2CECABB8}"/>
+              </a:ext>
+            </a:extLst>
+          </p:cNvPr>
+          <p:cNvCxnSpPr/>
+          <p:nvPr/>
+        </p:nvCxnSpPr>
+        <p:spPr>
+          <a:xfrm>
+            <a:off x="2005852" y="1620889"/>
+            <a:ext cx="583202" cy="1066893"/>
+          </a:xfrm>
+          <a:prstGeom prst="line">
+            <a:avLst/>
+          </a:prstGeom>
+          <a:ln w="12700">
+            <a:solidFill>
+              <a:schemeClr val="accent2"/>
+            </a:solidFill>
+          </a:ln>
+        </p:spPr>
+        <p:style>
+          <a:lnRef idx="1">
+            <a:schemeClr val="accent1"/>
+          </a:lnRef>
+          <a:fillRef idx="0">
+            <a:schemeClr val="accent1"/>
+          </a:fillRef>
+          <a:effectRef idx="0">
+            <a:schemeClr val="accent1"/>
+          </a:effectRef>
+          <a:fontRef idx="minor">
+            <a:schemeClr val="tx1"/>
+          </a:fontRef>
+        </p:style>
+      </p:cxnSp>
+      <p:cxnSp>
+        <p:nvCxnSpPr>
+          <p:cNvPr id="34" name="Straight Connector 33">
+            <a:extLst>
+              <a:ext uri="{FF2B5EF4-FFF2-40B4-BE49-F238E27FC236}">
+                <a16:creationId xmlns:a16="http://schemas.microsoft.com/office/drawing/2014/main" id="{AC79A28F-7811-724C-A4DC-7EE24EC138E9}"/>
+              </a:ext>
+            </a:extLst>
+          </p:cNvPr>
+          <p:cNvCxnSpPr>
+            <a:cxnSpLocks/>
+            <a:endCxn id="9" idx="0"/>
+          </p:cNvCxnSpPr>
+          <p:nvPr/>
+        </p:nvCxnSpPr>
+        <p:spPr>
+          <a:xfrm flipH="1">
+            <a:off x="2005853" y="1618085"/>
+            <a:ext cx="583202" cy="2667599"/>
+          </a:xfrm>
+          <a:prstGeom prst="line">
+            <a:avLst/>
+          </a:prstGeom>
+          <a:ln w="12700">
+            <a:solidFill>
+              <a:schemeClr val="accent2"/>
+            </a:solidFill>
+          </a:ln>
+        </p:spPr>
+        <p:style>
+          <a:lnRef idx="1">
+            <a:schemeClr val="accent1"/>
+          </a:lnRef>
+          <a:fillRef idx="0">
+            <a:schemeClr val="accent1"/>
+          </a:fillRef>
+          <a:effectRef idx="0">
+            <a:schemeClr val="accent1"/>
+          </a:effectRef>
+          <a:fontRef idx="minor">
+            <a:schemeClr val="tx1"/>
+          </a:fontRef>
+        </p:style>
+      </p:cxnSp>
+      <mc:AlternateContent xmlns:mc="http://schemas.openxmlformats.org/markup-compatibility/2006">
+        <mc:Choice xmlns:a14="http://schemas.microsoft.com/office/drawing/2010/main" Requires="a14">
+          <p:sp>
+            <p:nvSpPr>
+              <p:cNvPr id="41" name="TextBox 40">
+                <a:extLst>
+                  <a:ext uri="{FF2B5EF4-FFF2-40B4-BE49-F238E27FC236}">
+                    <a16:creationId xmlns:a16="http://schemas.microsoft.com/office/drawing/2014/main" id="{38783974-4682-CC4A-8712-793C55C63E63}"/>
+                  </a:ext>
+                </a:extLst>
+              </p:cNvPr>
+              <p:cNvSpPr txBox="1"/>
+              <p:nvPr/>
+            </p:nvSpPr>
+            <p:spPr>
+              <a:xfrm>
+                <a:off x="2781263" y="2072142"/>
+                <a:ext cx="854016" cy="161583"/>
+              </a:xfrm>
+              <a:prstGeom prst="rect">
+                <a:avLst/>
+              </a:prstGeom>
+              <a:noFill/>
+            </p:spPr>
+            <p:txBody>
+              <a:bodyPr wrap="none" lIns="0" tIns="0" rIns="0" bIns="0" rtlCol="0">
+                <a:spAutoFit/>
+              </a:bodyPr>
+              <a:lstStyle/>
+              <a:p>
+                <a:pPr/>
+                <a14:m>
+                  <m:oMathPara xmlns:m="http://schemas.openxmlformats.org/officeDocument/2006/math">
+                    <m:oMathParaPr>
+                      <m:jc m:val="centerGroup"/>
+                    </m:oMathParaPr>
+                    <m:oMath xmlns:m="http://schemas.openxmlformats.org/officeDocument/2006/math">
+                      <m:d>
+                        <m:dPr>
+                          <m:ctrlPr>
+                            <a:rPr lang="en-US" sz="1050" b="0" i="1" smtClean="0">
+                              <a:latin typeface="Cambria Math" panose="02040503050406030204" pitchFamily="18" charset="0"/>
+                            </a:rPr>
+                          </m:ctrlPr>
+                        </m:dPr>
+                        <m:e>
+                          <m:r>
+                            <a:rPr lang="uk-UA" sz="1050" i="1" smtClean="0">
+                              <a:latin typeface="Cambria Math" panose="02040503050406030204" pitchFamily="18" charset="0"/>
+                            </a:rPr>
+                            <m:t>3</m:t>
+                          </m:r>
+                          <m:r>
+                            <a:rPr lang="en-US" sz="1050" b="0" i="1" smtClean="0">
+                              <a:latin typeface="Cambria Math" panose="02040503050406030204" pitchFamily="18" charset="0"/>
+                            </a:rPr>
+                            <m:t>,</m:t>
+                          </m:r>
+                          <m:r>
+                            <a:rPr lang="uk-UA" sz="1050" b="0" i="1" smtClean="0">
+                              <a:latin typeface="Cambria Math" panose="02040503050406030204" pitchFamily="18" charset="0"/>
+                            </a:rPr>
+                            <m:t>726</m:t>
+                          </m:r>
+                          <m:r>
+                            <a:rPr lang="en-US" sz="1050" b="0" i="1" smtClean="0">
+                              <a:latin typeface="Cambria Math" panose="02040503050406030204" pitchFamily="18" charset="0"/>
+                            </a:rPr>
+                            <m:t>;0,176</m:t>
+                          </m:r>
+                        </m:e>
+                      </m:d>
+                    </m:oMath>
+                  </m:oMathPara>
+                </a14:m>
+                <a:endParaRPr lang="uk-UA" sz="1200" dirty="0"/>
+              </a:p>
+            </p:txBody>
+          </p:sp>
+        </mc:Choice>
+        <mc:Fallback>
+          <p:sp>
+            <p:nvSpPr>
+              <p:cNvPr id="41" name="TextBox 40">
+                <a:extLst>
+                  <a:ext uri="{FF2B5EF4-FFF2-40B4-BE49-F238E27FC236}">
+                    <a16:creationId xmlns:a16="http://schemas.microsoft.com/office/drawing/2014/main" id="{38783974-4682-CC4A-8712-793C55C63E63}"/>
+                  </a:ext>
+                </a:extLst>
+              </p:cNvPr>
+              <p:cNvSpPr txBox="1">
+                <a:spLocks noRot="1" noChangeAspect="1" noMove="1" noResize="1" noEditPoints="1" noAdjustHandles="1" noChangeArrowheads="1" noChangeShapeType="1" noTextEdit="1"/>
+              </p:cNvSpPr>
+              <p:nvPr/>
+            </p:nvSpPr>
+            <p:spPr>
+              <a:xfrm>
+                <a:off x="2781263" y="2072142"/>
+                <a:ext cx="854016" cy="161583"/>
+              </a:xfrm>
+              <a:prstGeom prst="rect">
+                <a:avLst/>
+              </a:prstGeom>
+              <a:blipFill>
+                <a:blip r:embed="rId12"/>
+                <a:stretch>
+                  <a:fillRect b="-15385"/>
+                </a:stretch>
+              </a:blipFill>
+            </p:spPr>
+            <p:txBody>
+              <a:bodyPr/>
+              <a:lstStyle/>
+              <a:p>
+                <a:r>
+                  <a:rPr lang="uk-UA">
+                    <a:noFill/>
+                  </a:rPr>
+                  <a:t> </a:t>
+                </a:r>
+              </a:p>
+            </p:txBody>
+          </p:sp>
+        </mc:Fallback>
+      </mc:AlternateContent>
+      <p:cxnSp>
+        <p:nvCxnSpPr>
+          <p:cNvPr id="43" name="Straight Arrow Connector 42">
+            <a:extLst>
+              <a:ext uri="{FF2B5EF4-FFF2-40B4-BE49-F238E27FC236}">
+                <a16:creationId xmlns:a16="http://schemas.microsoft.com/office/drawing/2014/main" id="{31FEEFA4-41AA-724E-B964-7F98E23C386B}"/>
+              </a:ext>
+            </a:extLst>
+          </p:cNvPr>
+          <p:cNvCxnSpPr>
+            <a:cxnSpLocks/>
+          </p:cNvCxnSpPr>
+          <p:nvPr/>
+        </p:nvCxnSpPr>
+        <p:spPr>
+          <a:xfrm flipH="1">
+            <a:off x="2451319" y="2233725"/>
+            <a:ext cx="429335" cy="145949"/>
+          </a:xfrm>
+          <a:prstGeom prst="straightConnector1">
+            <a:avLst/>
+          </a:prstGeom>
+          <a:ln w="12700">
+            <a:tailEnd type="triangle"/>
+          </a:ln>
+        </p:spPr>
+        <p:style>
+          <a:lnRef idx="1">
+            <a:schemeClr val="dk1"/>
+          </a:lnRef>
+          <a:fillRef idx="0">
+            <a:schemeClr val="dk1"/>
+          </a:fillRef>
+          <a:effectRef idx="0">
+            <a:schemeClr val="dk1"/>
+          </a:effectRef>
+          <a:fontRef idx="minor">
+            <a:schemeClr val="tx1"/>
+          </a:fontRef>
+        </p:style>
+      </p:cxnSp>
+      <mc:AlternateContent xmlns:mc="http://schemas.openxmlformats.org/markup-compatibility/2006">
+        <mc:Choice xmlns:a14="http://schemas.microsoft.com/office/drawing/2010/main" Requires="a14">
+          <p:sp>
+            <p:nvSpPr>
+              <p:cNvPr id="45" name="TextBox 44">
+                <a:extLst>
+                  <a:ext uri="{FF2B5EF4-FFF2-40B4-BE49-F238E27FC236}">
+                    <a16:creationId xmlns:a16="http://schemas.microsoft.com/office/drawing/2014/main" id="{DC28FD5F-7E85-E34F-937D-897CA883682E}"/>
+                  </a:ext>
+                </a:extLst>
+              </p:cNvPr>
+              <p:cNvSpPr txBox="1"/>
+              <p:nvPr/>
+            </p:nvSpPr>
+            <p:spPr>
+              <a:xfrm>
+                <a:off x="4421187" y="4209169"/>
+                <a:ext cx="141705" cy="215444"/>
+              </a:xfrm>
+              <a:prstGeom prst="rect">
+                <a:avLst/>
+              </a:prstGeom>
+              <a:noFill/>
+            </p:spPr>
+            <p:txBody>
+              <a:bodyPr wrap="none" lIns="0" tIns="0" rIns="0" bIns="0" rtlCol="0">
+                <a:spAutoFit/>
+              </a:bodyPr>
+              <a:lstStyle/>
+              <a:p>
+                <a:pPr/>
+                <a14:m>
+                  <m:oMathPara xmlns:m="http://schemas.openxmlformats.org/officeDocument/2006/math">
+                    <m:oMathParaPr>
+                      <m:jc m:val="centerGroup"/>
+                    </m:oMathParaPr>
+                    <m:oMath xmlns:m="http://schemas.openxmlformats.org/officeDocument/2006/math">
+                      <m:r>
+                        <a:rPr lang="en-US" sz="1400" b="0" i="1" smtClean="0">
+                          <a:latin typeface="Cambria Math" panose="02040503050406030204" pitchFamily="18" charset="0"/>
+                        </a:rPr>
+                        <m:t>𝑥</m:t>
+                      </m:r>
+                    </m:oMath>
+                  </m:oMathPara>
+                </a14:m>
+                <a:endParaRPr lang="uk-UA" dirty="0"/>
+              </a:p>
+            </p:txBody>
+          </p:sp>
+        </mc:Choice>
+        <mc:Fallback>
+          <p:sp>
+            <p:nvSpPr>
+              <p:cNvPr id="45" name="TextBox 44">
+                <a:extLst>
+                  <a:ext uri="{FF2B5EF4-FFF2-40B4-BE49-F238E27FC236}">
+                    <a16:creationId xmlns:a16="http://schemas.microsoft.com/office/drawing/2014/main" id="{DC28FD5F-7E85-E34F-937D-897CA883682E}"/>
+                  </a:ext>
+                </a:extLst>
+              </p:cNvPr>
+              <p:cNvSpPr txBox="1">
+                <a:spLocks noRot="1" noChangeAspect="1" noMove="1" noResize="1" noEditPoints="1" noAdjustHandles="1" noChangeArrowheads="1" noChangeShapeType="1" noTextEdit="1"/>
+              </p:cNvSpPr>
+              <p:nvPr/>
+            </p:nvSpPr>
+            <p:spPr>
+              <a:xfrm>
+                <a:off x="4421187" y="4209169"/>
+                <a:ext cx="141705" cy="215444"/>
+              </a:xfrm>
+              <a:prstGeom prst="rect">
+                <a:avLst/>
+              </a:prstGeom>
+              <a:blipFill>
+                <a:blip r:embed="rId13"/>
+                <a:stretch>
+                  <a:fillRect l="-16667" r="-8333"/>
+                </a:stretch>
+              </a:blipFill>
+            </p:spPr>
+            <p:txBody>
+              <a:bodyPr/>
+              <a:lstStyle/>
+              <a:p>
+                <a:r>
+                  <a:rPr lang="uk-UA">
+                    <a:noFill/>
+                  </a:rPr>
+                  <a:t> </a:t>
+                </a:r>
+              </a:p>
+            </p:txBody>
+          </p:sp>
+        </mc:Fallback>
+      </mc:AlternateContent>
+      <mc:AlternateContent xmlns:mc="http://schemas.openxmlformats.org/markup-compatibility/2006">
+        <mc:Choice xmlns:a14="http://schemas.microsoft.com/office/drawing/2010/main" Requires="a14">
+          <p:sp>
+            <p:nvSpPr>
+              <p:cNvPr id="46" name="TextBox 45">
+                <a:extLst>
+                  <a:ext uri="{FF2B5EF4-FFF2-40B4-BE49-F238E27FC236}">
+                    <a16:creationId xmlns:a16="http://schemas.microsoft.com/office/drawing/2014/main" id="{E2622AAD-A4AC-9746-B26D-CD130A5852DE}"/>
+                  </a:ext>
+                </a:extLst>
+              </p:cNvPr>
+              <p:cNvSpPr txBox="1"/>
+              <p:nvPr/>
+            </p:nvSpPr>
+            <p:spPr>
+              <a:xfrm>
+                <a:off x="1089473" y="1106860"/>
+                <a:ext cx="197875" cy="215444"/>
+              </a:xfrm>
+              <a:prstGeom prst="rect">
+                <a:avLst/>
+              </a:prstGeom>
+              <a:noFill/>
+            </p:spPr>
+            <p:txBody>
+              <a:bodyPr wrap="none" lIns="0" tIns="0" rIns="0" bIns="0" rtlCol="0">
+                <a:spAutoFit/>
+              </a:bodyPr>
+              <a:lstStyle/>
+              <a:p>
+                <a:pPr/>
+                <a14:m>
+                  <m:oMathPara xmlns:m="http://schemas.openxmlformats.org/officeDocument/2006/math">
+                    <m:oMathParaPr>
+                      <m:jc m:val="centerGroup"/>
+                    </m:oMathParaPr>
+                    <m:oMath xmlns:m="http://schemas.openxmlformats.org/officeDocument/2006/math">
+                      <m:sSub>
+                        <m:sSubPr>
+                          <m:ctrlPr>
+                            <a:rPr lang="en-US" sz="1400" b="0" i="1" smtClean="0">
+                              <a:latin typeface="Cambria Math" panose="02040503050406030204" pitchFamily="18" charset="0"/>
+                            </a:rPr>
+                          </m:ctrlPr>
+                        </m:sSubPr>
+                        <m:e>
+                          <m:r>
+                            <a:rPr lang="en-US" sz="1400" b="0" i="1" smtClean="0">
+                              <a:latin typeface="Cambria Math" panose="02040503050406030204" pitchFamily="18" charset="0"/>
+                            </a:rPr>
+                            <m:t>h</m:t>
+                          </m:r>
+                        </m:e>
+                        <m:sub>
+                          <m:r>
+                            <a:rPr lang="en-US" sz="1400" b="0" i="1" smtClean="0">
+                              <a:latin typeface="Cambria Math" panose="02040503050406030204" pitchFamily="18" charset="0"/>
+                            </a:rPr>
+                            <m:t>𝑖</m:t>
+                          </m:r>
+                        </m:sub>
+                      </m:sSub>
+                    </m:oMath>
+                  </m:oMathPara>
+                </a14:m>
+                <a:endParaRPr lang="uk-UA" dirty="0"/>
+              </a:p>
+            </p:txBody>
+          </p:sp>
+        </mc:Choice>
+        <mc:Fallback>
+          <p:sp>
+            <p:nvSpPr>
+              <p:cNvPr id="46" name="TextBox 45">
+                <a:extLst>
+                  <a:ext uri="{FF2B5EF4-FFF2-40B4-BE49-F238E27FC236}">
+                    <a16:creationId xmlns:a16="http://schemas.microsoft.com/office/drawing/2014/main" id="{E2622AAD-A4AC-9746-B26D-CD130A5852DE}"/>
+                  </a:ext>
+                </a:extLst>
+              </p:cNvPr>
+              <p:cNvSpPr txBox="1">
+                <a:spLocks noRot="1" noChangeAspect="1" noMove="1" noResize="1" noEditPoints="1" noAdjustHandles="1" noChangeArrowheads="1" noChangeShapeType="1" noTextEdit="1"/>
+              </p:cNvSpPr>
+              <p:nvPr/>
+            </p:nvSpPr>
+            <p:spPr>
+              <a:xfrm>
+                <a:off x="1089473" y="1106860"/>
+                <a:ext cx="197875" cy="215444"/>
+              </a:xfrm>
+              <a:prstGeom prst="rect">
+                <a:avLst/>
+              </a:prstGeom>
+              <a:blipFill>
+                <a:blip r:embed="rId14"/>
+                <a:stretch>
+                  <a:fillRect l="-17647" r="-5882" b="-11111"/>
+                </a:stretch>
+              </a:blipFill>
+            </p:spPr>
+            <p:txBody>
+              <a:bodyPr/>
+              <a:lstStyle/>
+              <a:p>
+                <a:r>
+                  <a:rPr lang="uk-UA">
+                    <a:noFill/>
+                  </a:rPr>
+                  <a:t> </a:t>
+                </a:r>
+              </a:p>
+            </p:txBody>
+          </p:sp>
+        </mc:Fallback>
+      </mc:AlternateContent>
+    </p:spTree>
+    <p:extLst>
+      <p:ext uri="{BB962C8B-B14F-4D97-AF65-F5344CB8AC3E}">
+        <p14:creationId xmlns:p14="http://schemas.microsoft.com/office/powerpoint/2010/main" val="3674332143"/>
       </p:ext>
     </p:extLst>
   </p:cSld>

</xml_diff>

<commit_message>
Add distribution curve merge graph
</commit_message>
<xml_diff>
--- a/Lab1/Illustrations.pptx
+++ b/Lab1/Illustrations.pptx
@@ -10,6 +10,7 @@
     <p:sldId id="258" r:id="rId4"/>
     <p:sldId id="259" r:id="rId5"/>
     <p:sldId id="260" r:id="rId6"/>
+    <p:sldId id="261" r:id="rId7"/>
   </p:sldIdLst>
   <p:sldSz cx="12192000" cy="6858000"/>
   <p:notesSz cx="6858000" cy="9144000"/>
@@ -14645,6 +14646,2746 @@
 </p:sld>
 </file>
 
+<file path=ppt/slides/slide6.xml><?xml version="1.0" encoding="utf-8"?>
+<p:sld xmlns:a="http://schemas.openxmlformats.org/drawingml/2006/main" xmlns:r="http://schemas.openxmlformats.org/officeDocument/2006/relationships" xmlns:p="http://schemas.openxmlformats.org/presentationml/2006/main">
+  <p:cSld>
+    <p:spTree>
+      <p:nvGrpSpPr>
+        <p:cNvPr id="1" name=""/>
+        <p:cNvGrpSpPr/>
+        <p:nvPr/>
+      </p:nvGrpSpPr>
+      <p:grpSpPr>
+        <a:xfrm>
+          <a:off x="0" y="0"/>
+          <a:ext cx="0" cy="0"/>
+          <a:chOff x="0" y="0"/>
+          <a:chExt cx="0" cy="0"/>
+        </a:xfrm>
+      </p:grpSpPr>
+      <p:cxnSp>
+        <p:nvCxnSpPr>
+          <p:cNvPr id="5" name="Straight Arrow Connector 4">
+            <a:extLst>
+              <a:ext uri="{FF2B5EF4-FFF2-40B4-BE49-F238E27FC236}">
+                <a16:creationId xmlns:a16="http://schemas.microsoft.com/office/drawing/2014/main" id="{4C761D21-C243-C842-AF21-A0936A0A2342}"/>
+              </a:ext>
+            </a:extLst>
+          </p:cNvPr>
+          <p:cNvCxnSpPr>
+            <a:cxnSpLocks/>
+          </p:cNvCxnSpPr>
+          <p:nvPr/>
+        </p:nvCxnSpPr>
+        <p:spPr>
+          <a:xfrm flipV="1">
+            <a:off x="1028453" y="619432"/>
+            <a:ext cx="0" cy="4051871"/>
+          </a:xfrm>
+          <a:prstGeom prst="straightConnector1">
+            <a:avLst/>
+          </a:prstGeom>
+          <a:ln w="19050">
+            <a:tailEnd type="triangle"/>
+          </a:ln>
+        </p:spPr>
+        <p:style>
+          <a:lnRef idx="1">
+            <a:schemeClr val="dk1"/>
+          </a:lnRef>
+          <a:fillRef idx="0">
+            <a:schemeClr val="dk1"/>
+          </a:fillRef>
+          <a:effectRef idx="0">
+            <a:schemeClr val="dk1"/>
+          </a:effectRef>
+          <a:fontRef idx="minor">
+            <a:schemeClr val="tx1"/>
+          </a:fontRef>
+        </p:style>
+      </p:cxnSp>
+      <p:cxnSp>
+        <p:nvCxnSpPr>
+          <p:cNvPr id="6" name="Straight Arrow Connector 5">
+            <a:extLst>
+              <a:ext uri="{FF2B5EF4-FFF2-40B4-BE49-F238E27FC236}">
+                <a16:creationId xmlns:a16="http://schemas.microsoft.com/office/drawing/2014/main" id="{3FE20E6C-78A0-3E40-8044-D11FFAE47220}"/>
+              </a:ext>
+            </a:extLst>
+          </p:cNvPr>
+          <p:cNvCxnSpPr>
+            <a:cxnSpLocks/>
+          </p:cNvCxnSpPr>
+          <p:nvPr/>
+        </p:nvCxnSpPr>
+        <p:spPr>
+          <a:xfrm>
+            <a:off x="1028453" y="4671302"/>
+            <a:ext cx="6185147" cy="0"/>
+          </a:xfrm>
+          <a:prstGeom prst="straightConnector1">
+            <a:avLst/>
+          </a:prstGeom>
+          <a:ln w="19050">
+            <a:tailEnd type="triangle"/>
+          </a:ln>
+        </p:spPr>
+        <p:style>
+          <a:lnRef idx="1">
+            <a:schemeClr val="dk1"/>
+          </a:lnRef>
+          <a:fillRef idx="0">
+            <a:schemeClr val="dk1"/>
+          </a:fillRef>
+          <a:effectRef idx="0">
+            <a:schemeClr val="dk1"/>
+          </a:effectRef>
+          <a:fontRef idx="minor">
+            <a:schemeClr val="tx1"/>
+          </a:fontRef>
+        </p:style>
+      </p:cxnSp>
+      <p:sp>
+        <p:nvSpPr>
+          <p:cNvPr id="7" name="Rectangle 6">
+            <a:extLst>
+              <a:ext uri="{FF2B5EF4-FFF2-40B4-BE49-F238E27FC236}">
+                <a16:creationId xmlns:a16="http://schemas.microsoft.com/office/drawing/2014/main" id="{29FAAC7F-230D-E844-8717-C6B8FBCD66D5}"/>
+              </a:ext>
+            </a:extLst>
+          </p:cNvPr>
+          <p:cNvSpPr/>
+          <p:nvPr/>
+        </p:nvSpPr>
+        <p:spPr>
+          <a:xfrm>
+            <a:off x="1958308" y="2006508"/>
+            <a:ext cx="583200" cy="2667600"/>
+          </a:xfrm>
+          <a:prstGeom prst="rect">
+            <a:avLst/>
+          </a:prstGeom>
+          <a:noFill/>
+          <a:ln w="19050">
+            <a:solidFill>
+              <a:schemeClr val="tx1"/>
+            </a:solidFill>
+          </a:ln>
+        </p:spPr>
+        <p:style>
+          <a:lnRef idx="2">
+            <a:schemeClr val="accent1">
+              <a:shade val="50000"/>
+            </a:schemeClr>
+          </a:lnRef>
+          <a:fillRef idx="1">
+            <a:schemeClr val="accent1"/>
+          </a:fillRef>
+          <a:effectRef idx="0">
+            <a:schemeClr val="accent1"/>
+          </a:effectRef>
+          <a:fontRef idx="minor">
+            <a:schemeClr val="lt1"/>
+          </a:fontRef>
+        </p:style>
+        <p:txBody>
+          <a:bodyPr rtlCol="0" anchor="ctr"/>
+          <a:lstStyle/>
+          <a:p>
+            <a:pPr algn="ctr"/>
+            <a:endParaRPr lang="uk-UA"/>
+          </a:p>
+        </p:txBody>
+      </p:sp>
+      <p:sp>
+        <p:nvSpPr>
+          <p:cNvPr id="8" name="Rectangle 7">
+            <a:extLst>
+              <a:ext uri="{FF2B5EF4-FFF2-40B4-BE49-F238E27FC236}">
+                <a16:creationId xmlns:a16="http://schemas.microsoft.com/office/drawing/2014/main" id="{F4EB577A-4BAB-DF4E-B823-9A628BDAE3F2}"/>
+              </a:ext>
+            </a:extLst>
+          </p:cNvPr>
+          <p:cNvSpPr/>
+          <p:nvPr/>
+        </p:nvSpPr>
+        <p:spPr>
+          <a:xfrm>
+            <a:off x="2536852" y="3073400"/>
+            <a:ext cx="583200" cy="1597903"/>
+          </a:xfrm>
+          <a:prstGeom prst="rect">
+            <a:avLst/>
+          </a:prstGeom>
+          <a:noFill/>
+          <a:ln w="19050">
+            <a:solidFill>
+              <a:schemeClr val="tx1"/>
+            </a:solidFill>
+          </a:ln>
+        </p:spPr>
+        <p:style>
+          <a:lnRef idx="2">
+            <a:schemeClr val="accent1">
+              <a:shade val="50000"/>
+            </a:schemeClr>
+          </a:lnRef>
+          <a:fillRef idx="1">
+            <a:schemeClr val="accent1"/>
+          </a:fillRef>
+          <a:effectRef idx="0">
+            <a:schemeClr val="accent1"/>
+          </a:effectRef>
+          <a:fontRef idx="minor">
+            <a:schemeClr val="lt1"/>
+          </a:fontRef>
+        </p:style>
+        <p:txBody>
+          <a:bodyPr rtlCol="0" anchor="ctr"/>
+          <a:lstStyle/>
+          <a:p>
+            <a:pPr algn="ctr"/>
+            <a:endParaRPr lang="uk-UA"/>
+          </a:p>
+        </p:txBody>
+      </p:sp>
+      <mc:AlternateContent xmlns:mc="http://schemas.openxmlformats.org/markup-compatibility/2006">
+        <mc:Choice xmlns:a14="http://schemas.microsoft.com/office/drawing/2010/main" Requires="a14">
+          <p:sp>
+            <p:nvSpPr>
+              <p:cNvPr id="9" name="TextBox 8">
+                <a:extLst>
+                  <a:ext uri="{FF2B5EF4-FFF2-40B4-BE49-F238E27FC236}">
+                    <a16:creationId xmlns:a16="http://schemas.microsoft.com/office/drawing/2014/main" id="{ED41207E-358C-2546-8D36-CEC27729A811}"/>
+                  </a:ext>
+                </a:extLst>
+              </p:cNvPr>
+              <p:cNvSpPr txBox="1"/>
+              <p:nvPr/>
+            </p:nvSpPr>
+            <p:spPr>
+              <a:xfrm>
+                <a:off x="1766099" y="4671302"/>
+                <a:ext cx="375103" cy="215444"/>
+              </a:xfrm>
+              <a:prstGeom prst="rect">
+                <a:avLst/>
+              </a:prstGeom>
+              <a:noFill/>
+            </p:spPr>
+            <p:txBody>
+              <a:bodyPr wrap="none" lIns="0" tIns="0" rIns="0" bIns="0" rtlCol="0">
+                <a:spAutoFit/>
+              </a:bodyPr>
+              <a:lstStyle/>
+              <a:p>
+                <a:pPr/>
+                <a14:m>
+                  <m:oMathPara xmlns:m="http://schemas.openxmlformats.org/officeDocument/2006/math">
+                    <m:oMathParaPr>
+                      <m:jc m:val="centerGroup"/>
+                    </m:oMathParaPr>
+                    <m:oMath xmlns:m="http://schemas.openxmlformats.org/officeDocument/2006/math">
+                      <m:r>
+                        <a:rPr lang="en-US" sz="1400" b="0" i="1" smtClean="0">
+                          <a:latin typeface="Cambria Math" panose="02040503050406030204" pitchFamily="18" charset="0"/>
+                        </a:rPr>
+                        <m:t>2,57</m:t>
+                      </m:r>
+                    </m:oMath>
+                  </m:oMathPara>
+                </a14:m>
+                <a:endParaRPr lang="uk-UA" dirty="0"/>
+              </a:p>
+            </p:txBody>
+          </p:sp>
+        </mc:Choice>
+        <mc:Fallback>
+          <p:sp>
+            <p:nvSpPr>
+              <p:cNvPr id="9" name="TextBox 8">
+                <a:extLst>
+                  <a:ext uri="{FF2B5EF4-FFF2-40B4-BE49-F238E27FC236}">
+                    <a16:creationId xmlns:a16="http://schemas.microsoft.com/office/drawing/2014/main" id="{ED41207E-358C-2546-8D36-CEC27729A811}"/>
+                  </a:ext>
+                </a:extLst>
+              </p:cNvPr>
+              <p:cNvSpPr txBox="1">
+                <a:spLocks noRot="1" noChangeAspect="1" noMove="1" noResize="1" noEditPoints="1" noAdjustHandles="1" noChangeArrowheads="1" noChangeShapeType="1" noTextEdit="1"/>
+              </p:cNvSpPr>
+              <p:nvPr/>
+            </p:nvSpPr>
+            <p:spPr>
+              <a:xfrm>
+                <a:off x="1766099" y="4671302"/>
+                <a:ext cx="375103" cy="215444"/>
+              </a:xfrm>
+              <a:prstGeom prst="rect">
+                <a:avLst/>
+              </a:prstGeom>
+              <a:blipFill>
+                <a:blip r:embed="rId2"/>
+                <a:stretch>
+                  <a:fillRect l="-13333" r="-13333" b="-5556"/>
+                </a:stretch>
+              </a:blipFill>
+            </p:spPr>
+            <p:txBody>
+              <a:bodyPr/>
+              <a:lstStyle/>
+              <a:p>
+                <a:r>
+                  <a:rPr lang="uk-UA">
+                    <a:noFill/>
+                  </a:rPr>
+                  <a:t> </a:t>
+                </a:r>
+              </a:p>
+            </p:txBody>
+          </p:sp>
+        </mc:Fallback>
+      </mc:AlternateContent>
+      <mc:AlternateContent xmlns:mc="http://schemas.openxmlformats.org/markup-compatibility/2006">
+        <mc:Choice xmlns:a14="http://schemas.microsoft.com/office/drawing/2010/main" Requires="a14">
+          <p:sp>
+            <p:nvSpPr>
+              <p:cNvPr id="10" name="TextBox 9">
+                <a:extLst>
+                  <a:ext uri="{FF2B5EF4-FFF2-40B4-BE49-F238E27FC236}">
+                    <a16:creationId xmlns:a16="http://schemas.microsoft.com/office/drawing/2014/main" id="{4BA4F6E9-0807-A147-85F3-79DF47B4A799}"/>
+                  </a:ext>
+                </a:extLst>
+              </p:cNvPr>
+              <p:cNvSpPr txBox="1"/>
+              <p:nvPr/>
+            </p:nvSpPr>
+            <p:spPr>
+              <a:xfrm>
+                <a:off x="2349301" y="4671302"/>
+                <a:ext cx="375103" cy="215444"/>
+              </a:xfrm>
+              <a:prstGeom prst="rect">
+                <a:avLst/>
+              </a:prstGeom>
+              <a:noFill/>
+            </p:spPr>
+            <p:txBody>
+              <a:bodyPr wrap="none" lIns="0" tIns="0" rIns="0" bIns="0" rtlCol="0">
+                <a:spAutoFit/>
+              </a:bodyPr>
+              <a:lstStyle/>
+              <a:p>
+                <a:pPr/>
+                <a14:m>
+                  <m:oMathPara xmlns:m="http://schemas.openxmlformats.org/officeDocument/2006/math">
+                    <m:oMathParaPr>
+                      <m:jc m:val="centerGroup"/>
+                    </m:oMathParaPr>
+                    <m:oMath xmlns:m="http://schemas.openxmlformats.org/officeDocument/2006/math">
+                      <m:r>
+                        <a:rPr lang="en-US" sz="1400" b="0" i="1" smtClean="0">
+                          <a:latin typeface="Cambria Math" panose="02040503050406030204" pitchFamily="18" charset="0"/>
+                        </a:rPr>
+                        <m:t>4,19</m:t>
+                      </m:r>
+                    </m:oMath>
+                  </m:oMathPara>
+                </a14:m>
+                <a:endParaRPr lang="uk-UA" dirty="0"/>
+              </a:p>
+            </p:txBody>
+          </p:sp>
+        </mc:Choice>
+        <mc:Fallback>
+          <p:sp>
+            <p:nvSpPr>
+              <p:cNvPr id="10" name="TextBox 9">
+                <a:extLst>
+                  <a:ext uri="{FF2B5EF4-FFF2-40B4-BE49-F238E27FC236}">
+                    <a16:creationId xmlns:a16="http://schemas.microsoft.com/office/drawing/2014/main" id="{4BA4F6E9-0807-A147-85F3-79DF47B4A799}"/>
+                  </a:ext>
+                </a:extLst>
+              </p:cNvPr>
+              <p:cNvSpPr txBox="1">
+                <a:spLocks noRot="1" noChangeAspect="1" noMove="1" noResize="1" noEditPoints="1" noAdjustHandles="1" noChangeArrowheads="1" noChangeShapeType="1" noTextEdit="1"/>
+              </p:cNvSpPr>
+              <p:nvPr/>
+            </p:nvSpPr>
+            <p:spPr>
+              <a:xfrm>
+                <a:off x="2349301" y="4671302"/>
+                <a:ext cx="375103" cy="215444"/>
+              </a:xfrm>
+              <a:prstGeom prst="rect">
+                <a:avLst/>
+              </a:prstGeom>
+              <a:blipFill>
+                <a:blip r:embed="rId3"/>
+                <a:stretch>
+                  <a:fillRect l="-9677" r="-9677" b="-5556"/>
+                </a:stretch>
+              </a:blipFill>
+            </p:spPr>
+            <p:txBody>
+              <a:bodyPr/>
+              <a:lstStyle/>
+              <a:p>
+                <a:r>
+                  <a:rPr lang="uk-UA">
+                    <a:noFill/>
+                  </a:rPr>
+                  <a:t> </a:t>
+                </a:r>
+              </a:p>
+            </p:txBody>
+          </p:sp>
+        </mc:Fallback>
+      </mc:AlternateContent>
+      <mc:AlternateContent xmlns:mc="http://schemas.openxmlformats.org/markup-compatibility/2006">
+        <mc:Choice xmlns:a14="http://schemas.microsoft.com/office/drawing/2010/main" Requires="a14">
+          <p:sp>
+            <p:nvSpPr>
+              <p:cNvPr id="11" name="TextBox 10">
+                <a:extLst>
+                  <a:ext uri="{FF2B5EF4-FFF2-40B4-BE49-F238E27FC236}">
+                    <a16:creationId xmlns:a16="http://schemas.microsoft.com/office/drawing/2014/main" id="{F694DC91-92CA-3348-8E72-BDF13003B708}"/>
+                  </a:ext>
+                </a:extLst>
+              </p:cNvPr>
+              <p:cNvSpPr txBox="1"/>
+              <p:nvPr/>
+            </p:nvSpPr>
+            <p:spPr>
+              <a:xfrm>
+                <a:off x="2932501" y="4671302"/>
+                <a:ext cx="375103" cy="215444"/>
+              </a:xfrm>
+              <a:prstGeom prst="rect">
+                <a:avLst/>
+              </a:prstGeom>
+              <a:noFill/>
+            </p:spPr>
+            <p:txBody>
+              <a:bodyPr wrap="none" lIns="0" tIns="0" rIns="0" bIns="0" rtlCol="0">
+                <a:spAutoFit/>
+              </a:bodyPr>
+              <a:lstStyle/>
+              <a:p>
+                <a:pPr/>
+                <a14:m>
+                  <m:oMathPara xmlns:m="http://schemas.openxmlformats.org/officeDocument/2006/math">
+                    <m:oMathParaPr>
+                      <m:jc m:val="centerGroup"/>
+                    </m:oMathParaPr>
+                    <m:oMath xmlns:m="http://schemas.openxmlformats.org/officeDocument/2006/math">
+                      <m:r>
+                        <a:rPr lang="en-US" sz="1400" b="0" i="1" smtClean="0">
+                          <a:latin typeface="Cambria Math" panose="02040503050406030204" pitchFamily="18" charset="0"/>
+                        </a:rPr>
+                        <m:t>5,81</m:t>
+                      </m:r>
+                    </m:oMath>
+                  </m:oMathPara>
+                </a14:m>
+                <a:endParaRPr lang="uk-UA" dirty="0"/>
+              </a:p>
+            </p:txBody>
+          </p:sp>
+        </mc:Choice>
+        <mc:Fallback>
+          <p:sp>
+            <p:nvSpPr>
+              <p:cNvPr id="11" name="TextBox 10">
+                <a:extLst>
+                  <a:ext uri="{FF2B5EF4-FFF2-40B4-BE49-F238E27FC236}">
+                    <a16:creationId xmlns:a16="http://schemas.microsoft.com/office/drawing/2014/main" id="{F694DC91-92CA-3348-8E72-BDF13003B708}"/>
+                  </a:ext>
+                </a:extLst>
+              </p:cNvPr>
+              <p:cNvSpPr txBox="1">
+                <a:spLocks noRot="1" noChangeAspect="1" noMove="1" noResize="1" noEditPoints="1" noAdjustHandles="1" noChangeArrowheads="1" noChangeShapeType="1" noTextEdit="1"/>
+              </p:cNvSpPr>
+              <p:nvPr/>
+            </p:nvSpPr>
+            <p:spPr>
+              <a:xfrm>
+                <a:off x="2932501" y="4671302"/>
+                <a:ext cx="375103" cy="215444"/>
+              </a:xfrm>
+              <a:prstGeom prst="rect">
+                <a:avLst/>
+              </a:prstGeom>
+              <a:blipFill>
+                <a:blip r:embed="rId4"/>
+                <a:stretch>
+                  <a:fillRect l="-9677" r="-9677" b="-5556"/>
+                </a:stretch>
+              </a:blipFill>
+            </p:spPr>
+            <p:txBody>
+              <a:bodyPr/>
+              <a:lstStyle/>
+              <a:p>
+                <a:r>
+                  <a:rPr lang="uk-UA">
+                    <a:noFill/>
+                  </a:rPr>
+                  <a:t> </a:t>
+                </a:r>
+              </a:p>
+            </p:txBody>
+          </p:sp>
+        </mc:Fallback>
+      </mc:AlternateContent>
+      <p:sp>
+        <p:nvSpPr>
+          <p:cNvPr id="12" name="Rectangle 11">
+            <a:extLst>
+              <a:ext uri="{FF2B5EF4-FFF2-40B4-BE49-F238E27FC236}">
+                <a16:creationId xmlns:a16="http://schemas.microsoft.com/office/drawing/2014/main" id="{D9F488AD-03C1-534D-B723-0756FD424F00}"/>
+              </a:ext>
+            </a:extLst>
+          </p:cNvPr>
+          <p:cNvSpPr/>
+          <p:nvPr/>
+        </p:nvSpPr>
+        <p:spPr>
+          <a:xfrm>
+            <a:off x="3120052" y="3600454"/>
+            <a:ext cx="583200" cy="1070847"/>
+          </a:xfrm>
+          <a:prstGeom prst="rect">
+            <a:avLst/>
+          </a:prstGeom>
+          <a:noFill/>
+          <a:ln w="19050">
+            <a:solidFill>
+              <a:schemeClr val="tx1"/>
+            </a:solidFill>
+          </a:ln>
+        </p:spPr>
+        <p:style>
+          <a:lnRef idx="2">
+            <a:schemeClr val="accent1">
+              <a:shade val="50000"/>
+            </a:schemeClr>
+          </a:lnRef>
+          <a:fillRef idx="1">
+            <a:schemeClr val="accent1"/>
+          </a:fillRef>
+          <a:effectRef idx="0">
+            <a:schemeClr val="accent1"/>
+          </a:effectRef>
+          <a:fontRef idx="minor">
+            <a:schemeClr val="lt1"/>
+          </a:fontRef>
+        </p:style>
+        <p:txBody>
+          <a:bodyPr rtlCol="0" anchor="ctr"/>
+          <a:lstStyle/>
+          <a:p>
+            <a:pPr algn="ctr"/>
+            <a:endParaRPr lang="uk-UA"/>
+          </a:p>
+        </p:txBody>
+      </p:sp>
+      <p:sp>
+        <p:nvSpPr>
+          <p:cNvPr id="13" name="Rectangle 12">
+            <a:extLst>
+              <a:ext uri="{FF2B5EF4-FFF2-40B4-BE49-F238E27FC236}">
+                <a16:creationId xmlns:a16="http://schemas.microsoft.com/office/drawing/2014/main" id="{515773F4-D1EC-694F-9AA7-10CBE808DF15}"/>
+              </a:ext>
+            </a:extLst>
+          </p:cNvPr>
+          <p:cNvSpPr/>
+          <p:nvPr/>
+        </p:nvSpPr>
+        <p:spPr>
+          <a:xfrm>
+            <a:off x="3703252" y="4140203"/>
+            <a:ext cx="583200" cy="529200"/>
+          </a:xfrm>
+          <a:prstGeom prst="rect">
+            <a:avLst/>
+          </a:prstGeom>
+          <a:noFill/>
+          <a:ln w="19050">
+            <a:solidFill>
+              <a:schemeClr val="tx1"/>
+            </a:solidFill>
+          </a:ln>
+        </p:spPr>
+        <p:style>
+          <a:lnRef idx="2">
+            <a:schemeClr val="accent1">
+              <a:shade val="50000"/>
+            </a:schemeClr>
+          </a:lnRef>
+          <a:fillRef idx="1">
+            <a:schemeClr val="accent1"/>
+          </a:fillRef>
+          <a:effectRef idx="0">
+            <a:schemeClr val="accent1"/>
+          </a:effectRef>
+          <a:fontRef idx="minor">
+            <a:schemeClr val="lt1"/>
+          </a:fontRef>
+        </p:style>
+        <p:txBody>
+          <a:bodyPr rtlCol="0" anchor="ctr"/>
+          <a:lstStyle/>
+          <a:p>
+            <a:pPr algn="ctr"/>
+            <a:endParaRPr lang="uk-UA"/>
+          </a:p>
+        </p:txBody>
+      </p:sp>
+      <p:sp>
+        <p:nvSpPr>
+          <p:cNvPr id="14" name="Rectangle 13">
+            <a:extLst>
+              <a:ext uri="{FF2B5EF4-FFF2-40B4-BE49-F238E27FC236}">
+                <a16:creationId xmlns:a16="http://schemas.microsoft.com/office/drawing/2014/main" id="{7AC2D87A-B9AB-D841-B617-C267F1A9F059}"/>
+              </a:ext>
+            </a:extLst>
+          </p:cNvPr>
+          <p:cNvSpPr/>
+          <p:nvPr/>
+        </p:nvSpPr>
+        <p:spPr>
+          <a:xfrm>
+            <a:off x="4288224" y="4464353"/>
+            <a:ext cx="583200" cy="205200"/>
+          </a:xfrm>
+          <a:prstGeom prst="rect">
+            <a:avLst/>
+          </a:prstGeom>
+          <a:noFill/>
+          <a:ln w="19050">
+            <a:solidFill>
+              <a:schemeClr val="tx1"/>
+            </a:solidFill>
+          </a:ln>
+        </p:spPr>
+        <p:style>
+          <a:lnRef idx="2">
+            <a:schemeClr val="accent1">
+              <a:shade val="50000"/>
+            </a:schemeClr>
+          </a:lnRef>
+          <a:fillRef idx="1">
+            <a:schemeClr val="accent1"/>
+          </a:fillRef>
+          <a:effectRef idx="0">
+            <a:schemeClr val="accent1"/>
+          </a:effectRef>
+          <a:fontRef idx="minor">
+            <a:schemeClr val="lt1"/>
+          </a:fontRef>
+        </p:style>
+        <p:txBody>
+          <a:bodyPr rtlCol="0" anchor="ctr"/>
+          <a:lstStyle/>
+          <a:p>
+            <a:pPr algn="ctr"/>
+            <a:endParaRPr lang="uk-UA"/>
+          </a:p>
+        </p:txBody>
+      </p:sp>
+      <p:sp>
+        <p:nvSpPr>
+          <p:cNvPr id="15" name="Rectangle 14">
+            <a:extLst>
+              <a:ext uri="{FF2B5EF4-FFF2-40B4-BE49-F238E27FC236}">
+                <a16:creationId xmlns:a16="http://schemas.microsoft.com/office/drawing/2014/main" id="{D71741ED-57D6-F241-91EA-E472E6E24B9A}"/>
+              </a:ext>
+            </a:extLst>
+          </p:cNvPr>
+          <p:cNvSpPr/>
+          <p:nvPr/>
+        </p:nvSpPr>
+        <p:spPr>
+          <a:xfrm>
+            <a:off x="4867880" y="4342108"/>
+            <a:ext cx="583200" cy="327600"/>
+          </a:xfrm>
+          <a:prstGeom prst="rect">
+            <a:avLst/>
+          </a:prstGeom>
+          <a:noFill/>
+          <a:ln w="19050">
+            <a:solidFill>
+              <a:schemeClr val="tx1"/>
+            </a:solidFill>
+          </a:ln>
+        </p:spPr>
+        <p:style>
+          <a:lnRef idx="2">
+            <a:schemeClr val="accent1">
+              <a:shade val="50000"/>
+            </a:schemeClr>
+          </a:lnRef>
+          <a:fillRef idx="1">
+            <a:schemeClr val="accent1"/>
+          </a:fillRef>
+          <a:effectRef idx="0">
+            <a:schemeClr val="accent1"/>
+          </a:effectRef>
+          <a:fontRef idx="minor">
+            <a:schemeClr val="lt1"/>
+          </a:fontRef>
+        </p:style>
+        <p:txBody>
+          <a:bodyPr rtlCol="0" anchor="ctr"/>
+          <a:lstStyle/>
+          <a:p>
+            <a:pPr algn="ctr"/>
+            <a:endParaRPr lang="uk-UA"/>
+          </a:p>
+        </p:txBody>
+      </p:sp>
+      <p:sp>
+        <p:nvSpPr>
+          <p:cNvPr id="16" name="Rectangle 15">
+            <a:extLst>
+              <a:ext uri="{FF2B5EF4-FFF2-40B4-BE49-F238E27FC236}">
+                <a16:creationId xmlns:a16="http://schemas.microsoft.com/office/drawing/2014/main" id="{A9A34C85-D6BB-B843-9B32-72BCBCAA306D}"/>
+              </a:ext>
+            </a:extLst>
+          </p:cNvPr>
+          <p:cNvSpPr/>
+          <p:nvPr/>
+        </p:nvSpPr>
+        <p:spPr>
+          <a:xfrm>
+            <a:off x="5451080" y="4599404"/>
+            <a:ext cx="583200" cy="68400"/>
+          </a:xfrm>
+          <a:prstGeom prst="rect">
+            <a:avLst/>
+          </a:prstGeom>
+          <a:noFill/>
+          <a:ln w="19050">
+            <a:solidFill>
+              <a:schemeClr val="tx1"/>
+            </a:solidFill>
+          </a:ln>
+        </p:spPr>
+        <p:style>
+          <a:lnRef idx="2">
+            <a:schemeClr val="accent1">
+              <a:shade val="50000"/>
+            </a:schemeClr>
+          </a:lnRef>
+          <a:fillRef idx="1">
+            <a:schemeClr val="accent1"/>
+          </a:fillRef>
+          <a:effectRef idx="0">
+            <a:schemeClr val="accent1"/>
+          </a:effectRef>
+          <a:fontRef idx="minor">
+            <a:schemeClr val="lt1"/>
+          </a:fontRef>
+        </p:style>
+        <p:txBody>
+          <a:bodyPr rtlCol="0" anchor="ctr"/>
+          <a:lstStyle/>
+          <a:p>
+            <a:pPr algn="ctr"/>
+            <a:endParaRPr lang="uk-UA"/>
+          </a:p>
+        </p:txBody>
+      </p:sp>
+      <p:sp>
+        <p:nvSpPr>
+          <p:cNvPr id="17" name="Rectangle 16">
+            <a:extLst>
+              <a:ext uri="{FF2B5EF4-FFF2-40B4-BE49-F238E27FC236}">
+                <a16:creationId xmlns:a16="http://schemas.microsoft.com/office/drawing/2014/main" id="{9ECBA5F0-16FC-B947-9449-8F55C20371DA}"/>
+              </a:ext>
+            </a:extLst>
+          </p:cNvPr>
+          <p:cNvSpPr/>
+          <p:nvPr/>
+        </p:nvSpPr>
+        <p:spPr>
+          <a:xfrm>
+            <a:off x="6040740" y="4458857"/>
+            <a:ext cx="583200" cy="205200"/>
+          </a:xfrm>
+          <a:prstGeom prst="rect">
+            <a:avLst/>
+          </a:prstGeom>
+          <a:noFill/>
+          <a:ln w="19050">
+            <a:solidFill>
+              <a:schemeClr val="tx1"/>
+            </a:solidFill>
+          </a:ln>
+        </p:spPr>
+        <p:style>
+          <a:lnRef idx="2">
+            <a:schemeClr val="accent1">
+              <a:shade val="50000"/>
+            </a:schemeClr>
+          </a:lnRef>
+          <a:fillRef idx="1">
+            <a:schemeClr val="accent1"/>
+          </a:fillRef>
+          <a:effectRef idx="0">
+            <a:schemeClr val="accent1"/>
+          </a:effectRef>
+          <a:fontRef idx="minor">
+            <a:schemeClr val="lt1"/>
+          </a:fontRef>
+        </p:style>
+        <p:txBody>
+          <a:bodyPr rtlCol="0" anchor="ctr"/>
+          <a:lstStyle/>
+          <a:p>
+            <a:pPr algn="ctr"/>
+            <a:endParaRPr lang="uk-UA"/>
+          </a:p>
+        </p:txBody>
+      </p:sp>
+      <mc:AlternateContent xmlns:mc="http://schemas.openxmlformats.org/markup-compatibility/2006">
+        <mc:Choice xmlns:a14="http://schemas.microsoft.com/office/drawing/2010/main" Requires="a14">
+          <p:sp>
+            <p:nvSpPr>
+              <p:cNvPr id="18" name="TextBox 17">
+                <a:extLst>
+                  <a:ext uri="{FF2B5EF4-FFF2-40B4-BE49-F238E27FC236}">
+                    <a16:creationId xmlns:a16="http://schemas.microsoft.com/office/drawing/2014/main" id="{2CE8BEEF-88CA-9247-9B82-5CA29E24798E}"/>
+                  </a:ext>
+                </a:extLst>
+              </p:cNvPr>
+              <p:cNvSpPr txBox="1"/>
+              <p:nvPr/>
+            </p:nvSpPr>
+            <p:spPr>
+              <a:xfrm>
+                <a:off x="3525972" y="4671302"/>
+                <a:ext cx="375103" cy="215444"/>
+              </a:xfrm>
+              <a:prstGeom prst="rect">
+                <a:avLst/>
+              </a:prstGeom>
+              <a:noFill/>
+            </p:spPr>
+            <p:txBody>
+              <a:bodyPr wrap="none" lIns="0" tIns="0" rIns="0" bIns="0" rtlCol="0">
+                <a:spAutoFit/>
+              </a:bodyPr>
+              <a:lstStyle/>
+              <a:p>
+                <a:pPr/>
+                <a14:m>
+                  <m:oMathPara xmlns:m="http://schemas.openxmlformats.org/officeDocument/2006/math">
+                    <m:oMathParaPr>
+                      <m:jc m:val="centerGroup"/>
+                    </m:oMathParaPr>
+                    <m:oMath xmlns:m="http://schemas.openxmlformats.org/officeDocument/2006/math">
+                      <m:r>
+                        <a:rPr lang="en-US" sz="1400" b="0" i="1" smtClean="0">
+                          <a:latin typeface="Cambria Math" panose="02040503050406030204" pitchFamily="18" charset="0"/>
+                        </a:rPr>
+                        <m:t>7,43</m:t>
+                      </m:r>
+                    </m:oMath>
+                  </m:oMathPara>
+                </a14:m>
+                <a:endParaRPr lang="uk-UA" dirty="0"/>
+              </a:p>
+            </p:txBody>
+          </p:sp>
+        </mc:Choice>
+        <mc:Fallback>
+          <p:sp>
+            <p:nvSpPr>
+              <p:cNvPr id="18" name="TextBox 17">
+                <a:extLst>
+                  <a:ext uri="{FF2B5EF4-FFF2-40B4-BE49-F238E27FC236}">
+                    <a16:creationId xmlns:a16="http://schemas.microsoft.com/office/drawing/2014/main" id="{2CE8BEEF-88CA-9247-9B82-5CA29E24798E}"/>
+                  </a:ext>
+                </a:extLst>
+              </p:cNvPr>
+              <p:cNvSpPr txBox="1">
+                <a:spLocks noRot="1" noChangeAspect="1" noMove="1" noResize="1" noEditPoints="1" noAdjustHandles="1" noChangeArrowheads="1" noChangeShapeType="1" noTextEdit="1"/>
+              </p:cNvSpPr>
+              <p:nvPr/>
+            </p:nvSpPr>
+            <p:spPr>
+              <a:xfrm>
+                <a:off x="3525972" y="4671302"/>
+                <a:ext cx="375103" cy="215444"/>
+              </a:xfrm>
+              <a:prstGeom prst="rect">
+                <a:avLst/>
+              </a:prstGeom>
+              <a:blipFill>
+                <a:blip r:embed="rId5"/>
+                <a:stretch>
+                  <a:fillRect l="-9677" r="-9677" b="-5556"/>
+                </a:stretch>
+              </a:blipFill>
+            </p:spPr>
+            <p:txBody>
+              <a:bodyPr/>
+              <a:lstStyle/>
+              <a:p>
+                <a:r>
+                  <a:rPr lang="uk-UA">
+                    <a:noFill/>
+                  </a:rPr>
+                  <a:t> </a:t>
+                </a:r>
+              </a:p>
+            </p:txBody>
+          </p:sp>
+        </mc:Fallback>
+      </mc:AlternateContent>
+      <mc:AlternateContent xmlns:mc="http://schemas.openxmlformats.org/markup-compatibility/2006">
+        <mc:Choice xmlns:a14="http://schemas.microsoft.com/office/drawing/2010/main" Requires="a14">
+          <p:sp>
+            <p:nvSpPr>
+              <p:cNvPr id="19" name="TextBox 18">
+                <a:extLst>
+                  <a:ext uri="{FF2B5EF4-FFF2-40B4-BE49-F238E27FC236}">
+                    <a16:creationId xmlns:a16="http://schemas.microsoft.com/office/drawing/2014/main" id="{D5619E6A-A59D-AD4A-AE03-B958FF65EB3E}"/>
+                  </a:ext>
+                </a:extLst>
+              </p:cNvPr>
+              <p:cNvSpPr txBox="1"/>
+              <p:nvPr/>
+            </p:nvSpPr>
+            <p:spPr>
+              <a:xfrm>
+                <a:off x="4098899" y="4668304"/>
+                <a:ext cx="375103" cy="215444"/>
+              </a:xfrm>
+              <a:prstGeom prst="rect">
+                <a:avLst/>
+              </a:prstGeom>
+              <a:noFill/>
+            </p:spPr>
+            <p:txBody>
+              <a:bodyPr wrap="none" lIns="0" tIns="0" rIns="0" bIns="0" rtlCol="0">
+                <a:spAutoFit/>
+              </a:bodyPr>
+              <a:lstStyle/>
+              <a:p>
+                <a:pPr/>
+                <a14:m>
+                  <m:oMathPara xmlns:m="http://schemas.openxmlformats.org/officeDocument/2006/math">
+                    <m:oMathParaPr>
+                      <m:jc m:val="centerGroup"/>
+                    </m:oMathParaPr>
+                    <m:oMath xmlns:m="http://schemas.openxmlformats.org/officeDocument/2006/math">
+                      <m:r>
+                        <a:rPr lang="en-US" sz="1400" i="1" smtClean="0">
+                          <a:latin typeface="Cambria Math" panose="02040503050406030204" pitchFamily="18" charset="0"/>
+                        </a:rPr>
+                        <m:t>9</m:t>
+                      </m:r>
+                      <m:r>
+                        <a:rPr lang="en-US" sz="1400" b="0" i="1" smtClean="0">
+                          <a:latin typeface="Cambria Math" panose="02040503050406030204" pitchFamily="18" charset="0"/>
+                        </a:rPr>
+                        <m:t>,05</m:t>
+                      </m:r>
+                    </m:oMath>
+                  </m:oMathPara>
+                </a14:m>
+                <a:endParaRPr lang="uk-UA" dirty="0"/>
+              </a:p>
+            </p:txBody>
+          </p:sp>
+        </mc:Choice>
+        <mc:Fallback>
+          <p:sp>
+            <p:nvSpPr>
+              <p:cNvPr id="19" name="TextBox 18">
+                <a:extLst>
+                  <a:ext uri="{FF2B5EF4-FFF2-40B4-BE49-F238E27FC236}">
+                    <a16:creationId xmlns:a16="http://schemas.microsoft.com/office/drawing/2014/main" id="{D5619E6A-A59D-AD4A-AE03-B958FF65EB3E}"/>
+                  </a:ext>
+                </a:extLst>
+              </p:cNvPr>
+              <p:cNvSpPr txBox="1">
+                <a:spLocks noRot="1" noChangeAspect="1" noMove="1" noResize="1" noEditPoints="1" noAdjustHandles="1" noChangeArrowheads="1" noChangeShapeType="1" noTextEdit="1"/>
+              </p:cNvSpPr>
+              <p:nvPr/>
+            </p:nvSpPr>
+            <p:spPr>
+              <a:xfrm>
+                <a:off x="4098899" y="4668304"/>
+                <a:ext cx="375103" cy="215444"/>
+              </a:xfrm>
+              <a:prstGeom prst="rect">
+                <a:avLst/>
+              </a:prstGeom>
+              <a:blipFill>
+                <a:blip r:embed="rId6"/>
+                <a:stretch>
+                  <a:fillRect l="-9677" r="-9677" b="-5556"/>
+                </a:stretch>
+              </a:blipFill>
+            </p:spPr>
+            <p:txBody>
+              <a:bodyPr/>
+              <a:lstStyle/>
+              <a:p>
+                <a:r>
+                  <a:rPr lang="uk-UA">
+                    <a:noFill/>
+                  </a:rPr>
+                  <a:t> </a:t>
+                </a:r>
+              </a:p>
+            </p:txBody>
+          </p:sp>
+        </mc:Fallback>
+      </mc:AlternateContent>
+      <mc:AlternateContent xmlns:mc="http://schemas.openxmlformats.org/markup-compatibility/2006">
+        <mc:Choice xmlns:a14="http://schemas.microsoft.com/office/drawing/2010/main" Requires="a14">
+          <p:sp>
+            <p:nvSpPr>
+              <p:cNvPr id="20" name="TextBox 19">
+                <a:extLst>
+                  <a:ext uri="{FF2B5EF4-FFF2-40B4-BE49-F238E27FC236}">
+                    <a16:creationId xmlns:a16="http://schemas.microsoft.com/office/drawing/2014/main" id="{B5A95627-78EA-B14A-BFC9-842A70456138}"/>
+                  </a:ext>
+                </a:extLst>
+              </p:cNvPr>
+              <p:cNvSpPr txBox="1"/>
+              <p:nvPr/>
+            </p:nvSpPr>
+            <p:spPr>
+              <a:xfrm>
+                <a:off x="4632404" y="4673656"/>
+                <a:ext cx="474489" cy="215444"/>
+              </a:xfrm>
+              <a:prstGeom prst="rect">
+                <a:avLst/>
+              </a:prstGeom>
+              <a:noFill/>
+            </p:spPr>
+            <p:txBody>
+              <a:bodyPr wrap="none" lIns="0" tIns="0" rIns="0" bIns="0" rtlCol="0">
+                <a:spAutoFit/>
+              </a:bodyPr>
+              <a:lstStyle/>
+              <a:p>
+                <a:pPr/>
+                <a14:m>
+                  <m:oMathPara xmlns:m="http://schemas.openxmlformats.org/officeDocument/2006/math">
+                    <m:oMathParaPr>
+                      <m:jc m:val="centerGroup"/>
+                    </m:oMathParaPr>
+                    <m:oMath xmlns:m="http://schemas.openxmlformats.org/officeDocument/2006/math">
+                      <m:r>
+                        <a:rPr lang="en-US" sz="1400" i="1" smtClean="0">
+                          <a:latin typeface="Cambria Math" panose="02040503050406030204" pitchFamily="18" charset="0"/>
+                        </a:rPr>
+                        <m:t>1</m:t>
+                      </m:r>
+                      <m:r>
+                        <a:rPr lang="en-US" sz="1400" b="0" i="1" smtClean="0">
+                          <a:latin typeface="Cambria Math" panose="02040503050406030204" pitchFamily="18" charset="0"/>
+                        </a:rPr>
+                        <m:t>0,67</m:t>
+                      </m:r>
+                    </m:oMath>
+                  </m:oMathPara>
+                </a14:m>
+                <a:endParaRPr lang="uk-UA" dirty="0"/>
+              </a:p>
+            </p:txBody>
+          </p:sp>
+        </mc:Choice>
+        <mc:Fallback>
+          <p:sp>
+            <p:nvSpPr>
+              <p:cNvPr id="20" name="TextBox 19">
+                <a:extLst>
+                  <a:ext uri="{FF2B5EF4-FFF2-40B4-BE49-F238E27FC236}">
+                    <a16:creationId xmlns:a16="http://schemas.microsoft.com/office/drawing/2014/main" id="{B5A95627-78EA-B14A-BFC9-842A70456138}"/>
+                  </a:ext>
+                </a:extLst>
+              </p:cNvPr>
+              <p:cNvSpPr txBox="1">
+                <a:spLocks noRot="1" noChangeAspect="1" noMove="1" noResize="1" noEditPoints="1" noAdjustHandles="1" noChangeArrowheads="1" noChangeShapeType="1" noTextEdit="1"/>
+              </p:cNvSpPr>
+              <p:nvPr/>
+            </p:nvSpPr>
+            <p:spPr>
+              <a:xfrm>
+                <a:off x="4632404" y="4673656"/>
+                <a:ext cx="474489" cy="215444"/>
+              </a:xfrm>
+              <a:prstGeom prst="rect">
+                <a:avLst/>
+              </a:prstGeom>
+              <a:blipFill>
+                <a:blip r:embed="rId7"/>
+                <a:stretch>
+                  <a:fillRect l="-7692" r="-7692" b="-5882"/>
+                </a:stretch>
+              </a:blipFill>
+            </p:spPr>
+            <p:txBody>
+              <a:bodyPr/>
+              <a:lstStyle/>
+              <a:p>
+                <a:r>
+                  <a:rPr lang="uk-UA">
+                    <a:noFill/>
+                  </a:rPr>
+                  <a:t> </a:t>
+                </a:r>
+              </a:p>
+            </p:txBody>
+          </p:sp>
+        </mc:Fallback>
+      </mc:AlternateContent>
+      <mc:AlternateContent xmlns:mc="http://schemas.openxmlformats.org/markup-compatibility/2006">
+        <mc:Choice xmlns:a14="http://schemas.microsoft.com/office/drawing/2010/main" Requires="a14">
+          <p:sp>
+            <p:nvSpPr>
+              <p:cNvPr id="21" name="TextBox 20">
+                <a:extLst>
+                  <a:ext uri="{FF2B5EF4-FFF2-40B4-BE49-F238E27FC236}">
+                    <a16:creationId xmlns:a16="http://schemas.microsoft.com/office/drawing/2014/main" id="{4DC3DF50-85F8-BB40-A72B-09818884B1EC}"/>
+                  </a:ext>
+                </a:extLst>
+              </p:cNvPr>
+              <p:cNvSpPr txBox="1"/>
+              <p:nvPr/>
+            </p:nvSpPr>
+            <p:spPr>
+              <a:xfrm>
+                <a:off x="5225875" y="4667804"/>
+                <a:ext cx="474489" cy="215444"/>
+              </a:xfrm>
+              <a:prstGeom prst="rect">
+                <a:avLst/>
+              </a:prstGeom>
+              <a:noFill/>
+            </p:spPr>
+            <p:txBody>
+              <a:bodyPr wrap="none" lIns="0" tIns="0" rIns="0" bIns="0" rtlCol="0">
+                <a:spAutoFit/>
+              </a:bodyPr>
+              <a:lstStyle/>
+              <a:p>
+                <a:pPr/>
+                <a14:m>
+                  <m:oMathPara xmlns:m="http://schemas.openxmlformats.org/officeDocument/2006/math">
+                    <m:oMathParaPr>
+                      <m:jc m:val="centerGroup"/>
+                    </m:oMathParaPr>
+                    <m:oMath xmlns:m="http://schemas.openxmlformats.org/officeDocument/2006/math">
+                      <m:r>
+                        <a:rPr lang="en-US" sz="1400" i="1" smtClean="0">
+                          <a:latin typeface="Cambria Math" panose="02040503050406030204" pitchFamily="18" charset="0"/>
+                        </a:rPr>
+                        <m:t>1</m:t>
+                      </m:r>
+                      <m:r>
+                        <a:rPr lang="en-US" sz="1400" b="0" i="1" smtClean="0">
+                          <a:latin typeface="Cambria Math" panose="02040503050406030204" pitchFamily="18" charset="0"/>
+                        </a:rPr>
+                        <m:t>2,29</m:t>
+                      </m:r>
+                    </m:oMath>
+                  </m:oMathPara>
+                </a14:m>
+                <a:endParaRPr lang="uk-UA" dirty="0"/>
+              </a:p>
+            </p:txBody>
+          </p:sp>
+        </mc:Choice>
+        <mc:Fallback>
+          <p:sp>
+            <p:nvSpPr>
+              <p:cNvPr id="21" name="TextBox 20">
+                <a:extLst>
+                  <a:ext uri="{FF2B5EF4-FFF2-40B4-BE49-F238E27FC236}">
+                    <a16:creationId xmlns:a16="http://schemas.microsoft.com/office/drawing/2014/main" id="{4DC3DF50-85F8-BB40-A72B-09818884B1EC}"/>
+                  </a:ext>
+                </a:extLst>
+              </p:cNvPr>
+              <p:cNvSpPr txBox="1">
+                <a:spLocks noRot="1" noChangeAspect="1" noMove="1" noResize="1" noEditPoints="1" noAdjustHandles="1" noChangeArrowheads="1" noChangeShapeType="1" noTextEdit="1"/>
+              </p:cNvSpPr>
+              <p:nvPr/>
+            </p:nvSpPr>
+            <p:spPr>
+              <a:xfrm>
+                <a:off x="5225875" y="4667804"/>
+                <a:ext cx="474489" cy="215444"/>
+              </a:xfrm>
+              <a:prstGeom prst="rect">
+                <a:avLst/>
+              </a:prstGeom>
+              <a:blipFill>
+                <a:blip r:embed="rId8"/>
+                <a:stretch>
+                  <a:fillRect l="-7895" r="-7895" b="-5556"/>
+                </a:stretch>
+              </a:blipFill>
+            </p:spPr>
+            <p:txBody>
+              <a:bodyPr/>
+              <a:lstStyle/>
+              <a:p>
+                <a:r>
+                  <a:rPr lang="uk-UA">
+                    <a:noFill/>
+                  </a:rPr>
+                  <a:t> </a:t>
+                </a:r>
+              </a:p>
+            </p:txBody>
+          </p:sp>
+        </mc:Fallback>
+      </mc:AlternateContent>
+      <mc:AlternateContent xmlns:mc="http://schemas.openxmlformats.org/markup-compatibility/2006">
+        <mc:Choice xmlns:a14="http://schemas.microsoft.com/office/drawing/2010/main" Requires="a14">
+          <p:sp>
+            <p:nvSpPr>
+              <p:cNvPr id="22" name="TextBox 21">
+                <a:extLst>
+                  <a:ext uri="{FF2B5EF4-FFF2-40B4-BE49-F238E27FC236}">
+                    <a16:creationId xmlns:a16="http://schemas.microsoft.com/office/drawing/2014/main" id="{5F82B726-080F-B245-B874-72D3D797B046}"/>
+                  </a:ext>
+                </a:extLst>
+              </p:cNvPr>
+              <p:cNvSpPr txBox="1"/>
+              <p:nvPr/>
+            </p:nvSpPr>
+            <p:spPr>
+              <a:xfrm>
+                <a:off x="5798807" y="4667804"/>
+                <a:ext cx="474489" cy="215444"/>
+              </a:xfrm>
+              <a:prstGeom prst="rect">
+                <a:avLst/>
+              </a:prstGeom>
+              <a:noFill/>
+            </p:spPr>
+            <p:txBody>
+              <a:bodyPr wrap="none" lIns="0" tIns="0" rIns="0" bIns="0" rtlCol="0">
+                <a:spAutoFit/>
+              </a:bodyPr>
+              <a:lstStyle/>
+              <a:p>
+                <a:pPr/>
+                <a14:m>
+                  <m:oMathPara xmlns:m="http://schemas.openxmlformats.org/officeDocument/2006/math">
+                    <m:oMathParaPr>
+                      <m:jc m:val="centerGroup"/>
+                    </m:oMathParaPr>
+                    <m:oMath xmlns:m="http://schemas.openxmlformats.org/officeDocument/2006/math">
+                      <m:r>
+                        <a:rPr lang="en-US" sz="1400" i="1" smtClean="0">
+                          <a:latin typeface="Cambria Math" panose="02040503050406030204" pitchFamily="18" charset="0"/>
+                        </a:rPr>
+                        <m:t>1</m:t>
+                      </m:r>
+                      <m:r>
+                        <a:rPr lang="en-US" sz="1400" b="0" i="1" smtClean="0">
+                          <a:latin typeface="Cambria Math" panose="02040503050406030204" pitchFamily="18" charset="0"/>
+                        </a:rPr>
+                        <m:t>3,91</m:t>
+                      </m:r>
+                    </m:oMath>
+                  </m:oMathPara>
+                </a14:m>
+                <a:endParaRPr lang="uk-UA" dirty="0"/>
+              </a:p>
+            </p:txBody>
+          </p:sp>
+        </mc:Choice>
+        <mc:Fallback>
+          <p:sp>
+            <p:nvSpPr>
+              <p:cNvPr id="22" name="TextBox 21">
+                <a:extLst>
+                  <a:ext uri="{FF2B5EF4-FFF2-40B4-BE49-F238E27FC236}">
+                    <a16:creationId xmlns:a16="http://schemas.microsoft.com/office/drawing/2014/main" id="{5F82B726-080F-B245-B874-72D3D797B046}"/>
+                  </a:ext>
+                </a:extLst>
+              </p:cNvPr>
+              <p:cNvSpPr txBox="1">
+                <a:spLocks noRot="1" noChangeAspect="1" noMove="1" noResize="1" noEditPoints="1" noAdjustHandles="1" noChangeArrowheads="1" noChangeShapeType="1" noTextEdit="1"/>
+              </p:cNvSpPr>
+              <p:nvPr/>
+            </p:nvSpPr>
+            <p:spPr>
+              <a:xfrm>
+                <a:off x="5798807" y="4667804"/>
+                <a:ext cx="474489" cy="215444"/>
+              </a:xfrm>
+              <a:prstGeom prst="rect">
+                <a:avLst/>
+              </a:prstGeom>
+              <a:blipFill>
+                <a:blip r:embed="rId9"/>
+                <a:stretch>
+                  <a:fillRect l="-7895" r="-7895" b="-5556"/>
+                </a:stretch>
+              </a:blipFill>
+            </p:spPr>
+            <p:txBody>
+              <a:bodyPr/>
+              <a:lstStyle/>
+              <a:p>
+                <a:r>
+                  <a:rPr lang="uk-UA">
+                    <a:noFill/>
+                  </a:rPr>
+                  <a:t> </a:t>
+                </a:r>
+              </a:p>
+            </p:txBody>
+          </p:sp>
+        </mc:Fallback>
+      </mc:AlternateContent>
+      <mc:AlternateContent xmlns:mc="http://schemas.openxmlformats.org/markup-compatibility/2006">
+        <mc:Choice xmlns:a14="http://schemas.microsoft.com/office/drawing/2010/main" Requires="a14">
+          <p:sp>
+            <p:nvSpPr>
+              <p:cNvPr id="23" name="TextBox 22">
+                <a:extLst>
+                  <a:ext uri="{FF2B5EF4-FFF2-40B4-BE49-F238E27FC236}">
+                    <a16:creationId xmlns:a16="http://schemas.microsoft.com/office/drawing/2014/main" id="{97967C24-5E47-2740-B4CE-E11101881BFD}"/>
+                  </a:ext>
+                </a:extLst>
+              </p:cNvPr>
+              <p:cNvSpPr txBox="1"/>
+              <p:nvPr/>
+            </p:nvSpPr>
+            <p:spPr>
+              <a:xfrm>
+                <a:off x="6382002" y="4673656"/>
+                <a:ext cx="474489" cy="215444"/>
+              </a:xfrm>
+              <a:prstGeom prst="rect">
+                <a:avLst/>
+              </a:prstGeom>
+              <a:noFill/>
+            </p:spPr>
+            <p:txBody>
+              <a:bodyPr wrap="none" lIns="0" tIns="0" rIns="0" bIns="0" rtlCol="0">
+                <a:spAutoFit/>
+              </a:bodyPr>
+              <a:lstStyle/>
+              <a:p>
+                <a:pPr/>
+                <a14:m>
+                  <m:oMathPara xmlns:m="http://schemas.openxmlformats.org/officeDocument/2006/math">
+                    <m:oMathParaPr>
+                      <m:jc m:val="centerGroup"/>
+                    </m:oMathParaPr>
+                    <m:oMath xmlns:m="http://schemas.openxmlformats.org/officeDocument/2006/math">
+                      <m:r>
+                        <a:rPr lang="en-US" sz="1400" i="1" smtClean="0">
+                          <a:latin typeface="Cambria Math" panose="02040503050406030204" pitchFamily="18" charset="0"/>
+                        </a:rPr>
+                        <m:t>1</m:t>
+                      </m:r>
+                      <m:r>
+                        <a:rPr lang="en-US" sz="1400" b="0" i="1" smtClean="0">
+                          <a:latin typeface="Cambria Math" panose="02040503050406030204" pitchFamily="18" charset="0"/>
+                        </a:rPr>
+                        <m:t>5,53</m:t>
+                      </m:r>
+                    </m:oMath>
+                  </m:oMathPara>
+                </a14:m>
+                <a:endParaRPr lang="uk-UA" dirty="0"/>
+              </a:p>
+            </p:txBody>
+          </p:sp>
+        </mc:Choice>
+        <mc:Fallback>
+          <p:sp>
+            <p:nvSpPr>
+              <p:cNvPr id="23" name="TextBox 22">
+                <a:extLst>
+                  <a:ext uri="{FF2B5EF4-FFF2-40B4-BE49-F238E27FC236}">
+                    <a16:creationId xmlns:a16="http://schemas.microsoft.com/office/drawing/2014/main" id="{97967C24-5E47-2740-B4CE-E11101881BFD}"/>
+                  </a:ext>
+                </a:extLst>
+              </p:cNvPr>
+              <p:cNvSpPr txBox="1">
+                <a:spLocks noRot="1" noChangeAspect="1" noMove="1" noResize="1" noEditPoints="1" noAdjustHandles="1" noChangeArrowheads="1" noChangeShapeType="1" noTextEdit="1"/>
+              </p:cNvSpPr>
+              <p:nvPr/>
+            </p:nvSpPr>
+            <p:spPr>
+              <a:xfrm>
+                <a:off x="6382002" y="4673656"/>
+                <a:ext cx="474489" cy="215444"/>
+              </a:xfrm>
+              <a:prstGeom prst="rect">
+                <a:avLst/>
+              </a:prstGeom>
+              <a:blipFill>
+                <a:blip r:embed="rId10"/>
+                <a:stretch>
+                  <a:fillRect l="-7895" r="-10526" b="-11765"/>
+                </a:stretch>
+              </a:blipFill>
+            </p:spPr>
+            <p:txBody>
+              <a:bodyPr/>
+              <a:lstStyle/>
+              <a:p>
+                <a:r>
+                  <a:rPr lang="uk-UA">
+                    <a:noFill/>
+                  </a:rPr>
+                  <a:t> </a:t>
+                </a:r>
+              </a:p>
+            </p:txBody>
+          </p:sp>
+        </mc:Fallback>
+      </mc:AlternateContent>
+      <mc:AlternateContent xmlns:mc="http://schemas.openxmlformats.org/markup-compatibility/2006">
+        <mc:Choice xmlns:a14="http://schemas.microsoft.com/office/drawing/2010/main" Requires="a14">
+          <p:sp>
+            <p:nvSpPr>
+              <p:cNvPr id="24" name="TextBox 23">
+                <a:extLst>
+                  <a:ext uri="{FF2B5EF4-FFF2-40B4-BE49-F238E27FC236}">
+                    <a16:creationId xmlns:a16="http://schemas.microsoft.com/office/drawing/2014/main" id="{E0D08D43-3D66-4F47-82B9-3EA5C89303E8}"/>
+                  </a:ext>
+                </a:extLst>
+              </p:cNvPr>
+              <p:cNvSpPr txBox="1"/>
+              <p:nvPr/>
+            </p:nvSpPr>
+            <p:spPr>
+              <a:xfrm>
+                <a:off x="670983" y="1925716"/>
+                <a:ext cx="357470" cy="161583"/>
+              </a:xfrm>
+              <a:prstGeom prst="rect">
+                <a:avLst/>
+              </a:prstGeom>
+              <a:noFill/>
+            </p:spPr>
+            <p:txBody>
+              <a:bodyPr wrap="none" lIns="0" tIns="0" rIns="0" bIns="0" rtlCol="0">
+                <a:spAutoFit/>
+              </a:bodyPr>
+              <a:lstStyle/>
+              <a:p>
+                <a:pPr/>
+                <a14:m>
+                  <m:oMathPara xmlns:m="http://schemas.openxmlformats.org/officeDocument/2006/math">
+                    <m:oMathParaPr>
+                      <m:jc m:val="centerGroup"/>
+                    </m:oMathParaPr>
+                    <m:oMath xmlns:m="http://schemas.openxmlformats.org/officeDocument/2006/math">
+                      <m:r>
+                        <a:rPr lang="en-US" sz="1050" i="1" smtClean="0">
+                          <a:latin typeface="Cambria Math" panose="02040503050406030204" pitchFamily="18" charset="0"/>
+                        </a:rPr>
+                        <m:t>0</m:t>
+                      </m:r>
+                      <m:r>
+                        <a:rPr lang="en-US" sz="1050" b="0" i="1" smtClean="0">
+                          <a:latin typeface="Cambria Math" panose="02040503050406030204" pitchFamily="18" charset="0"/>
+                        </a:rPr>
+                        <m:t>,247</m:t>
+                      </m:r>
+                    </m:oMath>
+                  </m:oMathPara>
+                </a14:m>
+                <a:endParaRPr lang="uk-UA" sz="1200" dirty="0"/>
+              </a:p>
+            </p:txBody>
+          </p:sp>
+        </mc:Choice>
+        <mc:Fallback>
+          <p:sp>
+            <p:nvSpPr>
+              <p:cNvPr id="24" name="TextBox 23">
+                <a:extLst>
+                  <a:ext uri="{FF2B5EF4-FFF2-40B4-BE49-F238E27FC236}">
+                    <a16:creationId xmlns:a16="http://schemas.microsoft.com/office/drawing/2014/main" id="{E0D08D43-3D66-4F47-82B9-3EA5C89303E8}"/>
+                  </a:ext>
+                </a:extLst>
+              </p:cNvPr>
+              <p:cNvSpPr txBox="1">
+                <a:spLocks noRot="1" noChangeAspect="1" noMove="1" noResize="1" noEditPoints="1" noAdjustHandles="1" noChangeArrowheads="1" noChangeShapeType="1" noTextEdit="1"/>
+              </p:cNvSpPr>
+              <p:nvPr/>
+            </p:nvSpPr>
+            <p:spPr>
+              <a:xfrm>
+                <a:off x="670983" y="1925716"/>
+                <a:ext cx="357470" cy="161583"/>
+              </a:xfrm>
+              <a:prstGeom prst="rect">
+                <a:avLst/>
+              </a:prstGeom>
+              <a:blipFill>
+                <a:blip r:embed="rId11"/>
+                <a:stretch>
+                  <a:fillRect l="-6667" r="-6667" b="-7143"/>
+                </a:stretch>
+              </a:blipFill>
+            </p:spPr>
+            <p:txBody>
+              <a:bodyPr/>
+              <a:lstStyle/>
+              <a:p>
+                <a:r>
+                  <a:rPr lang="uk-UA">
+                    <a:noFill/>
+                  </a:rPr>
+                  <a:t> </a:t>
+                </a:r>
+              </a:p>
+            </p:txBody>
+          </p:sp>
+        </mc:Fallback>
+      </mc:AlternateContent>
+      <mc:AlternateContent xmlns:mc="http://schemas.openxmlformats.org/markup-compatibility/2006">
+        <mc:Choice xmlns:a14="http://schemas.microsoft.com/office/drawing/2010/main" Requires="a14">
+          <p:sp>
+            <p:nvSpPr>
+              <p:cNvPr id="25" name="TextBox 24">
+                <a:extLst>
+                  <a:ext uri="{FF2B5EF4-FFF2-40B4-BE49-F238E27FC236}">
+                    <a16:creationId xmlns:a16="http://schemas.microsoft.com/office/drawing/2014/main" id="{3043E9F7-DB7B-874A-81F1-CF06C3D88C62}"/>
+                  </a:ext>
+                </a:extLst>
+              </p:cNvPr>
+              <p:cNvSpPr txBox="1"/>
+              <p:nvPr/>
+            </p:nvSpPr>
+            <p:spPr>
+              <a:xfrm>
+                <a:off x="662166" y="2992836"/>
+                <a:ext cx="357470" cy="161583"/>
+              </a:xfrm>
+              <a:prstGeom prst="rect">
+                <a:avLst/>
+              </a:prstGeom>
+              <a:noFill/>
+            </p:spPr>
+            <p:txBody>
+              <a:bodyPr wrap="none" lIns="0" tIns="0" rIns="0" bIns="0" rtlCol="0">
+                <a:spAutoFit/>
+              </a:bodyPr>
+              <a:lstStyle/>
+              <a:p>
+                <a:pPr/>
+                <a14:m>
+                  <m:oMathPara xmlns:m="http://schemas.openxmlformats.org/officeDocument/2006/math">
+                    <m:oMathParaPr>
+                      <m:jc m:val="centerGroup"/>
+                    </m:oMathParaPr>
+                    <m:oMath xmlns:m="http://schemas.openxmlformats.org/officeDocument/2006/math">
+                      <m:r>
+                        <a:rPr lang="en-US" sz="1050" i="1" smtClean="0">
+                          <a:latin typeface="Cambria Math" panose="02040503050406030204" pitchFamily="18" charset="0"/>
+                        </a:rPr>
+                        <m:t>0</m:t>
+                      </m:r>
+                      <m:r>
+                        <a:rPr lang="en-US" sz="1050" b="0" i="1" smtClean="0">
+                          <a:latin typeface="Cambria Math" panose="02040503050406030204" pitchFamily="18" charset="0"/>
+                        </a:rPr>
+                        <m:t>,148</m:t>
+                      </m:r>
+                    </m:oMath>
+                  </m:oMathPara>
+                </a14:m>
+                <a:endParaRPr lang="uk-UA" sz="1200" dirty="0"/>
+              </a:p>
+            </p:txBody>
+          </p:sp>
+        </mc:Choice>
+        <mc:Fallback>
+          <p:sp>
+            <p:nvSpPr>
+              <p:cNvPr id="25" name="TextBox 24">
+                <a:extLst>
+                  <a:ext uri="{FF2B5EF4-FFF2-40B4-BE49-F238E27FC236}">
+                    <a16:creationId xmlns:a16="http://schemas.microsoft.com/office/drawing/2014/main" id="{3043E9F7-DB7B-874A-81F1-CF06C3D88C62}"/>
+                  </a:ext>
+                </a:extLst>
+              </p:cNvPr>
+              <p:cNvSpPr txBox="1">
+                <a:spLocks noRot="1" noChangeAspect="1" noMove="1" noResize="1" noEditPoints="1" noAdjustHandles="1" noChangeArrowheads="1" noChangeShapeType="1" noTextEdit="1"/>
+              </p:cNvSpPr>
+              <p:nvPr/>
+            </p:nvSpPr>
+            <p:spPr>
+              <a:xfrm>
+                <a:off x="662166" y="2992836"/>
+                <a:ext cx="357470" cy="161583"/>
+              </a:xfrm>
+              <a:prstGeom prst="rect">
+                <a:avLst/>
+              </a:prstGeom>
+              <a:blipFill>
+                <a:blip r:embed="rId12"/>
+                <a:stretch>
+                  <a:fillRect l="-10345" r="-6897" b="-7143"/>
+                </a:stretch>
+              </a:blipFill>
+            </p:spPr>
+            <p:txBody>
+              <a:bodyPr/>
+              <a:lstStyle/>
+              <a:p>
+                <a:r>
+                  <a:rPr lang="uk-UA">
+                    <a:noFill/>
+                  </a:rPr>
+                  <a:t> </a:t>
+                </a:r>
+              </a:p>
+            </p:txBody>
+          </p:sp>
+        </mc:Fallback>
+      </mc:AlternateContent>
+      <mc:AlternateContent xmlns:mc="http://schemas.openxmlformats.org/markup-compatibility/2006">
+        <mc:Choice xmlns:a14="http://schemas.microsoft.com/office/drawing/2010/main" Requires="a14">
+          <p:sp>
+            <p:nvSpPr>
+              <p:cNvPr id="26" name="TextBox 25">
+                <a:extLst>
+                  <a:ext uri="{FF2B5EF4-FFF2-40B4-BE49-F238E27FC236}">
+                    <a16:creationId xmlns:a16="http://schemas.microsoft.com/office/drawing/2014/main" id="{1F44E8F0-8F32-9845-B584-78C6038B2BFC}"/>
+                  </a:ext>
+                </a:extLst>
+              </p:cNvPr>
+              <p:cNvSpPr txBox="1"/>
+              <p:nvPr/>
+            </p:nvSpPr>
+            <p:spPr>
+              <a:xfrm>
+                <a:off x="662166" y="3519662"/>
+                <a:ext cx="357470" cy="161583"/>
+              </a:xfrm>
+              <a:prstGeom prst="rect">
+                <a:avLst/>
+              </a:prstGeom>
+              <a:noFill/>
+            </p:spPr>
+            <p:txBody>
+              <a:bodyPr wrap="none" lIns="0" tIns="0" rIns="0" bIns="0" rtlCol="0">
+                <a:spAutoFit/>
+              </a:bodyPr>
+              <a:lstStyle/>
+              <a:p>
+                <a:pPr/>
+                <a14:m>
+                  <m:oMathPara xmlns:m="http://schemas.openxmlformats.org/officeDocument/2006/math">
+                    <m:oMathParaPr>
+                      <m:jc m:val="centerGroup"/>
+                    </m:oMathParaPr>
+                    <m:oMath xmlns:m="http://schemas.openxmlformats.org/officeDocument/2006/math">
+                      <m:r>
+                        <a:rPr lang="en-US" sz="1050" i="1" smtClean="0">
+                          <a:latin typeface="Cambria Math" panose="02040503050406030204" pitchFamily="18" charset="0"/>
+                        </a:rPr>
+                        <m:t>0</m:t>
+                      </m:r>
+                      <m:r>
+                        <a:rPr lang="en-US" sz="1050" b="0" i="1" smtClean="0">
+                          <a:latin typeface="Cambria Math" panose="02040503050406030204" pitchFamily="18" charset="0"/>
+                        </a:rPr>
+                        <m:t>,099</m:t>
+                      </m:r>
+                    </m:oMath>
+                  </m:oMathPara>
+                </a14:m>
+                <a:endParaRPr lang="uk-UA" sz="1200" dirty="0"/>
+              </a:p>
+            </p:txBody>
+          </p:sp>
+        </mc:Choice>
+        <mc:Fallback>
+          <p:sp>
+            <p:nvSpPr>
+              <p:cNvPr id="26" name="TextBox 25">
+                <a:extLst>
+                  <a:ext uri="{FF2B5EF4-FFF2-40B4-BE49-F238E27FC236}">
+                    <a16:creationId xmlns:a16="http://schemas.microsoft.com/office/drawing/2014/main" id="{1F44E8F0-8F32-9845-B584-78C6038B2BFC}"/>
+                  </a:ext>
+                </a:extLst>
+              </p:cNvPr>
+              <p:cNvSpPr txBox="1">
+                <a:spLocks noRot="1" noChangeAspect="1" noMove="1" noResize="1" noEditPoints="1" noAdjustHandles="1" noChangeArrowheads="1" noChangeShapeType="1" noTextEdit="1"/>
+              </p:cNvSpPr>
+              <p:nvPr/>
+            </p:nvSpPr>
+            <p:spPr>
+              <a:xfrm>
+                <a:off x="662166" y="3519662"/>
+                <a:ext cx="357470" cy="161583"/>
+              </a:xfrm>
+              <a:prstGeom prst="rect">
+                <a:avLst/>
+              </a:prstGeom>
+              <a:blipFill>
+                <a:blip r:embed="rId13"/>
+                <a:stretch>
+                  <a:fillRect l="-10345" r="-6897" b="-7143"/>
+                </a:stretch>
+              </a:blipFill>
+            </p:spPr>
+            <p:txBody>
+              <a:bodyPr/>
+              <a:lstStyle/>
+              <a:p>
+                <a:r>
+                  <a:rPr lang="uk-UA">
+                    <a:noFill/>
+                  </a:rPr>
+                  <a:t> </a:t>
+                </a:r>
+              </a:p>
+            </p:txBody>
+          </p:sp>
+        </mc:Fallback>
+      </mc:AlternateContent>
+      <mc:AlternateContent xmlns:mc="http://schemas.openxmlformats.org/markup-compatibility/2006">
+        <mc:Choice xmlns:a14="http://schemas.microsoft.com/office/drawing/2010/main" Requires="a14">
+          <p:sp>
+            <p:nvSpPr>
+              <p:cNvPr id="27" name="TextBox 26">
+                <a:extLst>
+                  <a:ext uri="{FF2B5EF4-FFF2-40B4-BE49-F238E27FC236}">
+                    <a16:creationId xmlns:a16="http://schemas.microsoft.com/office/drawing/2014/main" id="{7F49127D-1054-6A4A-A933-BBE8A5263698}"/>
+                  </a:ext>
+                </a:extLst>
+              </p:cNvPr>
+              <p:cNvSpPr txBox="1"/>
+              <p:nvPr/>
+            </p:nvSpPr>
+            <p:spPr>
+              <a:xfrm>
+                <a:off x="670983" y="4055085"/>
+                <a:ext cx="357470" cy="161583"/>
+              </a:xfrm>
+              <a:prstGeom prst="rect">
+                <a:avLst/>
+              </a:prstGeom>
+              <a:noFill/>
+            </p:spPr>
+            <p:txBody>
+              <a:bodyPr wrap="none" lIns="0" tIns="0" rIns="0" bIns="0" rtlCol="0">
+                <a:spAutoFit/>
+              </a:bodyPr>
+              <a:lstStyle/>
+              <a:p>
+                <a:pPr/>
+                <a14:m>
+                  <m:oMathPara xmlns:m="http://schemas.openxmlformats.org/officeDocument/2006/math">
+                    <m:oMathParaPr>
+                      <m:jc m:val="centerGroup"/>
+                    </m:oMathParaPr>
+                    <m:oMath xmlns:m="http://schemas.openxmlformats.org/officeDocument/2006/math">
+                      <m:r>
+                        <a:rPr lang="en-US" sz="1050" i="1" smtClean="0">
+                          <a:latin typeface="Cambria Math" panose="02040503050406030204" pitchFamily="18" charset="0"/>
+                        </a:rPr>
+                        <m:t>0</m:t>
+                      </m:r>
+                      <m:r>
+                        <a:rPr lang="en-US" sz="1050" b="0" i="1" smtClean="0">
+                          <a:latin typeface="Cambria Math" panose="02040503050406030204" pitchFamily="18" charset="0"/>
+                        </a:rPr>
+                        <m:t>,049</m:t>
+                      </m:r>
+                    </m:oMath>
+                  </m:oMathPara>
+                </a14:m>
+                <a:endParaRPr lang="uk-UA" sz="1200" dirty="0"/>
+              </a:p>
+            </p:txBody>
+          </p:sp>
+        </mc:Choice>
+        <mc:Fallback>
+          <p:sp>
+            <p:nvSpPr>
+              <p:cNvPr id="27" name="TextBox 26">
+                <a:extLst>
+                  <a:ext uri="{FF2B5EF4-FFF2-40B4-BE49-F238E27FC236}">
+                    <a16:creationId xmlns:a16="http://schemas.microsoft.com/office/drawing/2014/main" id="{7F49127D-1054-6A4A-A933-BBE8A5263698}"/>
+                  </a:ext>
+                </a:extLst>
+              </p:cNvPr>
+              <p:cNvSpPr txBox="1">
+                <a:spLocks noRot="1" noChangeAspect="1" noMove="1" noResize="1" noEditPoints="1" noAdjustHandles="1" noChangeArrowheads="1" noChangeShapeType="1" noTextEdit="1"/>
+              </p:cNvSpPr>
+              <p:nvPr/>
+            </p:nvSpPr>
+            <p:spPr>
+              <a:xfrm>
+                <a:off x="670983" y="4055085"/>
+                <a:ext cx="357470" cy="161583"/>
+              </a:xfrm>
+              <a:prstGeom prst="rect">
+                <a:avLst/>
+              </a:prstGeom>
+              <a:blipFill>
+                <a:blip r:embed="rId14"/>
+                <a:stretch>
+                  <a:fillRect l="-6667" r="-6667" b="-7143"/>
+                </a:stretch>
+              </a:blipFill>
+            </p:spPr>
+            <p:txBody>
+              <a:bodyPr/>
+              <a:lstStyle/>
+              <a:p>
+                <a:r>
+                  <a:rPr lang="uk-UA">
+                    <a:noFill/>
+                  </a:rPr>
+                  <a:t> </a:t>
+                </a:r>
+              </a:p>
+            </p:txBody>
+          </p:sp>
+        </mc:Fallback>
+      </mc:AlternateContent>
+      <mc:AlternateContent xmlns:mc="http://schemas.openxmlformats.org/markup-compatibility/2006">
+        <mc:Choice xmlns:a14="http://schemas.microsoft.com/office/drawing/2010/main" Requires="a14">
+          <p:sp>
+            <p:nvSpPr>
+              <p:cNvPr id="28" name="TextBox 27">
+                <a:extLst>
+                  <a:ext uri="{FF2B5EF4-FFF2-40B4-BE49-F238E27FC236}">
+                    <a16:creationId xmlns:a16="http://schemas.microsoft.com/office/drawing/2014/main" id="{4D1F34B6-AD8C-E24A-916A-6B4DEAF8CFB9}"/>
+                  </a:ext>
+                </a:extLst>
+              </p:cNvPr>
+              <p:cNvSpPr txBox="1"/>
+              <p:nvPr/>
+            </p:nvSpPr>
+            <p:spPr>
+              <a:xfrm>
+                <a:off x="662166" y="4261316"/>
+                <a:ext cx="357470" cy="161583"/>
+              </a:xfrm>
+              <a:prstGeom prst="rect">
+                <a:avLst/>
+              </a:prstGeom>
+              <a:noFill/>
+            </p:spPr>
+            <p:txBody>
+              <a:bodyPr wrap="none" lIns="0" tIns="0" rIns="0" bIns="0" rtlCol="0">
+                <a:spAutoFit/>
+              </a:bodyPr>
+              <a:lstStyle/>
+              <a:p>
+                <a:pPr/>
+                <a14:m>
+                  <m:oMathPara xmlns:m="http://schemas.openxmlformats.org/officeDocument/2006/math">
+                    <m:oMathParaPr>
+                      <m:jc m:val="centerGroup"/>
+                    </m:oMathParaPr>
+                    <m:oMath xmlns:m="http://schemas.openxmlformats.org/officeDocument/2006/math">
+                      <m:r>
+                        <a:rPr lang="en-US" sz="1050" i="1" smtClean="0">
+                          <a:latin typeface="Cambria Math" panose="02040503050406030204" pitchFamily="18" charset="0"/>
+                        </a:rPr>
+                        <m:t>0</m:t>
+                      </m:r>
+                      <m:r>
+                        <a:rPr lang="en-US" sz="1050" b="0" i="1" smtClean="0">
+                          <a:latin typeface="Cambria Math" panose="02040503050406030204" pitchFamily="18" charset="0"/>
+                        </a:rPr>
+                        <m:t>,031</m:t>
+                      </m:r>
+                    </m:oMath>
+                  </m:oMathPara>
+                </a14:m>
+                <a:endParaRPr lang="uk-UA" sz="1200" dirty="0"/>
+              </a:p>
+            </p:txBody>
+          </p:sp>
+        </mc:Choice>
+        <mc:Fallback>
+          <p:sp>
+            <p:nvSpPr>
+              <p:cNvPr id="28" name="TextBox 27">
+                <a:extLst>
+                  <a:ext uri="{FF2B5EF4-FFF2-40B4-BE49-F238E27FC236}">
+                    <a16:creationId xmlns:a16="http://schemas.microsoft.com/office/drawing/2014/main" id="{4D1F34B6-AD8C-E24A-916A-6B4DEAF8CFB9}"/>
+                  </a:ext>
+                </a:extLst>
+              </p:cNvPr>
+              <p:cNvSpPr txBox="1">
+                <a:spLocks noRot="1" noChangeAspect="1" noMove="1" noResize="1" noEditPoints="1" noAdjustHandles="1" noChangeArrowheads="1" noChangeShapeType="1" noTextEdit="1"/>
+              </p:cNvSpPr>
+              <p:nvPr/>
+            </p:nvSpPr>
+            <p:spPr>
+              <a:xfrm>
+                <a:off x="662166" y="4261316"/>
+                <a:ext cx="357470" cy="161583"/>
+              </a:xfrm>
+              <a:prstGeom prst="rect">
+                <a:avLst/>
+              </a:prstGeom>
+              <a:blipFill>
+                <a:blip r:embed="rId15"/>
+                <a:stretch>
+                  <a:fillRect l="-10345" r="-6897" b="-7143"/>
+                </a:stretch>
+              </a:blipFill>
+            </p:spPr>
+            <p:txBody>
+              <a:bodyPr/>
+              <a:lstStyle/>
+              <a:p>
+                <a:r>
+                  <a:rPr lang="uk-UA">
+                    <a:noFill/>
+                  </a:rPr>
+                  <a:t> </a:t>
+                </a:r>
+              </a:p>
+            </p:txBody>
+          </p:sp>
+        </mc:Fallback>
+      </mc:AlternateContent>
+      <mc:AlternateContent xmlns:mc="http://schemas.openxmlformats.org/markup-compatibility/2006">
+        <mc:Choice xmlns:a14="http://schemas.microsoft.com/office/drawing/2010/main" Requires="a14">
+          <p:sp>
+            <p:nvSpPr>
+              <p:cNvPr id="29" name="TextBox 28">
+                <a:extLst>
+                  <a:ext uri="{FF2B5EF4-FFF2-40B4-BE49-F238E27FC236}">
+                    <a16:creationId xmlns:a16="http://schemas.microsoft.com/office/drawing/2014/main" id="{A88BCE87-0EC8-D843-A8B3-00BF14DFFC6D}"/>
+                  </a:ext>
+                </a:extLst>
+              </p:cNvPr>
+              <p:cNvSpPr txBox="1"/>
+              <p:nvPr/>
+            </p:nvSpPr>
+            <p:spPr>
+              <a:xfrm>
+                <a:off x="662166" y="4386755"/>
+                <a:ext cx="357470" cy="161583"/>
+              </a:xfrm>
+              <a:prstGeom prst="rect">
+                <a:avLst/>
+              </a:prstGeom>
+              <a:noFill/>
+            </p:spPr>
+            <p:txBody>
+              <a:bodyPr wrap="none" lIns="0" tIns="0" rIns="0" bIns="0" rtlCol="0">
+                <a:spAutoFit/>
+              </a:bodyPr>
+              <a:lstStyle/>
+              <a:p>
+                <a:pPr/>
+                <a14:m>
+                  <m:oMathPara xmlns:m="http://schemas.openxmlformats.org/officeDocument/2006/math">
+                    <m:oMathParaPr>
+                      <m:jc m:val="centerGroup"/>
+                    </m:oMathParaPr>
+                    <m:oMath xmlns:m="http://schemas.openxmlformats.org/officeDocument/2006/math">
+                      <m:r>
+                        <a:rPr lang="en-US" sz="1050" i="1" smtClean="0">
+                          <a:latin typeface="Cambria Math" panose="02040503050406030204" pitchFamily="18" charset="0"/>
+                        </a:rPr>
+                        <m:t>0</m:t>
+                      </m:r>
+                      <m:r>
+                        <a:rPr lang="en-US" sz="1050" b="0" i="1" smtClean="0">
+                          <a:latin typeface="Cambria Math" panose="02040503050406030204" pitchFamily="18" charset="0"/>
+                        </a:rPr>
+                        <m:t>,019</m:t>
+                      </m:r>
+                    </m:oMath>
+                  </m:oMathPara>
+                </a14:m>
+                <a:endParaRPr lang="uk-UA" sz="1200" dirty="0"/>
+              </a:p>
+            </p:txBody>
+          </p:sp>
+        </mc:Choice>
+        <mc:Fallback>
+          <p:sp>
+            <p:nvSpPr>
+              <p:cNvPr id="29" name="TextBox 28">
+                <a:extLst>
+                  <a:ext uri="{FF2B5EF4-FFF2-40B4-BE49-F238E27FC236}">
+                    <a16:creationId xmlns:a16="http://schemas.microsoft.com/office/drawing/2014/main" id="{A88BCE87-0EC8-D843-A8B3-00BF14DFFC6D}"/>
+                  </a:ext>
+                </a:extLst>
+              </p:cNvPr>
+              <p:cNvSpPr txBox="1">
+                <a:spLocks noRot="1" noChangeAspect="1" noMove="1" noResize="1" noEditPoints="1" noAdjustHandles="1" noChangeArrowheads="1" noChangeShapeType="1" noTextEdit="1"/>
+              </p:cNvSpPr>
+              <p:nvPr/>
+            </p:nvSpPr>
+            <p:spPr>
+              <a:xfrm>
+                <a:off x="662166" y="4386755"/>
+                <a:ext cx="357470" cy="161583"/>
+              </a:xfrm>
+              <a:prstGeom prst="rect">
+                <a:avLst/>
+              </a:prstGeom>
+              <a:blipFill>
+                <a:blip r:embed="rId16"/>
+                <a:stretch>
+                  <a:fillRect l="-10345" r="-6897" b="-7143"/>
+                </a:stretch>
+              </a:blipFill>
+            </p:spPr>
+            <p:txBody>
+              <a:bodyPr/>
+              <a:lstStyle/>
+              <a:p>
+                <a:r>
+                  <a:rPr lang="uk-UA">
+                    <a:noFill/>
+                  </a:rPr>
+                  <a:t> </a:t>
+                </a:r>
+              </a:p>
+            </p:txBody>
+          </p:sp>
+        </mc:Fallback>
+      </mc:AlternateContent>
+      <mc:AlternateContent xmlns:mc="http://schemas.openxmlformats.org/markup-compatibility/2006">
+        <mc:Choice xmlns:a14="http://schemas.microsoft.com/office/drawing/2010/main" Requires="a14">
+          <p:sp>
+            <p:nvSpPr>
+              <p:cNvPr id="30" name="TextBox 29">
+                <a:extLst>
+                  <a:ext uri="{FF2B5EF4-FFF2-40B4-BE49-F238E27FC236}">
+                    <a16:creationId xmlns:a16="http://schemas.microsoft.com/office/drawing/2014/main" id="{5D726C07-0513-8041-ACEF-A65224B1E53B}"/>
+                  </a:ext>
+                </a:extLst>
+              </p:cNvPr>
+              <p:cNvSpPr txBox="1"/>
+              <p:nvPr/>
+            </p:nvSpPr>
+            <p:spPr>
+              <a:xfrm>
+                <a:off x="660394" y="4513996"/>
+                <a:ext cx="357470" cy="161583"/>
+              </a:xfrm>
+              <a:prstGeom prst="rect">
+                <a:avLst/>
+              </a:prstGeom>
+              <a:noFill/>
+            </p:spPr>
+            <p:txBody>
+              <a:bodyPr wrap="none" lIns="0" tIns="0" rIns="0" bIns="0" rtlCol="0">
+                <a:spAutoFit/>
+              </a:bodyPr>
+              <a:lstStyle/>
+              <a:p>
+                <a:pPr/>
+                <a14:m>
+                  <m:oMathPara xmlns:m="http://schemas.openxmlformats.org/officeDocument/2006/math">
+                    <m:oMathParaPr>
+                      <m:jc m:val="centerGroup"/>
+                    </m:oMathParaPr>
+                    <m:oMath xmlns:m="http://schemas.openxmlformats.org/officeDocument/2006/math">
+                      <m:r>
+                        <a:rPr lang="en-US" sz="1050" i="1" smtClean="0">
+                          <a:latin typeface="Cambria Math" panose="02040503050406030204" pitchFamily="18" charset="0"/>
+                        </a:rPr>
+                        <m:t>0</m:t>
+                      </m:r>
+                      <m:r>
+                        <a:rPr lang="en-US" sz="1050" b="0" i="1" smtClean="0">
+                          <a:latin typeface="Cambria Math" panose="02040503050406030204" pitchFamily="18" charset="0"/>
+                        </a:rPr>
+                        <m:t>,006</m:t>
+                      </m:r>
+                    </m:oMath>
+                  </m:oMathPara>
+                </a14:m>
+                <a:endParaRPr lang="uk-UA" sz="1200" dirty="0"/>
+              </a:p>
+            </p:txBody>
+          </p:sp>
+        </mc:Choice>
+        <mc:Fallback>
+          <p:sp>
+            <p:nvSpPr>
+              <p:cNvPr id="30" name="TextBox 29">
+                <a:extLst>
+                  <a:ext uri="{FF2B5EF4-FFF2-40B4-BE49-F238E27FC236}">
+                    <a16:creationId xmlns:a16="http://schemas.microsoft.com/office/drawing/2014/main" id="{5D726C07-0513-8041-ACEF-A65224B1E53B}"/>
+                  </a:ext>
+                </a:extLst>
+              </p:cNvPr>
+              <p:cNvSpPr txBox="1">
+                <a:spLocks noRot="1" noChangeAspect="1" noMove="1" noResize="1" noEditPoints="1" noAdjustHandles="1" noChangeArrowheads="1" noChangeShapeType="1" noTextEdit="1"/>
+              </p:cNvSpPr>
+              <p:nvPr/>
+            </p:nvSpPr>
+            <p:spPr>
+              <a:xfrm>
+                <a:off x="660394" y="4513996"/>
+                <a:ext cx="357470" cy="161583"/>
+              </a:xfrm>
+              <a:prstGeom prst="rect">
+                <a:avLst/>
+              </a:prstGeom>
+              <a:blipFill>
+                <a:blip r:embed="rId17"/>
+                <a:stretch>
+                  <a:fillRect l="-6667" r="-6667" b="-7143"/>
+                </a:stretch>
+              </a:blipFill>
+            </p:spPr>
+            <p:txBody>
+              <a:bodyPr/>
+              <a:lstStyle/>
+              <a:p>
+                <a:r>
+                  <a:rPr lang="uk-UA">
+                    <a:noFill/>
+                  </a:rPr>
+                  <a:t> </a:t>
+                </a:r>
+              </a:p>
+            </p:txBody>
+          </p:sp>
+        </mc:Fallback>
+      </mc:AlternateContent>
+      <mc:AlternateContent xmlns:mc="http://schemas.openxmlformats.org/markup-compatibility/2006">
+        <mc:Choice xmlns:a14="http://schemas.microsoft.com/office/drawing/2010/main" Requires="a14">
+          <p:sp>
+            <p:nvSpPr>
+              <p:cNvPr id="31" name="TextBox 30">
+                <a:extLst>
+                  <a:ext uri="{FF2B5EF4-FFF2-40B4-BE49-F238E27FC236}">
+                    <a16:creationId xmlns:a16="http://schemas.microsoft.com/office/drawing/2014/main" id="{EF1AB066-3D60-7547-854E-CB0C1DF11129}"/>
+                  </a:ext>
+                </a:extLst>
+              </p:cNvPr>
+              <p:cNvSpPr txBox="1"/>
+              <p:nvPr/>
+            </p:nvSpPr>
+            <p:spPr>
+              <a:xfrm>
+                <a:off x="7189629" y="4594787"/>
+                <a:ext cx="141705" cy="215444"/>
+              </a:xfrm>
+              <a:prstGeom prst="rect">
+                <a:avLst/>
+              </a:prstGeom>
+              <a:noFill/>
+            </p:spPr>
+            <p:txBody>
+              <a:bodyPr wrap="none" lIns="0" tIns="0" rIns="0" bIns="0" rtlCol="0">
+                <a:spAutoFit/>
+              </a:bodyPr>
+              <a:lstStyle/>
+              <a:p>
+                <a:pPr/>
+                <a14:m>
+                  <m:oMathPara xmlns:m="http://schemas.openxmlformats.org/officeDocument/2006/math">
+                    <m:oMathParaPr>
+                      <m:jc m:val="centerGroup"/>
+                    </m:oMathParaPr>
+                    <m:oMath xmlns:m="http://schemas.openxmlformats.org/officeDocument/2006/math">
+                      <m:r>
+                        <a:rPr lang="en-US" sz="1400" b="0" i="1" smtClean="0">
+                          <a:latin typeface="Cambria Math" panose="02040503050406030204" pitchFamily="18" charset="0"/>
+                        </a:rPr>
+                        <m:t>𝑥</m:t>
+                      </m:r>
+                    </m:oMath>
+                  </m:oMathPara>
+                </a14:m>
+                <a:endParaRPr lang="uk-UA" dirty="0"/>
+              </a:p>
+            </p:txBody>
+          </p:sp>
+        </mc:Choice>
+        <mc:Fallback>
+          <p:sp>
+            <p:nvSpPr>
+              <p:cNvPr id="31" name="TextBox 30">
+                <a:extLst>
+                  <a:ext uri="{FF2B5EF4-FFF2-40B4-BE49-F238E27FC236}">
+                    <a16:creationId xmlns:a16="http://schemas.microsoft.com/office/drawing/2014/main" id="{EF1AB066-3D60-7547-854E-CB0C1DF11129}"/>
+                  </a:ext>
+                </a:extLst>
+              </p:cNvPr>
+              <p:cNvSpPr txBox="1">
+                <a:spLocks noRot="1" noChangeAspect="1" noMove="1" noResize="1" noEditPoints="1" noAdjustHandles="1" noChangeArrowheads="1" noChangeShapeType="1" noTextEdit="1"/>
+              </p:cNvSpPr>
+              <p:nvPr/>
+            </p:nvSpPr>
+            <p:spPr>
+              <a:xfrm>
+                <a:off x="7189629" y="4594787"/>
+                <a:ext cx="141705" cy="215444"/>
+              </a:xfrm>
+              <a:prstGeom prst="rect">
+                <a:avLst/>
+              </a:prstGeom>
+              <a:blipFill>
+                <a:blip r:embed="rId18"/>
+                <a:stretch>
+                  <a:fillRect l="-7692" r="-7692"/>
+                </a:stretch>
+              </a:blipFill>
+            </p:spPr>
+            <p:txBody>
+              <a:bodyPr/>
+              <a:lstStyle/>
+              <a:p>
+                <a:r>
+                  <a:rPr lang="uk-UA">
+                    <a:noFill/>
+                  </a:rPr>
+                  <a:t> </a:t>
+                </a:r>
+              </a:p>
+            </p:txBody>
+          </p:sp>
+        </mc:Fallback>
+      </mc:AlternateContent>
+      <mc:AlternateContent xmlns:mc="http://schemas.openxmlformats.org/markup-compatibility/2006">
+        <mc:Choice xmlns:a14="http://schemas.microsoft.com/office/drawing/2010/main" Requires="a14">
+          <p:sp>
+            <p:nvSpPr>
+              <p:cNvPr id="32" name="TextBox 31">
+                <a:extLst>
+                  <a:ext uri="{FF2B5EF4-FFF2-40B4-BE49-F238E27FC236}">
+                    <a16:creationId xmlns:a16="http://schemas.microsoft.com/office/drawing/2014/main" id="{152CE1CB-9E98-8245-8D2F-120EED8C5070}"/>
+                  </a:ext>
+                </a:extLst>
+              </p:cNvPr>
+              <p:cNvSpPr txBox="1"/>
+              <p:nvPr/>
+            </p:nvSpPr>
+            <p:spPr>
+              <a:xfrm>
+                <a:off x="1037271" y="511710"/>
+                <a:ext cx="197875" cy="215444"/>
+              </a:xfrm>
+              <a:prstGeom prst="rect">
+                <a:avLst/>
+              </a:prstGeom>
+              <a:noFill/>
+            </p:spPr>
+            <p:txBody>
+              <a:bodyPr wrap="none" lIns="0" tIns="0" rIns="0" bIns="0" rtlCol="0">
+                <a:spAutoFit/>
+              </a:bodyPr>
+              <a:lstStyle/>
+              <a:p>
+                <a:pPr/>
+                <a14:m>
+                  <m:oMathPara xmlns:m="http://schemas.openxmlformats.org/officeDocument/2006/math">
+                    <m:oMathParaPr>
+                      <m:jc m:val="centerGroup"/>
+                    </m:oMathParaPr>
+                    <m:oMath xmlns:m="http://schemas.openxmlformats.org/officeDocument/2006/math">
+                      <m:sSub>
+                        <m:sSubPr>
+                          <m:ctrlPr>
+                            <a:rPr lang="en-US" sz="1400" b="0" i="1" smtClean="0">
+                              <a:latin typeface="Cambria Math" panose="02040503050406030204" pitchFamily="18" charset="0"/>
+                            </a:rPr>
+                          </m:ctrlPr>
+                        </m:sSubPr>
+                        <m:e>
+                          <m:r>
+                            <a:rPr lang="en-US" sz="1400" b="0" i="1" smtClean="0">
+                              <a:latin typeface="Cambria Math" panose="02040503050406030204" pitchFamily="18" charset="0"/>
+                            </a:rPr>
+                            <m:t>h</m:t>
+                          </m:r>
+                        </m:e>
+                        <m:sub>
+                          <m:r>
+                            <a:rPr lang="en-US" sz="1400" b="0" i="1" smtClean="0">
+                              <a:latin typeface="Cambria Math" panose="02040503050406030204" pitchFamily="18" charset="0"/>
+                            </a:rPr>
+                            <m:t>𝑖</m:t>
+                          </m:r>
+                        </m:sub>
+                      </m:sSub>
+                    </m:oMath>
+                  </m:oMathPara>
+                </a14:m>
+                <a:endParaRPr lang="uk-UA" dirty="0"/>
+              </a:p>
+            </p:txBody>
+          </p:sp>
+        </mc:Choice>
+        <mc:Fallback>
+          <p:sp>
+            <p:nvSpPr>
+              <p:cNvPr id="32" name="TextBox 31">
+                <a:extLst>
+                  <a:ext uri="{FF2B5EF4-FFF2-40B4-BE49-F238E27FC236}">
+                    <a16:creationId xmlns:a16="http://schemas.microsoft.com/office/drawing/2014/main" id="{152CE1CB-9E98-8245-8D2F-120EED8C5070}"/>
+                  </a:ext>
+                </a:extLst>
+              </p:cNvPr>
+              <p:cNvSpPr txBox="1">
+                <a:spLocks noRot="1" noChangeAspect="1" noMove="1" noResize="1" noEditPoints="1" noAdjustHandles="1" noChangeArrowheads="1" noChangeShapeType="1" noTextEdit="1"/>
+              </p:cNvSpPr>
+              <p:nvPr/>
+            </p:nvSpPr>
+            <p:spPr>
+              <a:xfrm>
+                <a:off x="1037271" y="511710"/>
+                <a:ext cx="197875" cy="215444"/>
+              </a:xfrm>
+              <a:prstGeom prst="rect">
+                <a:avLst/>
+              </a:prstGeom>
+              <a:blipFill>
+                <a:blip r:embed="rId19"/>
+                <a:stretch>
+                  <a:fillRect l="-17647" r="-5882" b="-16667"/>
+                </a:stretch>
+              </a:blipFill>
+            </p:spPr>
+            <p:txBody>
+              <a:bodyPr/>
+              <a:lstStyle/>
+              <a:p>
+                <a:r>
+                  <a:rPr lang="uk-UA">
+                    <a:noFill/>
+                  </a:rPr>
+                  <a:t> </a:t>
+                </a:r>
+              </a:p>
+            </p:txBody>
+          </p:sp>
+        </mc:Fallback>
+      </mc:AlternateContent>
+      <p:cxnSp>
+        <p:nvCxnSpPr>
+          <p:cNvPr id="46" name="Straight Connector 45">
+            <a:extLst>
+              <a:ext uri="{FF2B5EF4-FFF2-40B4-BE49-F238E27FC236}">
+                <a16:creationId xmlns:a16="http://schemas.microsoft.com/office/drawing/2014/main" id="{BAEFBFFA-540D-A747-BEA5-E7D760747B34}"/>
+              </a:ext>
+            </a:extLst>
+          </p:cNvPr>
+          <p:cNvCxnSpPr/>
+          <p:nvPr/>
+        </p:nvCxnSpPr>
+        <p:spPr>
+          <a:xfrm>
+            <a:off x="1298339" y="1417674"/>
+            <a:ext cx="0" cy="0"/>
+          </a:xfrm>
+          <a:prstGeom prst="line">
+            <a:avLst/>
+          </a:prstGeom>
+        </p:spPr>
+        <p:style>
+          <a:lnRef idx="1">
+            <a:schemeClr val="accent1"/>
+          </a:lnRef>
+          <a:fillRef idx="0">
+            <a:schemeClr val="accent1"/>
+          </a:fillRef>
+          <a:effectRef idx="0">
+            <a:schemeClr val="accent1"/>
+          </a:effectRef>
+          <a:fontRef idx="minor">
+            <a:schemeClr val="tx1"/>
+          </a:fontRef>
+        </p:style>
+      </p:cxnSp>
+      <p:sp>
+        <p:nvSpPr>
+          <p:cNvPr id="58" name="Freeform 57">
+            <a:extLst>
+              <a:ext uri="{FF2B5EF4-FFF2-40B4-BE49-F238E27FC236}">
+                <a16:creationId xmlns:a16="http://schemas.microsoft.com/office/drawing/2014/main" id="{F1494FF4-D28C-144E-82DC-10D1F30CBF64}"/>
+              </a:ext>
+            </a:extLst>
+          </p:cNvPr>
+          <p:cNvSpPr/>
+          <p:nvPr/>
+        </p:nvSpPr>
+        <p:spPr>
+          <a:xfrm>
+            <a:off x="1958623" y="1151467"/>
+            <a:ext cx="5151167" cy="3493813"/>
+          </a:xfrm>
+          <a:custGeom>
+            <a:avLst/>
+            <a:gdLst>
+              <a:gd name="connsiteX0" fmla="*/ 0 w 2726621"/>
+              <a:gd name="connsiteY0" fmla="*/ 0 h 3071201"/>
+              <a:gd name="connsiteX1" fmla="*/ 581378 w 2726621"/>
+              <a:gd name="connsiteY1" fmla="*/ 1467555 h 3071201"/>
+              <a:gd name="connsiteX2" fmla="*/ 1162756 w 2726621"/>
+              <a:gd name="connsiteY2" fmla="*/ 2302933 h 3071201"/>
+              <a:gd name="connsiteX3" fmla="*/ 1749778 w 2726621"/>
+              <a:gd name="connsiteY3" fmla="*/ 2822222 h 3071201"/>
+              <a:gd name="connsiteX4" fmla="*/ 2336800 w 2726621"/>
+              <a:gd name="connsiteY4" fmla="*/ 3064933 h 3071201"/>
+              <a:gd name="connsiteX5" fmla="*/ 2709334 w 2726621"/>
+              <a:gd name="connsiteY5" fmla="*/ 2585155 h 3071201"/>
+              <a:gd name="connsiteX6" fmla="*/ 2630311 w 2726621"/>
+              <a:gd name="connsiteY6" fmla="*/ 2528711 h 3071201"/>
+              <a:gd name="connsiteX0" fmla="*/ 0 w 2726621"/>
+              <a:gd name="connsiteY0" fmla="*/ 0 h 3071201"/>
+              <a:gd name="connsiteX1" fmla="*/ 694266 w 2726621"/>
+              <a:gd name="connsiteY1" fmla="*/ 1405466 h 3071201"/>
+              <a:gd name="connsiteX2" fmla="*/ 1162756 w 2726621"/>
+              <a:gd name="connsiteY2" fmla="*/ 2302933 h 3071201"/>
+              <a:gd name="connsiteX3" fmla="*/ 1749778 w 2726621"/>
+              <a:gd name="connsiteY3" fmla="*/ 2822222 h 3071201"/>
+              <a:gd name="connsiteX4" fmla="*/ 2336800 w 2726621"/>
+              <a:gd name="connsiteY4" fmla="*/ 3064933 h 3071201"/>
+              <a:gd name="connsiteX5" fmla="*/ 2709334 w 2726621"/>
+              <a:gd name="connsiteY5" fmla="*/ 2585155 h 3071201"/>
+              <a:gd name="connsiteX6" fmla="*/ 2630311 w 2726621"/>
+              <a:gd name="connsiteY6" fmla="*/ 2528711 h 3071201"/>
+              <a:gd name="connsiteX0" fmla="*/ 0 w 2726621"/>
+              <a:gd name="connsiteY0" fmla="*/ 0 h 3071201"/>
+              <a:gd name="connsiteX1" fmla="*/ 581377 w 2726621"/>
+              <a:gd name="connsiteY1" fmla="*/ 1467554 h 3071201"/>
+              <a:gd name="connsiteX2" fmla="*/ 1162756 w 2726621"/>
+              <a:gd name="connsiteY2" fmla="*/ 2302933 h 3071201"/>
+              <a:gd name="connsiteX3" fmla="*/ 1749778 w 2726621"/>
+              <a:gd name="connsiteY3" fmla="*/ 2822222 h 3071201"/>
+              <a:gd name="connsiteX4" fmla="*/ 2336800 w 2726621"/>
+              <a:gd name="connsiteY4" fmla="*/ 3064933 h 3071201"/>
+              <a:gd name="connsiteX5" fmla="*/ 2709334 w 2726621"/>
+              <a:gd name="connsiteY5" fmla="*/ 2585155 h 3071201"/>
+              <a:gd name="connsiteX6" fmla="*/ 2630311 w 2726621"/>
+              <a:gd name="connsiteY6" fmla="*/ 2528711 h 3071201"/>
+              <a:gd name="connsiteX0" fmla="*/ 0 w 2726621"/>
+              <a:gd name="connsiteY0" fmla="*/ 0 h 3065798"/>
+              <a:gd name="connsiteX1" fmla="*/ 581377 w 2726621"/>
+              <a:gd name="connsiteY1" fmla="*/ 1467554 h 3065798"/>
+              <a:gd name="connsiteX2" fmla="*/ 1162756 w 2726621"/>
+              <a:gd name="connsiteY2" fmla="*/ 2302933 h 3065798"/>
+              <a:gd name="connsiteX3" fmla="*/ 1873956 w 2726621"/>
+              <a:gd name="connsiteY3" fmla="*/ 2692400 h 3065798"/>
+              <a:gd name="connsiteX4" fmla="*/ 2336800 w 2726621"/>
+              <a:gd name="connsiteY4" fmla="*/ 3064933 h 3065798"/>
+              <a:gd name="connsiteX5" fmla="*/ 2709334 w 2726621"/>
+              <a:gd name="connsiteY5" fmla="*/ 2585155 h 3065798"/>
+              <a:gd name="connsiteX6" fmla="*/ 2630311 w 2726621"/>
+              <a:gd name="connsiteY6" fmla="*/ 2528711 h 3065798"/>
+              <a:gd name="connsiteX0" fmla="*/ 0 w 2726621"/>
+              <a:gd name="connsiteY0" fmla="*/ 0 h 3070786"/>
+              <a:gd name="connsiteX1" fmla="*/ 581377 w 2726621"/>
+              <a:gd name="connsiteY1" fmla="*/ 1467554 h 3070786"/>
+              <a:gd name="connsiteX2" fmla="*/ 1162756 w 2726621"/>
+              <a:gd name="connsiteY2" fmla="*/ 2302933 h 3070786"/>
+              <a:gd name="connsiteX3" fmla="*/ 1738489 w 2726621"/>
+              <a:gd name="connsiteY3" fmla="*/ 2816578 h 3070786"/>
+              <a:gd name="connsiteX4" fmla="*/ 2336800 w 2726621"/>
+              <a:gd name="connsiteY4" fmla="*/ 3064933 h 3070786"/>
+              <a:gd name="connsiteX5" fmla="*/ 2709334 w 2726621"/>
+              <a:gd name="connsiteY5" fmla="*/ 2585155 h 3070786"/>
+              <a:gd name="connsiteX6" fmla="*/ 2630311 w 2726621"/>
+              <a:gd name="connsiteY6" fmla="*/ 2528711 h 3070786"/>
+              <a:gd name="connsiteX0" fmla="*/ 0 w 2726621"/>
+              <a:gd name="connsiteY0" fmla="*/ 0 h 3114990"/>
+              <a:gd name="connsiteX1" fmla="*/ 581377 w 2726621"/>
+              <a:gd name="connsiteY1" fmla="*/ 1467554 h 3114990"/>
+              <a:gd name="connsiteX2" fmla="*/ 1162756 w 2726621"/>
+              <a:gd name="connsiteY2" fmla="*/ 2302933 h 3114990"/>
+              <a:gd name="connsiteX3" fmla="*/ 1738489 w 2726621"/>
+              <a:gd name="connsiteY3" fmla="*/ 2816578 h 3114990"/>
+              <a:gd name="connsiteX4" fmla="*/ 2331155 w 2726621"/>
+              <a:gd name="connsiteY4" fmla="*/ 3110088 h 3114990"/>
+              <a:gd name="connsiteX5" fmla="*/ 2709334 w 2726621"/>
+              <a:gd name="connsiteY5" fmla="*/ 2585155 h 3114990"/>
+              <a:gd name="connsiteX6" fmla="*/ 2630311 w 2726621"/>
+              <a:gd name="connsiteY6" fmla="*/ 2528711 h 3114990"/>
+              <a:gd name="connsiteX0" fmla="*/ 0 w 2912947"/>
+              <a:gd name="connsiteY0" fmla="*/ 0 h 3314014"/>
+              <a:gd name="connsiteX1" fmla="*/ 581377 w 2912947"/>
+              <a:gd name="connsiteY1" fmla="*/ 1467554 h 3314014"/>
+              <a:gd name="connsiteX2" fmla="*/ 1162756 w 2912947"/>
+              <a:gd name="connsiteY2" fmla="*/ 2302933 h 3314014"/>
+              <a:gd name="connsiteX3" fmla="*/ 1738489 w 2912947"/>
+              <a:gd name="connsiteY3" fmla="*/ 2816578 h 3314014"/>
+              <a:gd name="connsiteX4" fmla="*/ 2331155 w 2912947"/>
+              <a:gd name="connsiteY4" fmla="*/ 3110088 h 3314014"/>
+              <a:gd name="connsiteX5" fmla="*/ 2906890 w 2912947"/>
+              <a:gd name="connsiteY5" fmla="*/ 3290711 h 3314014"/>
+              <a:gd name="connsiteX6" fmla="*/ 2630311 w 2912947"/>
+              <a:gd name="connsiteY6" fmla="*/ 2528711 h 3314014"/>
+              <a:gd name="connsiteX0" fmla="*/ 0 w 4094690"/>
+              <a:gd name="connsiteY0" fmla="*/ 0 h 3454400"/>
+              <a:gd name="connsiteX1" fmla="*/ 581377 w 4094690"/>
+              <a:gd name="connsiteY1" fmla="*/ 1467554 h 3454400"/>
+              <a:gd name="connsiteX2" fmla="*/ 1162756 w 4094690"/>
+              <a:gd name="connsiteY2" fmla="*/ 2302933 h 3454400"/>
+              <a:gd name="connsiteX3" fmla="*/ 1738489 w 4094690"/>
+              <a:gd name="connsiteY3" fmla="*/ 2816578 h 3454400"/>
+              <a:gd name="connsiteX4" fmla="*/ 2331155 w 4094690"/>
+              <a:gd name="connsiteY4" fmla="*/ 3110088 h 3454400"/>
+              <a:gd name="connsiteX5" fmla="*/ 2906890 w 4094690"/>
+              <a:gd name="connsiteY5" fmla="*/ 3290711 h 3454400"/>
+              <a:gd name="connsiteX6" fmla="*/ 4092222 w 4094690"/>
+              <a:gd name="connsiteY6" fmla="*/ 3454400 h 3454400"/>
+              <a:gd name="connsiteX0" fmla="*/ 0 w 4099570"/>
+              <a:gd name="connsiteY0" fmla="*/ 0 h 3464180"/>
+              <a:gd name="connsiteX1" fmla="*/ 581377 w 4099570"/>
+              <a:gd name="connsiteY1" fmla="*/ 1467554 h 3464180"/>
+              <a:gd name="connsiteX2" fmla="*/ 1162756 w 4099570"/>
+              <a:gd name="connsiteY2" fmla="*/ 2302933 h 3464180"/>
+              <a:gd name="connsiteX3" fmla="*/ 1738489 w 4099570"/>
+              <a:gd name="connsiteY3" fmla="*/ 2816578 h 3464180"/>
+              <a:gd name="connsiteX4" fmla="*/ 2331155 w 4099570"/>
+              <a:gd name="connsiteY4" fmla="*/ 3110088 h 3464180"/>
+              <a:gd name="connsiteX5" fmla="*/ 2906890 w 4099570"/>
+              <a:gd name="connsiteY5" fmla="*/ 3290711 h 3464180"/>
+              <a:gd name="connsiteX6" fmla="*/ 4097112 w 4099570"/>
+              <a:gd name="connsiteY6" fmla="*/ 3464180 h 3464180"/>
+              <a:gd name="connsiteX0" fmla="*/ 0 w 4212478"/>
+              <a:gd name="connsiteY0" fmla="*/ 0 h 3464180"/>
+              <a:gd name="connsiteX1" fmla="*/ 581377 w 4212478"/>
+              <a:gd name="connsiteY1" fmla="*/ 1467554 h 3464180"/>
+              <a:gd name="connsiteX2" fmla="*/ 1162756 w 4212478"/>
+              <a:gd name="connsiteY2" fmla="*/ 2302933 h 3464180"/>
+              <a:gd name="connsiteX3" fmla="*/ 1738489 w 4212478"/>
+              <a:gd name="connsiteY3" fmla="*/ 2816578 h 3464180"/>
+              <a:gd name="connsiteX4" fmla="*/ 2331155 w 4212478"/>
+              <a:gd name="connsiteY4" fmla="*/ 3110088 h 3464180"/>
+              <a:gd name="connsiteX5" fmla="*/ 2906890 w 4212478"/>
+              <a:gd name="connsiteY5" fmla="*/ 3290711 h 3464180"/>
+              <a:gd name="connsiteX6" fmla="*/ 4097112 w 4212478"/>
+              <a:gd name="connsiteY6" fmla="*/ 3464180 h 3464180"/>
+              <a:gd name="connsiteX0" fmla="*/ 0 w 4097112"/>
+              <a:gd name="connsiteY0" fmla="*/ 0 h 3464180"/>
+              <a:gd name="connsiteX1" fmla="*/ 581377 w 4097112"/>
+              <a:gd name="connsiteY1" fmla="*/ 1467554 h 3464180"/>
+              <a:gd name="connsiteX2" fmla="*/ 1162756 w 4097112"/>
+              <a:gd name="connsiteY2" fmla="*/ 2302933 h 3464180"/>
+              <a:gd name="connsiteX3" fmla="*/ 1738489 w 4097112"/>
+              <a:gd name="connsiteY3" fmla="*/ 2816578 h 3464180"/>
+              <a:gd name="connsiteX4" fmla="*/ 2331155 w 4097112"/>
+              <a:gd name="connsiteY4" fmla="*/ 3110088 h 3464180"/>
+              <a:gd name="connsiteX5" fmla="*/ 2906890 w 4097112"/>
+              <a:gd name="connsiteY5" fmla="*/ 3290711 h 3464180"/>
+              <a:gd name="connsiteX6" fmla="*/ 3488658 w 4097112"/>
+              <a:gd name="connsiteY6" fmla="*/ 3391194 h 3464180"/>
+              <a:gd name="connsiteX7" fmla="*/ 4097112 w 4097112"/>
+              <a:gd name="connsiteY7" fmla="*/ 3464180 h 3464180"/>
+              <a:gd name="connsiteX0" fmla="*/ 0 w 4664333"/>
+              <a:gd name="connsiteY0" fmla="*/ 0 h 3464180"/>
+              <a:gd name="connsiteX1" fmla="*/ 581377 w 4664333"/>
+              <a:gd name="connsiteY1" fmla="*/ 1467554 h 3464180"/>
+              <a:gd name="connsiteX2" fmla="*/ 1162756 w 4664333"/>
+              <a:gd name="connsiteY2" fmla="*/ 2302933 h 3464180"/>
+              <a:gd name="connsiteX3" fmla="*/ 1738489 w 4664333"/>
+              <a:gd name="connsiteY3" fmla="*/ 2816578 h 3464180"/>
+              <a:gd name="connsiteX4" fmla="*/ 2331155 w 4664333"/>
+              <a:gd name="connsiteY4" fmla="*/ 3110088 h 3464180"/>
+              <a:gd name="connsiteX5" fmla="*/ 2906890 w 4664333"/>
+              <a:gd name="connsiteY5" fmla="*/ 3290711 h 3464180"/>
+              <a:gd name="connsiteX6" fmla="*/ 3488658 w 4664333"/>
+              <a:gd name="connsiteY6" fmla="*/ 3391194 h 3464180"/>
+              <a:gd name="connsiteX7" fmla="*/ 4664333 w 4664333"/>
+              <a:gd name="connsiteY7" fmla="*/ 3464180 h 3464180"/>
+              <a:gd name="connsiteX0" fmla="*/ 0 w 4664333"/>
+              <a:gd name="connsiteY0" fmla="*/ 0 h 3464180"/>
+              <a:gd name="connsiteX1" fmla="*/ 581377 w 4664333"/>
+              <a:gd name="connsiteY1" fmla="*/ 1467554 h 3464180"/>
+              <a:gd name="connsiteX2" fmla="*/ 1162756 w 4664333"/>
+              <a:gd name="connsiteY2" fmla="*/ 2302933 h 3464180"/>
+              <a:gd name="connsiteX3" fmla="*/ 1738489 w 4664333"/>
+              <a:gd name="connsiteY3" fmla="*/ 2816578 h 3464180"/>
+              <a:gd name="connsiteX4" fmla="*/ 2331155 w 4664333"/>
+              <a:gd name="connsiteY4" fmla="*/ 3110088 h 3464180"/>
+              <a:gd name="connsiteX5" fmla="*/ 2906890 w 4664333"/>
+              <a:gd name="connsiteY5" fmla="*/ 3290711 h 3464180"/>
+              <a:gd name="connsiteX6" fmla="*/ 3488658 w 4664333"/>
+              <a:gd name="connsiteY6" fmla="*/ 3391194 h 3464180"/>
+              <a:gd name="connsiteX7" fmla="*/ 4075439 w 4664333"/>
+              <a:gd name="connsiteY7" fmla="*/ 3440092 h 3464180"/>
+              <a:gd name="connsiteX8" fmla="*/ 4664333 w 4664333"/>
+              <a:gd name="connsiteY8" fmla="*/ 3464180 h 3464180"/>
+              <a:gd name="connsiteX0" fmla="*/ 0 w 5151167"/>
+              <a:gd name="connsiteY0" fmla="*/ 0 h 3493813"/>
+              <a:gd name="connsiteX1" fmla="*/ 581377 w 5151167"/>
+              <a:gd name="connsiteY1" fmla="*/ 1467554 h 3493813"/>
+              <a:gd name="connsiteX2" fmla="*/ 1162756 w 5151167"/>
+              <a:gd name="connsiteY2" fmla="*/ 2302933 h 3493813"/>
+              <a:gd name="connsiteX3" fmla="*/ 1738489 w 5151167"/>
+              <a:gd name="connsiteY3" fmla="*/ 2816578 h 3493813"/>
+              <a:gd name="connsiteX4" fmla="*/ 2331155 w 5151167"/>
+              <a:gd name="connsiteY4" fmla="*/ 3110088 h 3493813"/>
+              <a:gd name="connsiteX5" fmla="*/ 2906890 w 5151167"/>
+              <a:gd name="connsiteY5" fmla="*/ 3290711 h 3493813"/>
+              <a:gd name="connsiteX6" fmla="*/ 3488658 w 5151167"/>
+              <a:gd name="connsiteY6" fmla="*/ 3391194 h 3493813"/>
+              <a:gd name="connsiteX7" fmla="*/ 4075439 w 5151167"/>
+              <a:gd name="connsiteY7" fmla="*/ 3440092 h 3493813"/>
+              <a:gd name="connsiteX8" fmla="*/ 5151167 w 5151167"/>
+              <a:gd name="connsiteY8" fmla="*/ 3493813 h 3493813"/>
+              <a:gd name="connsiteX0" fmla="*/ 0 w 5151167"/>
+              <a:gd name="connsiteY0" fmla="*/ 0 h 3493813"/>
+              <a:gd name="connsiteX1" fmla="*/ 581377 w 5151167"/>
+              <a:gd name="connsiteY1" fmla="*/ 1467554 h 3493813"/>
+              <a:gd name="connsiteX2" fmla="*/ 1162756 w 5151167"/>
+              <a:gd name="connsiteY2" fmla="*/ 2302933 h 3493813"/>
+              <a:gd name="connsiteX3" fmla="*/ 1738489 w 5151167"/>
+              <a:gd name="connsiteY3" fmla="*/ 2816578 h 3493813"/>
+              <a:gd name="connsiteX4" fmla="*/ 2331155 w 5151167"/>
+              <a:gd name="connsiteY4" fmla="*/ 3110088 h 3493813"/>
+              <a:gd name="connsiteX5" fmla="*/ 2906890 w 5151167"/>
+              <a:gd name="connsiteY5" fmla="*/ 3290711 h 3493813"/>
+              <a:gd name="connsiteX6" fmla="*/ 3488658 w 5151167"/>
+              <a:gd name="connsiteY6" fmla="*/ 3391194 h 3493813"/>
+              <a:gd name="connsiteX7" fmla="*/ 4075439 w 5151167"/>
+              <a:gd name="connsiteY7" fmla="*/ 3440092 h 3493813"/>
+              <a:gd name="connsiteX8" fmla="*/ 4662310 w 5151167"/>
+              <a:gd name="connsiteY8" fmla="*/ 3471333 h 3493813"/>
+              <a:gd name="connsiteX9" fmla="*/ 5151167 w 5151167"/>
+              <a:gd name="connsiteY9" fmla="*/ 3493813 h 3493813"/>
+            </a:gdLst>
+            <a:ahLst/>
+            <a:cxnLst>
+              <a:cxn ang="0">
+                <a:pos x="connsiteX0" y="connsiteY0"/>
+              </a:cxn>
+              <a:cxn ang="0">
+                <a:pos x="connsiteX1" y="connsiteY1"/>
+              </a:cxn>
+              <a:cxn ang="0">
+                <a:pos x="connsiteX2" y="connsiteY2"/>
+              </a:cxn>
+              <a:cxn ang="0">
+                <a:pos x="connsiteX3" y="connsiteY3"/>
+              </a:cxn>
+              <a:cxn ang="0">
+                <a:pos x="connsiteX4" y="connsiteY4"/>
+              </a:cxn>
+              <a:cxn ang="0">
+                <a:pos x="connsiteX5" y="connsiteY5"/>
+              </a:cxn>
+              <a:cxn ang="0">
+                <a:pos x="connsiteX6" y="connsiteY6"/>
+              </a:cxn>
+              <a:cxn ang="0">
+                <a:pos x="connsiteX7" y="connsiteY7"/>
+              </a:cxn>
+              <a:cxn ang="0">
+                <a:pos x="connsiteX8" y="connsiteY8"/>
+              </a:cxn>
+              <a:cxn ang="0">
+                <a:pos x="connsiteX9" y="connsiteY9"/>
+              </a:cxn>
+            </a:cxnLst>
+            <a:rect l="l" t="t" r="r" b="b"/>
+            <a:pathLst>
+              <a:path w="5151167" h="3493813">
+                <a:moveTo>
+                  <a:pt x="0" y="0"/>
+                </a:moveTo>
+                <a:cubicBezTo>
+                  <a:pt x="193792" y="541866"/>
+                  <a:pt x="387584" y="1083732"/>
+                  <a:pt x="581377" y="1467554"/>
+                </a:cubicBezTo>
+                <a:cubicBezTo>
+                  <a:pt x="775170" y="1851376"/>
+                  <a:pt x="969904" y="2078096"/>
+                  <a:pt x="1162756" y="2302933"/>
+                </a:cubicBezTo>
+                <a:cubicBezTo>
+                  <a:pt x="1355608" y="2527770"/>
+                  <a:pt x="1543756" y="2682052"/>
+                  <a:pt x="1738489" y="2816578"/>
+                </a:cubicBezTo>
+                <a:cubicBezTo>
+                  <a:pt x="1933222" y="2951104"/>
+                  <a:pt x="2136422" y="3031066"/>
+                  <a:pt x="2331155" y="3110088"/>
+                </a:cubicBezTo>
+                <a:cubicBezTo>
+                  <a:pt x="2525889" y="3189110"/>
+                  <a:pt x="2691969" y="3255270"/>
+                  <a:pt x="2906890" y="3290711"/>
+                </a:cubicBezTo>
+                <a:cubicBezTo>
+                  <a:pt x="3121811" y="3326152"/>
+                  <a:pt x="3285750" y="3367927"/>
+                  <a:pt x="3488658" y="3391194"/>
+                </a:cubicBezTo>
+                <a:cubicBezTo>
+                  <a:pt x="3691566" y="3414461"/>
+                  <a:pt x="3880536" y="3428147"/>
+                  <a:pt x="4075439" y="3440092"/>
+                </a:cubicBezTo>
+                <a:lnTo>
+                  <a:pt x="4662310" y="3471333"/>
+                </a:lnTo>
+                <a:lnTo>
+                  <a:pt x="5151167" y="3493813"/>
+                </a:lnTo>
+              </a:path>
+            </a:pathLst>
+          </a:custGeom>
+          <a:ln w="28575"/>
+        </p:spPr>
+        <p:style>
+          <a:lnRef idx="1">
+            <a:schemeClr val="accent2"/>
+          </a:lnRef>
+          <a:fillRef idx="0">
+            <a:schemeClr val="accent2"/>
+          </a:fillRef>
+          <a:effectRef idx="0">
+            <a:schemeClr val="accent2"/>
+          </a:effectRef>
+          <a:fontRef idx="minor">
+            <a:schemeClr val="tx1"/>
+          </a:fontRef>
+        </p:style>
+        <p:txBody>
+          <a:bodyPr rtlCol="0" anchor="ctr"/>
+          <a:lstStyle/>
+          <a:p>
+            <a:pPr algn="ctr"/>
+            <a:endParaRPr lang="uk-UA"/>
+          </a:p>
+        </p:txBody>
+      </p:sp>
+    </p:spTree>
+    <p:extLst>
+      <p:ext uri="{BB962C8B-B14F-4D97-AF65-F5344CB8AC3E}">
+        <p14:creationId xmlns:p14="http://schemas.microsoft.com/office/powerpoint/2010/main" val="719515723"/>
+      </p:ext>
+    </p:extLst>
+  </p:cSld>
+  <p:clrMapOvr>
+    <a:masterClrMapping/>
+  </p:clrMapOvr>
+</p:sld>
+</file>
+
 <file path=ppt/theme/theme1.xml><?xml version="1.0" encoding="utf-8"?>
 <a:theme xmlns:a="http://schemas.openxmlformats.org/drawingml/2006/main" name="Office Theme">
   <a:themeElements>

</xml_diff>